<commit_message>
initial version of DDS support
</commit_message>
<xml_diff>
--- a/doc/Gateway.pptx
+++ b/doc/Gateway.pptx
@@ -5,8 +5,7 @@
     <p:sldMasterId id="2147483648" r:id="rId1"/>
   </p:sldMasterIdLst>
   <p:sldIdLst>
-    <p:sldId id="1575" r:id="rId2"/>
-    <p:sldId id="1576" r:id="rId3"/>
+    <p:sldId id="1577" r:id="rId2"/>
   </p:sldIdLst>
   <p:sldSz cx="12192000" cy="6858000"/>
   <p:notesSz cx="6858000" cy="9144000"/>
@@ -330,7 +329,7 @@
           <a:p>
             <a:fld id="{DFC7EF79-06A3-ED46-9F4C-16AFC18B46CF}" type="datetimeFigureOut">
               <a:rPr lang="en-US" smtClean="0"/>
-              <a:t>3/3/21</a:t>
+              <a:t>3/29/21</a:t>
             </a:fld>
             <a:endParaRPr lang="en-US"/>
           </a:p>
@@ -530,7 +529,7 @@
           <a:p>
             <a:fld id="{DFC7EF79-06A3-ED46-9F4C-16AFC18B46CF}" type="datetimeFigureOut">
               <a:rPr lang="en-US" smtClean="0"/>
-              <a:t>3/3/21</a:t>
+              <a:t>3/29/21</a:t>
             </a:fld>
             <a:endParaRPr lang="en-US"/>
           </a:p>
@@ -740,7 +739,7 @@
           <a:p>
             <a:fld id="{DFC7EF79-06A3-ED46-9F4C-16AFC18B46CF}" type="datetimeFigureOut">
               <a:rPr lang="en-US" smtClean="0"/>
-              <a:t>3/3/21</a:t>
+              <a:t>3/29/21</a:t>
             </a:fld>
             <a:endParaRPr lang="en-US"/>
           </a:p>
@@ -993,7 +992,7 @@
           <a:p>
             <a:fld id="{DFC7EF79-06A3-ED46-9F4C-16AFC18B46CF}" type="datetimeFigureOut">
               <a:rPr lang="en-US" smtClean="0"/>
-              <a:t>3/3/21</a:t>
+              <a:t>3/29/21</a:t>
             </a:fld>
             <a:endParaRPr lang="en-US"/>
           </a:p>
@@ -1269,7 +1268,7 @@
           <a:p>
             <a:fld id="{DFC7EF79-06A3-ED46-9F4C-16AFC18B46CF}" type="datetimeFigureOut">
               <a:rPr lang="en-US" smtClean="0"/>
-              <a:t>3/3/21</a:t>
+              <a:t>3/29/21</a:t>
             </a:fld>
             <a:endParaRPr lang="en-US"/>
           </a:p>
@@ -1537,7 +1536,7 @@
           <a:p>
             <a:fld id="{DFC7EF79-06A3-ED46-9F4C-16AFC18B46CF}" type="datetimeFigureOut">
               <a:rPr lang="en-US" smtClean="0"/>
-              <a:t>3/3/21</a:t>
+              <a:t>3/29/21</a:t>
             </a:fld>
             <a:endParaRPr lang="en-US"/>
           </a:p>
@@ -1952,7 +1951,7 @@
           <a:p>
             <a:fld id="{DFC7EF79-06A3-ED46-9F4C-16AFC18B46CF}" type="datetimeFigureOut">
               <a:rPr lang="en-US" smtClean="0"/>
-              <a:t>3/3/21</a:t>
+              <a:t>3/29/21</a:t>
             </a:fld>
             <a:endParaRPr lang="en-US"/>
           </a:p>
@@ -2094,7 +2093,7 @@
           <a:p>
             <a:fld id="{DFC7EF79-06A3-ED46-9F4C-16AFC18B46CF}" type="datetimeFigureOut">
               <a:rPr lang="en-US" smtClean="0"/>
-              <a:t>3/3/21</a:t>
+              <a:t>3/29/21</a:t>
             </a:fld>
             <a:endParaRPr lang="en-US"/>
           </a:p>
@@ -2207,7 +2206,7 @@
           <a:p>
             <a:fld id="{DFC7EF79-06A3-ED46-9F4C-16AFC18B46CF}" type="datetimeFigureOut">
               <a:rPr lang="en-US" smtClean="0"/>
-              <a:t>3/3/21</a:t>
+              <a:t>3/29/21</a:t>
             </a:fld>
             <a:endParaRPr lang="en-US"/>
           </a:p>
@@ -2520,7 +2519,7 @@
           <a:p>
             <a:fld id="{DFC7EF79-06A3-ED46-9F4C-16AFC18B46CF}" type="datetimeFigureOut">
               <a:rPr lang="en-US" smtClean="0"/>
-              <a:t>3/3/21</a:t>
+              <a:t>3/29/21</a:t>
             </a:fld>
             <a:endParaRPr lang="en-US"/>
           </a:p>
@@ -2809,7 +2808,7 @@
           <a:p>
             <a:fld id="{DFC7EF79-06A3-ED46-9F4C-16AFC18B46CF}" type="datetimeFigureOut">
               <a:rPr lang="en-US" smtClean="0"/>
-              <a:t>3/3/21</a:t>
+              <a:t>3/29/21</a:t>
             </a:fld>
             <a:endParaRPr lang="en-US"/>
           </a:p>
@@ -3052,7 +3051,7 @@
           <a:p>
             <a:fld id="{DFC7EF79-06A3-ED46-9F4C-16AFC18B46CF}" type="datetimeFigureOut">
               <a:rPr lang="en-US" smtClean="0"/>
-              <a:t>3/3/21</a:t>
+              <a:t>3/29/21</a:t>
             </a:fld>
             <a:endParaRPr lang="en-US"/>
           </a:p>
@@ -3472,6 +3471,36 @@
       </p:grpSpPr>
       <p:pic>
         <p:nvPicPr>
+          <p:cNvPr id="22" name="Picture 21" descr="Logo&#10;&#10;Description automatically generated">
+            <a:extLst>
+              <a:ext uri="{FF2B5EF4-FFF2-40B4-BE49-F238E27FC236}">
+                <a16:creationId xmlns:a16="http://schemas.microsoft.com/office/drawing/2014/main" id="{8BDA4F59-2BD4-D94E-8A44-E2F37080C90E}"/>
+              </a:ext>
+            </a:extLst>
+          </p:cNvPr>
+          <p:cNvPicPr>
+            <a:picLocks noChangeAspect="1"/>
+          </p:cNvPicPr>
+          <p:nvPr/>
+        </p:nvPicPr>
+        <p:blipFill>
+          <a:blip r:embed="rId2"/>
+          <a:stretch>
+            <a:fillRect/>
+          </a:stretch>
+        </p:blipFill>
+        <p:spPr>
+          <a:xfrm>
+            <a:off x="3514745" y="3299123"/>
+            <a:ext cx="1504846" cy="842714"/>
+          </a:xfrm>
+          <a:prstGeom prst="rect">
+            <a:avLst/>
+          </a:prstGeom>
+        </p:spPr>
+      </p:pic>
+      <p:pic>
+        <p:nvPicPr>
           <p:cNvPr id="14" name="Picture 13" descr="Diagram&#10;&#10;Description automatically generated">
             <a:extLst>
               <a:ext uri="{FF2B5EF4-FFF2-40B4-BE49-F238E27FC236}">
@@ -3485,14 +3514,14 @@
           <p:nvPr/>
         </p:nvPicPr>
         <p:blipFill rotWithShape="1">
-          <a:blip r:embed="rId2"/>
+          <a:blip r:embed="rId3"/>
           <a:srcRect l="23906"/>
           <a:stretch/>
         </p:blipFill>
         <p:spPr>
           <a:xfrm>
-            <a:off x="4308367" y="4528264"/>
-            <a:ext cx="2814631" cy="1764184"/>
+            <a:off x="2950550" y="4855609"/>
+            <a:ext cx="2248413" cy="1409284"/>
           </a:xfrm>
           <a:prstGeom prst="rect">
             <a:avLst/>
@@ -3513,7 +3542,7 @@
         </p:nvSpPr>
         <p:spPr bwMode="auto">
           <a:xfrm>
-            <a:off x="9543888" y="2661833"/>
+            <a:off x="9543888" y="2403417"/>
             <a:ext cx="1606654" cy="1318386"/>
           </a:xfrm>
           <a:custGeom>
@@ -3672,3265 +3701,6 @@
           <p:nvPr/>
         </p:nvPicPr>
         <p:blipFill>
-          <a:blip r:embed="rId3"/>
-          <a:stretch>
-            <a:fillRect/>
-          </a:stretch>
-        </p:blipFill>
-        <p:spPr>
-          <a:xfrm rot="5400000">
-            <a:off x="9168507" y="5298347"/>
-            <a:ext cx="1549104" cy="436927"/>
-          </a:xfrm>
-          <a:prstGeom prst="rect">
-            <a:avLst/>
-          </a:prstGeom>
-        </p:spPr>
-      </p:pic>
-      <p:sp>
-        <p:nvSpPr>
-          <p:cNvPr id="4" name="Rectangle 3">
-            <a:extLst>
-              <a:ext uri="{FF2B5EF4-FFF2-40B4-BE49-F238E27FC236}">
-                <a16:creationId xmlns:a16="http://schemas.microsoft.com/office/drawing/2014/main" id="{FD96C491-D685-0D4F-9333-FC729635BEBB}"/>
-              </a:ext>
-            </a:extLst>
-          </p:cNvPr>
-          <p:cNvSpPr/>
-          <p:nvPr/>
-        </p:nvSpPr>
-        <p:spPr bwMode="auto">
-          <a:xfrm>
-            <a:off x="3013449" y="2670861"/>
-            <a:ext cx="5782261" cy="1226755"/>
-          </a:xfrm>
-          <a:custGeom>
-            <a:avLst/>
-            <a:gdLst>
-              <a:gd name="connsiteX0" fmla="*/ 0 w 5782261"/>
-              <a:gd name="connsiteY0" fmla="*/ 0 h 1226755"/>
-              <a:gd name="connsiteX1" fmla="*/ 584651 w 5782261"/>
-              <a:gd name="connsiteY1" fmla="*/ 0 h 1226755"/>
-              <a:gd name="connsiteX2" fmla="*/ 1342769 w 5782261"/>
-              <a:gd name="connsiteY2" fmla="*/ 0 h 1226755"/>
-              <a:gd name="connsiteX3" fmla="*/ 1927420 w 5782261"/>
-              <a:gd name="connsiteY3" fmla="*/ 0 h 1226755"/>
-              <a:gd name="connsiteX4" fmla="*/ 2454249 w 5782261"/>
-              <a:gd name="connsiteY4" fmla="*/ 0 h 1226755"/>
-              <a:gd name="connsiteX5" fmla="*/ 2923254 w 5782261"/>
-              <a:gd name="connsiteY5" fmla="*/ 0 h 1226755"/>
-              <a:gd name="connsiteX6" fmla="*/ 3681373 w 5782261"/>
-              <a:gd name="connsiteY6" fmla="*/ 0 h 1226755"/>
-              <a:gd name="connsiteX7" fmla="*/ 4266024 w 5782261"/>
-              <a:gd name="connsiteY7" fmla="*/ 0 h 1226755"/>
-              <a:gd name="connsiteX8" fmla="*/ 4908497 w 5782261"/>
-              <a:gd name="connsiteY8" fmla="*/ 0 h 1226755"/>
-              <a:gd name="connsiteX9" fmla="*/ 5782261 w 5782261"/>
-              <a:gd name="connsiteY9" fmla="*/ 0 h 1226755"/>
-              <a:gd name="connsiteX10" fmla="*/ 5782261 w 5782261"/>
-              <a:gd name="connsiteY10" fmla="*/ 601110 h 1226755"/>
-              <a:gd name="connsiteX11" fmla="*/ 5782261 w 5782261"/>
-              <a:gd name="connsiteY11" fmla="*/ 1226755 h 1226755"/>
-              <a:gd name="connsiteX12" fmla="*/ 5313255 w 5782261"/>
-              <a:gd name="connsiteY12" fmla="*/ 1226755 h 1226755"/>
-              <a:gd name="connsiteX13" fmla="*/ 4670782 w 5782261"/>
-              <a:gd name="connsiteY13" fmla="*/ 1226755 h 1226755"/>
-              <a:gd name="connsiteX14" fmla="*/ 4086131 w 5782261"/>
-              <a:gd name="connsiteY14" fmla="*/ 1226755 h 1226755"/>
-              <a:gd name="connsiteX15" fmla="*/ 3385835 w 5782261"/>
-              <a:gd name="connsiteY15" fmla="*/ 1226755 h 1226755"/>
-              <a:gd name="connsiteX16" fmla="*/ 2627716 w 5782261"/>
-              <a:gd name="connsiteY16" fmla="*/ 1226755 h 1226755"/>
-              <a:gd name="connsiteX17" fmla="*/ 2100888 w 5782261"/>
-              <a:gd name="connsiteY17" fmla="*/ 1226755 h 1226755"/>
-              <a:gd name="connsiteX18" fmla="*/ 1631883 w 5782261"/>
-              <a:gd name="connsiteY18" fmla="*/ 1226755 h 1226755"/>
-              <a:gd name="connsiteX19" fmla="*/ 873764 w 5782261"/>
-              <a:gd name="connsiteY19" fmla="*/ 1226755 h 1226755"/>
-              <a:gd name="connsiteX20" fmla="*/ 0 w 5782261"/>
-              <a:gd name="connsiteY20" fmla="*/ 1226755 h 1226755"/>
-              <a:gd name="connsiteX21" fmla="*/ 0 w 5782261"/>
-              <a:gd name="connsiteY21" fmla="*/ 588842 h 1226755"/>
-              <a:gd name="connsiteX22" fmla="*/ 0 w 5782261"/>
-              <a:gd name="connsiteY22" fmla="*/ 0 h 1226755"/>
-            </a:gdLst>
-            <a:ahLst/>
-            <a:cxnLst>
-              <a:cxn ang="0">
-                <a:pos x="connsiteX0" y="connsiteY0"/>
-              </a:cxn>
-              <a:cxn ang="0">
-                <a:pos x="connsiteX1" y="connsiteY1"/>
-              </a:cxn>
-              <a:cxn ang="0">
-                <a:pos x="connsiteX2" y="connsiteY2"/>
-              </a:cxn>
-              <a:cxn ang="0">
-                <a:pos x="connsiteX3" y="connsiteY3"/>
-              </a:cxn>
-              <a:cxn ang="0">
-                <a:pos x="connsiteX4" y="connsiteY4"/>
-              </a:cxn>
-              <a:cxn ang="0">
-                <a:pos x="connsiteX5" y="connsiteY5"/>
-              </a:cxn>
-              <a:cxn ang="0">
-                <a:pos x="connsiteX6" y="connsiteY6"/>
-              </a:cxn>
-              <a:cxn ang="0">
-                <a:pos x="connsiteX7" y="connsiteY7"/>
-              </a:cxn>
-              <a:cxn ang="0">
-                <a:pos x="connsiteX8" y="connsiteY8"/>
-              </a:cxn>
-              <a:cxn ang="0">
-                <a:pos x="connsiteX9" y="connsiteY9"/>
-              </a:cxn>
-              <a:cxn ang="0">
-                <a:pos x="connsiteX10" y="connsiteY10"/>
-              </a:cxn>
-              <a:cxn ang="0">
-                <a:pos x="connsiteX11" y="connsiteY11"/>
-              </a:cxn>
-              <a:cxn ang="0">
-                <a:pos x="connsiteX12" y="connsiteY12"/>
-              </a:cxn>
-              <a:cxn ang="0">
-                <a:pos x="connsiteX13" y="connsiteY13"/>
-              </a:cxn>
-              <a:cxn ang="0">
-                <a:pos x="connsiteX14" y="connsiteY14"/>
-              </a:cxn>
-              <a:cxn ang="0">
-                <a:pos x="connsiteX15" y="connsiteY15"/>
-              </a:cxn>
-              <a:cxn ang="0">
-                <a:pos x="connsiteX16" y="connsiteY16"/>
-              </a:cxn>
-              <a:cxn ang="0">
-                <a:pos x="connsiteX17" y="connsiteY17"/>
-              </a:cxn>
-              <a:cxn ang="0">
-                <a:pos x="connsiteX18" y="connsiteY18"/>
-              </a:cxn>
-              <a:cxn ang="0">
-                <a:pos x="connsiteX19" y="connsiteY19"/>
-              </a:cxn>
-              <a:cxn ang="0">
-                <a:pos x="connsiteX20" y="connsiteY20"/>
-              </a:cxn>
-              <a:cxn ang="0">
-                <a:pos x="connsiteX21" y="connsiteY21"/>
-              </a:cxn>
-              <a:cxn ang="0">
-                <a:pos x="connsiteX22" y="connsiteY22"/>
-              </a:cxn>
-            </a:cxnLst>
-            <a:rect l="l" t="t" r="r" b="b"/>
-            <a:pathLst>
-              <a:path w="5782261" h="1226755" fill="none" extrusionOk="0">
-                <a:moveTo>
-                  <a:pt x="0" y="0"/>
-                </a:moveTo>
-                <a:cubicBezTo>
-                  <a:pt x="272319" y="18191"/>
-                  <a:pt x="360707" y="2507"/>
-                  <a:pt x="584651" y="0"/>
-                </a:cubicBezTo>
-                <a:cubicBezTo>
-                  <a:pt x="808595" y="-2507"/>
-                  <a:pt x="983344" y="6596"/>
-                  <a:pt x="1342769" y="0"/>
-                </a:cubicBezTo>
-                <a:cubicBezTo>
-                  <a:pt x="1702194" y="-6596"/>
-                  <a:pt x="1673703" y="-8949"/>
-                  <a:pt x="1927420" y="0"/>
-                </a:cubicBezTo>
-                <a:cubicBezTo>
-                  <a:pt x="2181137" y="8949"/>
-                  <a:pt x="2230652" y="7643"/>
-                  <a:pt x="2454249" y="0"/>
-                </a:cubicBezTo>
-                <a:cubicBezTo>
-                  <a:pt x="2677846" y="-7643"/>
-                  <a:pt x="2689521" y="2060"/>
-                  <a:pt x="2923254" y="0"/>
-                </a:cubicBezTo>
-                <a:cubicBezTo>
-                  <a:pt x="3156987" y="-2060"/>
-                  <a:pt x="3347646" y="24531"/>
-                  <a:pt x="3681373" y="0"/>
-                </a:cubicBezTo>
-                <a:cubicBezTo>
-                  <a:pt x="4015100" y="-24531"/>
-                  <a:pt x="4133580" y="-4244"/>
-                  <a:pt x="4266024" y="0"/>
-                </a:cubicBezTo>
-                <a:cubicBezTo>
-                  <a:pt x="4398468" y="4244"/>
-                  <a:pt x="4772149" y="12838"/>
-                  <a:pt x="4908497" y="0"/>
-                </a:cubicBezTo>
-                <a:cubicBezTo>
-                  <a:pt x="5044845" y="-12838"/>
-                  <a:pt x="5469789" y="21366"/>
-                  <a:pt x="5782261" y="0"/>
-                </a:cubicBezTo>
-                <a:cubicBezTo>
-                  <a:pt x="5777927" y="199862"/>
-                  <a:pt x="5778893" y="391953"/>
-                  <a:pt x="5782261" y="601110"/>
-                </a:cubicBezTo>
-                <a:cubicBezTo>
-                  <a:pt x="5785630" y="810267"/>
-                  <a:pt x="5764259" y="990412"/>
-                  <a:pt x="5782261" y="1226755"/>
-                </a:cubicBezTo>
-                <a:cubicBezTo>
-                  <a:pt x="5658574" y="1235901"/>
-                  <a:pt x="5515785" y="1234633"/>
-                  <a:pt x="5313255" y="1226755"/>
-                </a:cubicBezTo>
-                <a:cubicBezTo>
-                  <a:pt x="5110725" y="1218877"/>
-                  <a:pt x="4971054" y="1228343"/>
-                  <a:pt x="4670782" y="1226755"/>
-                </a:cubicBezTo>
-                <a:cubicBezTo>
-                  <a:pt x="4370510" y="1225167"/>
-                  <a:pt x="4296252" y="1208262"/>
-                  <a:pt x="4086131" y="1226755"/>
-                </a:cubicBezTo>
-                <a:cubicBezTo>
-                  <a:pt x="3876010" y="1245248"/>
-                  <a:pt x="3597009" y="1251982"/>
-                  <a:pt x="3385835" y="1226755"/>
-                </a:cubicBezTo>
-                <a:cubicBezTo>
-                  <a:pt x="3174661" y="1201528"/>
-                  <a:pt x="2990413" y="1251991"/>
-                  <a:pt x="2627716" y="1226755"/>
-                </a:cubicBezTo>
-                <a:cubicBezTo>
-                  <a:pt x="2265019" y="1201519"/>
-                  <a:pt x="2334641" y="1240277"/>
-                  <a:pt x="2100888" y="1226755"/>
-                </a:cubicBezTo>
-                <a:cubicBezTo>
-                  <a:pt x="1867135" y="1213233"/>
-                  <a:pt x="1845392" y="1239013"/>
-                  <a:pt x="1631883" y="1226755"/>
-                </a:cubicBezTo>
-                <a:cubicBezTo>
-                  <a:pt x="1418374" y="1214497"/>
-                  <a:pt x="1037659" y="1207166"/>
-                  <a:pt x="873764" y="1226755"/>
-                </a:cubicBezTo>
-                <a:cubicBezTo>
-                  <a:pt x="709869" y="1246344"/>
-                  <a:pt x="233262" y="1190501"/>
-                  <a:pt x="0" y="1226755"/>
-                </a:cubicBezTo>
-                <a:cubicBezTo>
-                  <a:pt x="-3309" y="1061733"/>
-                  <a:pt x="-29568" y="882403"/>
-                  <a:pt x="0" y="588842"/>
-                </a:cubicBezTo>
-                <a:cubicBezTo>
-                  <a:pt x="29568" y="295281"/>
-                  <a:pt x="-16802" y="276171"/>
-                  <a:pt x="0" y="0"/>
-                </a:cubicBezTo>
-                <a:close/>
-              </a:path>
-              <a:path w="5782261" h="1226755" stroke="0" extrusionOk="0">
-                <a:moveTo>
-                  <a:pt x="0" y="0"/>
-                </a:moveTo>
-                <a:cubicBezTo>
-                  <a:pt x="250954" y="-37624"/>
-                  <a:pt x="439589" y="17669"/>
-                  <a:pt x="758119" y="0"/>
-                </a:cubicBezTo>
-                <a:cubicBezTo>
-                  <a:pt x="1076649" y="-17669"/>
-                  <a:pt x="1129265" y="26220"/>
-                  <a:pt x="1400592" y="0"/>
-                </a:cubicBezTo>
-                <a:cubicBezTo>
-                  <a:pt x="1671919" y="-26220"/>
-                  <a:pt x="1729682" y="-2393"/>
-                  <a:pt x="2043066" y="0"/>
-                </a:cubicBezTo>
-                <a:cubicBezTo>
-                  <a:pt x="2356450" y="2393"/>
-                  <a:pt x="2435599" y="-8414"/>
-                  <a:pt x="2569894" y="0"/>
-                </a:cubicBezTo>
-                <a:cubicBezTo>
-                  <a:pt x="2704189" y="8414"/>
-                  <a:pt x="2967931" y="-22523"/>
-                  <a:pt x="3096722" y="0"/>
-                </a:cubicBezTo>
-                <a:cubicBezTo>
-                  <a:pt x="3225513" y="22523"/>
-                  <a:pt x="3667036" y="6626"/>
-                  <a:pt x="3854841" y="0"/>
-                </a:cubicBezTo>
-                <a:cubicBezTo>
-                  <a:pt x="4042646" y="-6626"/>
-                  <a:pt x="4290498" y="-7366"/>
-                  <a:pt x="4497314" y="0"/>
-                </a:cubicBezTo>
-                <a:cubicBezTo>
-                  <a:pt x="4704130" y="7366"/>
-                  <a:pt x="4801819" y="-4049"/>
-                  <a:pt x="5081965" y="0"/>
-                </a:cubicBezTo>
-                <a:cubicBezTo>
-                  <a:pt x="5362111" y="4049"/>
-                  <a:pt x="5605863" y="19109"/>
-                  <a:pt x="5782261" y="0"/>
-                </a:cubicBezTo>
-                <a:cubicBezTo>
-                  <a:pt x="5760650" y="168964"/>
-                  <a:pt x="5772923" y="361080"/>
-                  <a:pt x="5782261" y="576575"/>
-                </a:cubicBezTo>
-                <a:cubicBezTo>
-                  <a:pt x="5791599" y="792071"/>
-                  <a:pt x="5791668" y="926129"/>
-                  <a:pt x="5782261" y="1226755"/>
-                </a:cubicBezTo>
-                <a:cubicBezTo>
-                  <a:pt x="5600977" y="1220987"/>
-                  <a:pt x="5230705" y="1249947"/>
-                  <a:pt x="5024142" y="1226755"/>
-                </a:cubicBezTo>
-                <a:cubicBezTo>
-                  <a:pt x="4817579" y="1203563"/>
-                  <a:pt x="4634319" y="1245316"/>
-                  <a:pt x="4497314" y="1226755"/>
-                </a:cubicBezTo>
-                <a:cubicBezTo>
-                  <a:pt x="4360309" y="1208194"/>
-                  <a:pt x="4061028" y="1244578"/>
-                  <a:pt x="3854841" y="1226755"/>
-                </a:cubicBezTo>
-                <a:cubicBezTo>
-                  <a:pt x="3648654" y="1208932"/>
-                  <a:pt x="3587838" y="1204223"/>
-                  <a:pt x="3385835" y="1226755"/>
-                </a:cubicBezTo>
-                <a:cubicBezTo>
-                  <a:pt x="3183832" y="1249287"/>
-                  <a:pt x="3022134" y="1221924"/>
-                  <a:pt x="2743362" y="1226755"/>
-                </a:cubicBezTo>
-                <a:cubicBezTo>
-                  <a:pt x="2464590" y="1231586"/>
-                  <a:pt x="2397046" y="1238515"/>
-                  <a:pt x="2274356" y="1226755"/>
-                </a:cubicBezTo>
-                <a:cubicBezTo>
-                  <a:pt x="2151666" y="1214995"/>
-                  <a:pt x="1982424" y="1231692"/>
-                  <a:pt x="1805350" y="1226755"/>
-                </a:cubicBezTo>
-                <a:cubicBezTo>
-                  <a:pt x="1628276" y="1221818"/>
-                  <a:pt x="1294548" y="1229333"/>
-                  <a:pt x="1047232" y="1226755"/>
-                </a:cubicBezTo>
-                <a:cubicBezTo>
-                  <a:pt x="799916" y="1224177"/>
-                  <a:pt x="296661" y="1191299"/>
-                  <a:pt x="0" y="1226755"/>
-                </a:cubicBezTo>
-                <a:cubicBezTo>
-                  <a:pt x="10872" y="1046939"/>
-                  <a:pt x="-26507" y="876902"/>
-                  <a:pt x="0" y="588842"/>
-                </a:cubicBezTo>
-                <a:cubicBezTo>
-                  <a:pt x="26507" y="300782"/>
-                  <a:pt x="-1869" y="236601"/>
-                  <a:pt x="0" y="0"/>
-                </a:cubicBezTo>
-                <a:close/>
-              </a:path>
-            </a:pathLst>
-          </a:custGeom>
-          <a:solidFill>
-            <a:schemeClr val="bg1">
-              <a:lumMod val="95000"/>
-            </a:schemeClr>
-          </a:solidFill>
-          <a:ln w="38100" cap="rnd">
-            <a:solidFill>
-              <a:schemeClr val="accent1">
-                <a:lumMod val="50000"/>
-              </a:schemeClr>
-            </a:solidFill>
-            <a:prstDash val="solid"/>
-            <a:round/>
-            <a:headEnd/>
-            <a:tailEnd/>
-            <a:extLst>
-              <a:ext uri="{C807C97D-BFC1-408E-A445-0C87EB9F89A2}">
-                <ask:lineSketchStyleProps xmlns:ask="http://schemas.microsoft.com/office/drawing/2018/sketchyshapes" sd="661058248">
-                  <a:prstGeom prst="rect">
-                    <a:avLst/>
-                  </a:prstGeom>
-                  <ask:type>
-                    <ask:lineSketchFreehand/>
-                  </ask:type>
-                </ask:lineSketchStyleProps>
-              </a:ext>
-            </a:extLst>
-          </a:ln>
-          <a:effectLst/>
-        </p:spPr>
-        <p:txBody>
-          <a:bodyPr wrap="square" lIns="107944" tIns="53972" rIns="107944" bIns="53972" numCol="1" spcCol="72000" rtlCol="0" anchor="ctr">
-            <a:noAutofit/>
-          </a:bodyPr>
-          <a:lstStyle/>
-          <a:p>
-            <a:pPr algn="ctr">
-              <a:lnSpc>
-                <a:spcPct val="110000"/>
-              </a:lnSpc>
-              <a:spcBef>
-                <a:spcPct val="0"/>
-              </a:spcBef>
-              <a:buFont typeface="Wingdings" charset="0"/>
-              <a:buNone/>
-            </a:pPr>
-            <a:endParaRPr lang="en-US" sz="1799" dirty="0">
-              <a:solidFill>
-                <a:srgbClr val="209999"/>
-              </a:solidFill>
-              <a:ea typeface="Arial Unicode MS" panose="020B0604020202020204" pitchFamily="34" charset="-128"/>
-              <a:cs typeface="Arial Unicode MS" panose="020B0604020202020204" pitchFamily="34" charset="-128"/>
-            </a:endParaRPr>
-          </a:p>
-        </p:txBody>
-      </p:sp>
-      <p:pic>
-        <p:nvPicPr>
-          <p:cNvPr id="5" name="Grafik 123">
-            <a:extLst>
-              <a:ext uri="{FF2B5EF4-FFF2-40B4-BE49-F238E27FC236}">
-                <a16:creationId xmlns:a16="http://schemas.microsoft.com/office/drawing/2014/main" id="{611B1515-7772-B345-83E7-3491191A00DB}"/>
-              </a:ext>
-            </a:extLst>
-          </p:cNvPr>
-          <p:cNvPicPr>
-            <a:picLocks noChangeAspect="1"/>
-          </p:cNvPicPr>
-          <p:nvPr/>
-        </p:nvPicPr>
-        <p:blipFill>
-          <a:blip r:embed="rId4">
-            <a:extLst>
-              <a:ext uri="{96DAC541-7B7A-43D3-8B79-37D633B846F1}">
-                <asvg:svgBlip xmlns:asvg="http://schemas.microsoft.com/office/drawing/2016/SVG/main" r:embed="rId5"/>
-              </a:ext>
-            </a:extLst>
-          </a:blip>
-          <a:stretch>
-            <a:fillRect/>
-          </a:stretch>
-        </p:blipFill>
-        <p:spPr>
-          <a:xfrm>
-            <a:off x="3536900" y="2884244"/>
-            <a:ext cx="557161" cy="557161"/>
-          </a:xfrm>
-          <a:prstGeom prst="rect">
-            <a:avLst/>
-          </a:prstGeom>
-        </p:spPr>
-      </p:pic>
-      <p:pic>
-        <p:nvPicPr>
-          <p:cNvPr id="6" name="Grafik 51">
-            <a:extLst>
-              <a:ext uri="{FF2B5EF4-FFF2-40B4-BE49-F238E27FC236}">
-                <a16:creationId xmlns:a16="http://schemas.microsoft.com/office/drawing/2014/main" id="{76FE27F7-B176-B94B-B550-2365E8D1E9C1}"/>
-              </a:ext>
-            </a:extLst>
-          </p:cNvPr>
-          <p:cNvPicPr>
-            <a:picLocks noChangeAspect="1"/>
-          </p:cNvPicPr>
-          <p:nvPr/>
-        </p:nvPicPr>
-        <p:blipFill>
-          <a:blip r:embed="rId6"/>
-          <a:stretch>
-            <a:fillRect/>
-          </a:stretch>
-        </p:blipFill>
-        <p:spPr>
-          <a:xfrm>
-            <a:off x="6969862" y="2800821"/>
-            <a:ext cx="541463" cy="541463"/>
-          </a:xfrm>
-          <a:prstGeom prst="rect">
-            <a:avLst/>
-          </a:prstGeom>
-        </p:spPr>
-      </p:pic>
-      <p:pic>
-        <p:nvPicPr>
-          <p:cNvPr id="7" name="Picture 6" descr="A picture containing text, clipart&#10;&#10;Description automatically generated">
-            <a:extLst>
-              <a:ext uri="{FF2B5EF4-FFF2-40B4-BE49-F238E27FC236}">
-                <a16:creationId xmlns:a16="http://schemas.microsoft.com/office/drawing/2014/main" id="{0A7BDC4F-2D3E-9D41-9ED7-0E2976D8F258}"/>
-              </a:ext>
-            </a:extLst>
-          </p:cNvPr>
-          <p:cNvPicPr>
-            <a:picLocks noChangeAspect="1"/>
-          </p:cNvPicPr>
-          <p:nvPr/>
-        </p:nvPicPr>
-        <p:blipFill>
-          <a:blip r:embed="rId7"/>
-          <a:stretch>
-            <a:fillRect/>
-          </a:stretch>
-        </p:blipFill>
-        <p:spPr>
-          <a:xfrm>
-            <a:off x="6830113" y="3262958"/>
-            <a:ext cx="821773" cy="208162"/>
-          </a:xfrm>
-          <a:prstGeom prst="rect">
-            <a:avLst/>
-          </a:prstGeom>
-          <a:noFill/>
-          <a:ln w="9525" cap="flat" cmpd="sng" algn="ctr">
-            <a:solidFill>
-              <a:schemeClr val="dk1"/>
-            </a:solidFill>
-            <a:prstDash val="solid"/>
-            <a:round/>
-            <a:headEnd type="none" w="med" len="med"/>
-            <a:tailEnd type="none" w="med" len="med"/>
-          </a:ln>
-        </p:spPr>
-        <p:style>
-          <a:lnRef idx="0">
-            <a:scrgbClr r="0" g="0" b="0"/>
-          </a:lnRef>
-          <a:fillRef idx="0">
-            <a:scrgbClr r="0" g="0" b="0"/>
-          </a:fillRef>
-          <a:effectRef idx="0">
-            <a:scrgbClr r="0" g="0" b="0"/>
-          </a:effectRef>
-          <a:fontRef idx="minor">
-            <a:schemeClr val="dk1"/>
-          </a:fontRef>
-        </p:style>
-      </p:pic>
-      <p:sp>
-        <p:nvSpPr>
-          <p:cNvPr id="8" name="Rectangle 7">
-            <a:extLst>
-              <a:ext uri="{FF2B5EF4-FFF2-40B4-BE49-F238E27FC236}">
-                <a16:creationId xmlns:a16="http://schemas.microsoft.com/office/drawing/2014/main" id="{F6C451D6-F6F7-C04E-8255-A86178AC944E}"/>
-              </a:ext>
-            </a:extLst>
-          </p:cNvPr>
-          <p:cNvSpPr/>
-          <p:nvPr/>
-        </p:nvSpPr>
-        <p:spPr>
-          <a:xfrm>
-            <a:off x="3444174" y="3416340"/>
-            <a:ext cx="737318" cy="276727"/>
-          </a:xfrm>
-          <a:prstGeom prst="rect">
-            <a:avLst/>
-          </a:prstGeom>
-        </p:spPr>
-        <p:txBody>
-          <a:bodyPr wrap="none">
-            <a:spAutoFit/>
-          </a:bodyPr>
-          <a:lstStyle/>
-          <a:p>
-            <a:r>
-              <a:rPr lang="en-US" sz="1199" dirty="0">
-                <a:solidFill>
-                  <a:srgbClr val="E535AB"/>
-                </a:solidFill>
-                <a:ea typeface="Arial Unicode MS" panose="020B0604020202020204" pitchFamily="34" charset="-128"/>
-                <a:cs typeface="Arial Unicode MS" panose="020B0604020202020204" pitchFamily="34" charset="-128"/>
-              </a:rPr>
-              <a:t>GraphQL</a:t>
-            </a:r>
-            <a:endParaRPr lang="en-US" sz="1799" dirty="0">
-              <a:solidFill>
-                <a:srgbClr val="E535AB"/>
-              </a:solidFill>
-            </a:endParaRPr>
-          </a:p>
-        </p:txBody>
-      </p:sp>
-      <p:sp>
-        <p:nvSpPr>
-          <p:cNvPr id="9" name="Rectangle 8">
-            <a:extLst>
-              <a:ext uri="{FF2B5EF4-FFF2-40B4-BE49-F238E27FC236}">
-                <a16:creationId xmlns:a16="http://schemas.microsoft.com/office/drawing/2014/main" id="{88C2C17C-8D92-4344-B582-B652AEF69336}"/>
-              </a:ext>
-            </a:extLst>
-          </p:cNvPr>
-          <p:cNvSpPr/>
-          <p:nvPr/>
-        </p:nvSpPr>
-        <p:spPr>
-          <a:xfrm>
-            <a:off x="6951088" y="3461644"/>
-            <a:ext cx="603050" cy="276871"/>
-          </a:xfrm>
-          <a:prstGeom prst="rect">
-            <a:avLst/>
-          </a:prstGeom>
-        </p:spPr>
-        <p:txBody>
-          <a:bodyPr wrap="none">
-            <a:spAutoFit/>
-          </a:bodyPr>
-          <a:lstStyle/>
-          <a:p>
-            <a:r>
-              <a:rPr lang="en-US" sz="1199" dirty="0">
-                <a:solidFill>
-                  <a:srgbClr val="734C82"/>
-                </a:solidFill>
-                <a:ea typeface="Arial Unicode MS" panose="020B0604020202020204" pitchFamily="34" charset="-128"/>
-                <a:cs typeface="Arial Unicode MS" panose="020B0604020202020204" pitchFamily="34" charset="-128"/>
-              </a:rPr>
-              <a:t>Broker</a:t>
-            </a:r>
-            <a:endParaRPr lang="en-US" sz="1799" dirty="0">
-              <a:solidFill>
-                <a:srgbClr val="734C82"/>
-              </a:solidFill>
-            </a:endParaRPr>
-          </a:p>
-        </p:txBody>
-      </p:sp>
-      <p:sp>
-        <p:nvSpPr>
-          <p:cNvPr id="10" name="Rectangle 9">
-            <a:extLst>
-              <a:ext uri="{FF2B5EF4-FFF2-40B4-BE49-F238E27FC236}">
-                <a16:creationId xmlns:a16="http://schemas.microsoft.com/office/drawing/2014/main" id="{010AF1EF-56FA-8C43-B615-43C52B33FD18}"/>
-              </a:ext>
-            </a:extLst>
-          </p:cNvPr>
-          <p:cNvSpPr/>
-          <p:nvPr/>
-        </p:nvSpPr>
-        <p:spPr>
-          <a:xfrm>
-            <a:off x="4675729" y="3056746"/>
-            <a:ext cx="1760091" cy="454952"/>
-          </a:xfrm>
-          <a:prstGeom prst="rect">
-            <a:avLst/>
-          </a:prstGeom>
-        </p:spPr>
-        <p:txBody>
-          <a:bodyPr wrap="square">
-            <a:spAutoFit/>
-          </a:bodyPr>
-          <a:lstStyle/>
-          <a:p>
-            <a:pPr algn="ctr">
-              <a:lnSpc>
-                <a:spcPct val="110000"/>
-              </a:lnSpc>
-              <a:spcBef>
-                <a:spcPct val="0"/>
-              </a:spcBef>
-              <a:buFont typeface="Wingdings" charset="0"/>
-              <a:buNone/>
-            </a:pPr>
-            <a:r>
-              <a:rPr lang="en-US" sz="1099" dirty="0">
-                <a:solidFill>
-                  <a:schemeClr val="bg2">
-                    <a:lumMod val="25000"/>
-                  </a:schemeClr>
-                </a:solidFill>
-                <a:ea typeface="Arial Unicode MS" panose="020B0604020202020204" pitchFamily="34" charset="-128"/>
-                <a:cs typeface="Arial Unicode MS" panose="020B0604020202020204" pitchFamily="34" charset="-128"/>
-              </a:rPr>
-              <a:t>Reactive, Asynchronous</a:t>
-            </a:r>
-          </a:p>
-          <a:p>
-            <a:pPr algn="ctr">
-              <a:lnSpc>
-                <a:spcPct val="110000"/>
-              </a:lnSpc>
-              <a:spcBef>
-                <a:spcPct val="0"/>
-              </a:spcBef>
-              <a:buFont typeface="Wingdings" charset="0"/>
-              <a:buNone/>
-            </a:pPr>
-            <a:r>
-              <a:rPr lang="en-US" sz="1099" dirty="0">
-                <a:solidFill>
-                  <a:schemeClr val="bg2">
-                    <a:lumMod val="25000"/>
-                  </a:schemeClr>
-                </a:solidFill>
-                <a:ea typeface="Arial Unicode MS" panose="020B0604020202020204" pitchFamily="34" charset="-128"/>
-                <a:cs typeface="Arial Unicode MS" panose="020B0604020202020204" pitchFamily="34" charset="-128"/>
-              </a:rPr>
-              <a:t>Single Host or Clustered</a:t>
-            </a:r>
-          </a:p>
-        </p:txBody>
-      </p:sp>
-      <p:sp>
-        <p:nvSpPr>
-          <p:cNvPr id="15" name="Rounded Rectangle 14">
-            <a:extLst>
-              <a:ext uri="{FF2B5EF4-FFF2-40B4-BE49-F238E27FC236}">
-                <a16:creationId xmlns:a16="http://schemas.microsoft.com/office/drawing/2014/main" id="{BCC0BC80-C64C-2B40-B2C1-5B61ED1F79F7}"/>
-              </a:ext>
-            </a:extLst>
-          </p:cNvPr>
-          <p:cNvSpPr/>
-          <p:nvPr/>
-        </p:nvSpPr>
-        <p:spPr bwMode="auto">
-          <a:xfrm>
-            <a:off x="4507579" y="2769136"/>
-            <a:ext cx="1970373" cy="818193"/>
-          </a:xfrm>
-          <a:prstGeom prst="roundRect">
-            <a:avLst/>
-          </a:prstGeom>
-          <a:noFill/>
-          <a:ln w="9525" cap="flat" cmpd="sng" algn="ctr">
-            <a:noFill/>
-            <a:prstDash val="solid"/>
-            <a:round/>
-            <a:headEnd type="none" w="med" len="med"/>
-            <a:tailEnd type="none" w="med" len="med"/>
-          </a:ln>
-        </p:spPr>
-        <p:style>
-          <a:lnRef idx="0">
-            <a:scrgbClr r="0" g="0" b="0"/>
-          </a:lnRef>
-          <a:fillRef idx="0">
-            <a:scrgbClr r="0" g="0" b="0"/>
-          </a:fillRef>
-          <a:effectRef idx="0">
-            <a:scrgbClr r="0" g="0" b="0"/>
-          </a:effectRef>
-          <a:fontRef idx="minor">
-            <a:schemeClr val="dk1"/>
-          </a:fontRef>
-        </p:style>
-        <p:txBody>
-          <a:bodyPr wrap="square" lIns="107944" tIns="53972" rIns="107944" bIns="53972" numCol="1" spcCol="72000" rtlCol="0" anchor="ctr">
-            <a:noAutofit/>
-          </a:bodyPr>
-          <a:lstStyle/>
-          <a:p>
-            <a:pPr algn="ctr">
-              <a:lnSpc>
-                <a:spcPct val="110000"/>
-              </a:lnSpc>
-              <a:spcBef>
-                <a:spcPct val="0"/>
-              </a:spcBef>
-              <a:buFont typeface="Wingdings" charset="0"/>
-              <a:buNone/>
-            </a:pPr>
-            <a:endParaRPr lang="en-US" sz="1799" dirty="0">
-              <a:solidFill>
-                <a:schemeClr val="tx1"/>
-              </a:solidFill>
-              <a:ea typeface="Arial Unicode MS" panose="020B0604020202020204" pitchFamily="34" charset="-128"/>
-              <a:cs typeface="Arial Unicode MS" panose="020B0604020202020204" pitchFamily="34" charset="-128"/>
-            </a:endParaRPr>
-          </a:p>
-        </p:txBody>
-      </p:sp>
-      <p:sp>
-        <p:nvSpPr>
-          <p:cNvPr id="16" name="Rectangle 15">
-            <a:extLst>
-              <a:ext uri="{FF2B5EF4-FFF2-40B4-BE49-F238E27FC236}">
-                <a16:creationId xmlns:a16="http://schemas.microsoft.com/office/drawing/2014/main" id="{8FE9E20A-F465-8B4D-99FE-EA4F8BB60C2F}"/>
-              </a:ext>
-            </a:extLst>
-          </p:cNvPr>
-          <p:cNvSpPr/>
-          <p:nvPr/>
-        </p:nvSpPr>
-        <p:spPr>
-          <a:xfrm>
-            <a:off x="5003235" y="2730023"/>
-            <a:ext cx="1138437" cy="399773"/>
-          </a:xfrm>
-          <a:prstGeom prst="rect">
-            <a:avLst/>
-          </a:prstGeom>
-        </p:spPr>
-        <p:txBody>
-          <a:bodyPr wrap="none">
-            <a:spAutoFit/>
-          </a:bodyPr>
-          <a:lstStyle/>
-          <a:p>
-            <a:r>
-              <a:rPr lang="en-US" sz="1999" b="1" i="1" dirty="0">
-                <a:solidFill>
-                  <a:schemeClr val="bg2">
-                    <a:lumMod val="25000"/>
-                  </a:schemeClr>
-                </a:solidFill>
-                <a:ea typeface="Arial Unicode MS" panose="020B0604020202020204" pitchFamily="34" charset="-128"/>
-                <a:cs typeface="Arial Unicode MS" panose="020B0604020202020204" pitchFamily="34" charset="-128"/>
-              </a:rPr>
-              <a:t>Gateway</a:t>
-            </a:r>
-            <a:endParaRPr lang="en-US" sz="1999" b="1" i="1" dirty="0">
-              <a:solidFill>
-                <a:schemeClr val="bg2">
-                  <a:lumMod val="25000"/>
-                </a:schemeClr>
-              </a:solidFill>
-            </a:endParaRPr>
-          </a:p>
-        </p:txBody>
-      </p:sp>
-      <p:sp>
-        <p:nvSpPr>
-          <p:cNvPr id="19" name="Rounded Rectangle 18">
-            <a:extLst>
-              <a:ext uri="{FF2B5EF4-FFF2-40B4-BE49-F238E27FC236}">
-                <a16:creationId xmlns:a16="http://schemas.microsoft.com/office/drawing/2014/main" id="{98CC9E7E-3633-874A-88E8-A00B1ED5BDF9}"/>
-              </a:ext>
-            </a:extLst>
-          </p:cNvPr>
-          <p:cNvSpPr/>
-          <p:nvPr/>
-        </p:nvSpPr>
-        <p:spPr bwMode="auto">
-          <a:xfrm>
-            <a:off x="3295930" y="2819174"/>
-            <a:ext cx="1045524" cy="862471"/>
-          </a:xfrm>
-          <a:custGeom>
-            <a:avLst/>
-            <a:gdLst>
-              <a:gd name="connsiteX0" fmla="*/ 0 w 1045524"/>
-              <a:gd name="connsiteY0" fmla="*/ 143748 h 862471"/>
-              <a:gd name="connsiteX1" fmla="*/ 143748 w 1045524"/>
-              <a:gd name="connsiteY1" fmla="*/ 0 h 862471"/>
-              <a:gd name="connsiteX2" fmla="*/ 901776 w 1045524"/>
-              <a:gd name="connsiteY2" fmla="*/ 0 h 862471"/>
-              <a:gd name="connsiteX3" fmla="*/ 1045524 w 1045524"/>
-              <a:gd name="connsiteY3" fmla="*/ 143748 h 862471"/>
-              <a:gd name="connsiteX4" fmla="*/ 1045524 w 1045524"/>
-              <a:gd name="connsiteY4" fmla="*/ 718723 h 862471"/>
-              <a:gd name="connsiteX5" fmla="*/ 901776 w 1045524"/>
-              <a:gd name="connsiteY5" fmla="*/ 862471 h 862471"/>
-              <a:gd name="connsiteX6" fmla="*/ 143748 w 1045524"/>
-              <a:gd name="connsiteY6" fmla="*/ 862471 h 862471"/>
-              <a:gd name="connsiteX7" fmla="*/ 0 w 1045524"/>
-              <a:gd name="connsiteY7" fmla="*/ 718723 h 862471"/>
-              <a:gd name="connsiteX8" fmla="*/ 0 w 1045524"/>
-              <a:gd name="connsiteY8" fmla="*/ 143748 h 862471"/>
-            </a:gdLst>
-            <a:ahLst/>
-            <a:cxnLst>
-              <a:cxn ang="0">
-                <a:pos x="connsiteX0" y="connsiteY0"/>
-              </a:cxn>
-              <a:cxn ang="0">
-                <a:pos x="connsiteX1" y="connsiteY1"/>
-              </a:cxn>
-              <a:cxn ang="0">
-                <a:pos x="connsiteX2" y="connsiteY2"/>
-              </a:cxn>
-              <a:cxn ang="0">
-                <a:pos x="connsiteX3" y="connsiteY3"/>
-              </a:cxn>
-              <a:cxn ang="0">
-                <a:pos x="connsiteX4" y="connsiteY4"/>
-              </a:cxn>
-              <a:cxn ang="0">
-                <a:pos x="connsiteX5" y="connsiteY5"/>
-              </a:cxn>
-              <a:cxn ang="0">
-                <a:pos x="connsiteX6" y="connsiteY6"/>
-              </a:cxn>
-              <a:cxn ang="0">
-                <a:pos x="connsiteX7" y="connsiteY7"/>
-              </a:cxn>
-              <a:cxn ang="0">
-                <a:pos x="connsiteX8" y="connsiteY8"/>
-              </a:cxn>
-            </a:cxnLst>
-            <a:rect l="l" t="t" r="r" b="b"/>
-            <a:pathLst>
-              <a:path w="1045524" h="862471" extrusionOk="0">
-                <a:moveTo>
-                  <a:pt x="0" y="143748"/>
-                </a:moveTo>
-                <a:cubicBezTo>
-                  <a:pt x="-9704" y="58373"/>
-                  <a:pt x="58599" y="2162"/>
-                  <a:pt x="143748" y="0"/>
-                </a:cubicBezTo>
-                <a:cubicBezTo>
-                  <a:pt x="341759" y="-27723"/>
-                  <a:pt x="678322" y="-9635"/>
-                  <a:pt x="901776" y="0"/>
-                </a:cubicBezTo>
-                <a:cubicBezTo>
-                  <a:pt x="970146" y="10761"/>
-                  <a:pt x="1043140" y="77533"/>
-                  <a:pt x="1045524" y="143748"/>
-                </a:cubicBezTo>
-                <a:cubicBezTo>
-                  <a:pt x="1067495" y="280425"/>
-                  <a:pt x="1013346" y="517323"/>
-                  <a:pt x="1045524" y="718723"/>
-                </a:cubicBezTo>
-                <a:cubicBezTo>
-                  <a:pt x="1061119" y="799963"/>
-                  <a:pt x="982272" y="860194"/>
-                  <a:pt x="901776" y="862471"/>
-                </a:cubicBezTo>
-                <a:cubicBezTo>
-                  <a:pt x="648641" y="863713"/>
-                  <a:pt x="501396" y="870240"/>
-                  <a:pt x="143748" y="862471"/>
-                </a:cubicBezTo>
-                <a:cubicBezTo>
-                  <a:pt x="62889" y="848464"/>
-                  <a:pt x="-8261" y="809594"/>
-                  <a:pt x="0" y="718723"/>
-                </a:cubicBezTo>
-                <a:cubicBezTo>
-                  <a:pt x="38108" y="480802"/>
-                  <a:pt x="-29257" y="204854"/>
-                  <a:pt x="0" y="143748"/>
-                </a:cubicBezTo>
-                <a:close/>
-              </a:path>
-            </a:pathLst>
-          </a:custGeom>
-          <a:noFill/>
-          <a:ln w="12700" cap="flat" cmpd="sng" algn="ctr">
-            <a:solidFill>
-              <a:schemeClr val="accent1">
-                <a:lumMod val="50000"/>
-              </a:schemeClr>
-            </a:solidFill>
-            <a:prstDash val="solid"/>
-            <a:round/>
-            <a:headEnd type="none" w="med" len="med"/>
-            <a:tailEnd type="none" w="med" len="med"/>
-            <a:extLst>
-              <a:ext uri="{C807C97D-BFC1-408E-A445-0C87EB9F89A2}">
-                <ask:lineSketchStyleProps xmlns:ask="http://schemas.microsoft.com/office/drawing/2018/sketchyshapes" sd="1219033472">
-                  <a:prstGeom prst="roundRect">
-                    <a:avLst/>
-                  </a:prstGeom>
-                  <ask:type>
-                    <ask:lineSketchCurved/>
-                  </ask:type>
-                </ask:lineSketchStyleProps>
-              </a:ext>
-            </a:extLst>
-          </a:ln>
-        </p:spPr>
-        <p:style>
-          <a:lnRef idx="0">
-            <a:scrgbClr r="0" g="0" b="0"/>
-          </a:lnRef>
-          <a:fillRef idx="0">
-            <a:scrgbClr r="0" g="0" b="0"/>
-          </a:fillRef>
-          <a:effectRef idx="0">
-            <a:scrgbClr r="0" g="0" b="0"/>
-          </a:effectRef>
-          <a:fontRef idx="minor">
-            <a:schemeClr val="dk1"/>
-          </a:fontRef>
-        </p:style>
-        <p:txBody>
-          <a:bodyPr wrap="square" lIns="107944" tIns="53972" rIns="107944" bIns="53972" numCol="1" spcCol="72000" rtlCol="0" anchor="ctr">
-            <a:noAutofit/>
-          </a:bodyPr>
-          <a:lstStyle/>
-          <a:p>
-            <a:pPr algn="ctr">
-              <a:lnSpc>
-                <a:spcPct val="110000"/>
-              </a:lnSpc>
-              <a:spcBef>
-                <a:spcPct val="0"/>
-              </a:spcBef>
-              <a:buFont typeface="Wingdings" charset="0"/>
-              <a:buNone/>
-            </a:pPr>
-            <a:endParaRPr lang="en-US" sz="1799" dirty="0">
-              <a:solidFill>
-                <a:schemeClr val="tx1"/>
-              </a:solidFill>
-              <a:ea typeface="Arial Unicode MS" panose="020B0604020202020204" pitchFamily="34" charset="-128"/>
-              <a:cs typeface="Arial Unicode MS" panose="020B0604020202020204" pitchFamily="34" charset="-128"/>
-            </a:endParaRPr>
-          </a:p>
-        </p:txBody>
-      </p:sp>
-      <p:sp>
-        <p:nvSpPr>
-          <p:cNvPr id="20" name="Rounded Rectangle 19">
-            <a:extLst>
-              <a:ext uri="{FF2B5EF4-FFF2-40B4-BE49-F238E27FC236}">
-                <a16:creationId xmlns:a16="http://schemas.microsoft.com/office/drawing/2014/main" id="{2ED40DE5-8EC8-FF49-92B7-9EA7BDAF3C32}"/>
-              </a:ext>
-            </a:extLst>
-          </p:cNvPr>
-          <p:cNvSpPr/>
-          <p:nvPr/>
-        </p:nvSpPr>
-        <p:spPr bwMode="auto">
-          <a:xfrm>
-            <a:off x="6735965" y="2820639"/>
-            <a:ext cx="1009292" cy="895515"/>
-          </a:xfrm>
-          <a:custGeom>
-            <a:avLst/>
-            <a:gdLst>
-              <a:gd name="connsiteX0" fmla="*/ 0 w 1009292"/>
-              <a:gd name="connsiteY0" fmla="*/ 149255 h 895515"/>
-              <a:gd name="connsiteX1" fmla="*/ 149255 w 1009292"/>
-              <a:gd name="connsiteY1" fmla="*/ 0 h 895515"/>
-              <a:gd name="connsiteX2" fmla="*/ 860037 w 1009292"/>
-              <a:gd name="connsiteY2" fmla="*/ 0 h 895515"/>
-              <a:gd name="connsiteX3" fmla="*/ 1009292 w 1009292"/>
-              <a:gd name="connsiteY3" fmla="*/ 149255 h 895515"/>
-              <a:gd name="connsiteX4" fmla="*/ 1009292 w 1009292"/>
-              <a:gd name="connsiteY4" fmla="*/ 746260 h 895515"/>
-              <a:gd name="connsiteX5" fmla="*/ 860037 w 1009292"/>
-              <a:gd name="connsiteY5" fmla="*/ 895515 h 895515"/>
-              <a:gd name="connsiteX6" fmla="*/ 149255 w 1009292"/>
-              <a:gd name="connsiteY6" fmla="*/ 895515 h 895515"/>
-              <a:gd name="connsiteX7" fmla="*/ 0 w 1009292"/>
-              <a:gd name="connsiteY7" fmla="*/ 746260 h 895515"/>
-              <a:gd name="connsiteX8" fmla="*/ 0 w 1009292"/>
-              <a:gd name="connsiteY8" fmla="*/ 149255 h 895515"/>
-            </a:gdLst>
-            <a:ahLst/>
-            <a:cxnLst>
-              <a:cxn ang="0">
-                <a:pos x="connsiteX0" y="connsiteY0"/>
-              </a:cxn>
-              <a:cxn ang="0">
-                <a:pos x="connsiteX1" y="connsiteY1"/>
-              </a:cxn>
-              <a:cxn ang="0">
-                <a:pos x="connsiteX2" y="connsiteY2"/>
-              </a:cxn>
-              <a:cxn ang="0">
-                <a:pos x="connsiteX3" y="connsiteY3"/>
-              </a:cxn>
-              <a:cxn ang="0">
-                <a:pos x="connsiteX4" y="connsiteY4"/>
-              </a:cxn>
-              <a:cxn ang="0">
-                <a:pos x="connsiteX5" y="connsiteY5"/>
-              </a:cxn>
-              <a:cxn ang="0">
-                <a:pos x="connsiteX6" y="connsiteY6"/>
-              </a:cxn>
-              <a:cxn ang="0">
-                <a:pos x="connsiteX7" y="connsiteY7"/>
-              </a:cxn>
-              <a:cxn ang="0">
-                <a:pos x="connsiteX8" y="connsiteY8"/>
-              </a:cxn>
-            </a:cxnLst>
-            <a:rect l="l" t="t" r="r" b="b"/>
-            <a:pathLst>
-              <a:path w="1009292" h="895515" extrusionOk="0">
-                <a:moveTo>
-                  <a:pt x="0" y="149255"/>
-                </a:moveTo>
-                <a:cubicBezTo>
-                  <a:pt x="-9484" y="72749"/>
-                  <a:pt x="52449" y="959"/>
-                  <a:pt x="149255" y="0"/>
-                </a:cubicBezTo>
-                <a:cubicBezTo>
-                  <a:pt x="482826" y="67"/>
-                  <a:pt x="688499" y="6570"/>
-                  <a:pt x="860037" y="0"/>
-                </a:cubicBezTo>
-                <a:cubicBezTo>
-                  <a:pt x="941160" y="3038"/>
-                  <a:pt x="1014789" y="68027"/>
-                  <a:pt x="1009292" y="149255"/>
-                </a:cubicBezTo>
-                <a:cubicBezTo>
-                  <a:pt x="990443" y="342957"/>
-                  <a:pt x="1042538" y="509977"/>
-                  <a:pt x="1009292" y="746260"/>
-                </a:cubicBezTo>
-                <a:cubicBezTo>
-                  <a:pt x="1008174" y="835612"/>
-                  <a:pt x="936841" y="901539"/>
-                  <a:pt x="860037" y="895515"/>
-                </a:cubicBezTo>
-                <a:cubicBezTo>
-                  <a:pt x="713736" y="953246"/>
-                  <a:pt x="359616" y="912998"/>
-                  <a:pt x="149255" y="895515"/>
-                </a:cubicBezTo>
-                <a:cubicBezTo>
-                  <a:pt x="70717" y="894085"/>
-                  <a:pt x="-13516" y="834804"/>
-                  <a:pt x="0" y="746260"/>
-                </a:cubicBezTo>
-                <a:cubicBezTo>
-                  <a:pt x="8002" y="604782"/>
-                  <a:pt x="-26881" y="412585"/>
-                  <a:pt x="0" y="149255"/>
-                </a:cubicBezTo>
-                <a:close/>
-              </a:path>
-            </a:pathLst>
-          </a:custGeom>
-          <a:noFill/>
-          <a:ln w="12700" cap="flat" cmpd="sng" algn="ctr">
-            <a:solidFill>
-              <a:schemeClr val="accent1">
-                <a:lumMod val="50000"/>
-              </a:schemeClr>
-            </a:solidFill>
-            <a:prstDash val="solid"/>
-            <a:round/>
-            <a:headEnd type="none" w="med" len="med"/>
-            <a:tailEnd type="none" w="med" len="med"/>
-            <a:extLst>
-              <a:ext uri="{C807C97D-BFC1-408E-A445-0C87EB9F89A2}">
-                <ask:lineSketchStyleProps xmlns:ask="http://schemas.microsoft.com/office/drawing/2018/sketchyshapes" sd="1661685737">
-                  <a:prstGeom prst="roundRect">
-                    <a:avLst/>
-                  </a:prstGeom>
-                  <ask:type>
-                    <ask:lineSketchCurved/>
-                  </ask:type>
-                </ask:lineSketchStyleProps>
-              </a:ext>
-            </a:extLst>
-          </a:ln>
-        </p:spPr>
-        <p:style>
-          <a:lnRef idx="0">
-            <a:scrgbClr r="0" g="0" b="0"/>
-          </a:lnRef>
-          <a:fillRef idx="0">
-            <a:scrgbClr r="0" g="0" b="0"/>
-          </a:fillRef>
-          <a:effectRef idx="0">
-            <a:scrgbClr r="0" g="0" b="0"/>
-          </a:effectRef>
-          <a:fontRef idx="minor">
-            <a:schemeClr val="dk1"/>
-          </a:fontRef>
-        </p:style>
-        <p:txBody>
-          <a:bodyPr wrap="square" lIns="107944" tIns="53972" rIns="107944" bIns="53972" numCol="1" spcCol="72000" rtlCol="0" anchor="ctr">
-            <a:noAutofit/>
-          </a:bodyPr>
-          <a:lstStyle/>
-          <a:p>
-            <a:pPr algn="ctr">
-              <a:lnSpc>
-                <a:spcPct val="110000"/>
-              </a:lnSpc>
-              <a:spcBef>
-                <a:spcPct val="0"/>
-              </a:spcBef>
-              <a:buFont typeface="Wingdings" charset="0"/>
-              <a:buNone/>
-            </a:pPr>
-            <a:endParaRPr lang="en-US" sz="1799" dirty="0">
-              <a:solidFill>
-                <a:schemeClr val="tx1"/>
-              </a:solidFill>
-              <a:ea typeface="Arial Unicode MS" panose="020B0604020202020204" pitchFamily="34" charset="-128"/>
-              <a:cs typeface="Arial Unicode MS" panose="020B0604020202020204" pitchFamily="34" charset="-128"/>
-            </a:endParaRPr>
-          </a:p>
-        </p:txBody>
-      </p:sp>
-      <p:cxnSp>
-        <p:nvCxnSpPr>
-          <p:cNvPr id="26" name="Straight Arrow Connector 25">
-            <a:extLst>
-              <a:ext uri="{FF2B5EF4-FFF2-40B4-BE49-F238E27FC236}">
-                <a16:creationId xmlns:a16="http://schemas.microsoft.com/office/drawing/2014/main" id="{6CF4547B-F177-A548-B1BE-0E3ED28DC61A}"/>
-              </a:ext>
-            </a:extLst>
-          </p:cNvPr>
-          <p:cNvCxnSpPr>
-            <a:cxnSpLocks/>
-            <a:stCxn id="56" idx="2"/>
-          </p:cNvCxnSpPr>
-          <p:nvPr/>
-        </p:nvCxnSpPr>
-        <p:spPr bwMode="auto">
-          <a:xfrm>
-            <a:off x="3222875" y="2136015"/>
-            <a:ext cx="560670" cy="506672"/>
-          </a:xfrm>
-          <a:prstGeom prst="straightConnector1">
-            <a:avLst/>
-          </a:prstGeom>
-          <a:solidFill>
-            <a:schemeClr val="tx2"/>
-          </a:solidFill>
-          <a:ln w="12700" cap="flat" cmpd="sng" algn="ctr">
-            <a:solidFill>
-              <a:schemeClr val="accent1">
-                <a:lumMod val="50000"/>
-              </a:schemeClr>
-            </a:solidFill>
-            <a:prstDash val="solid"/>
-            <a:round/>
-            <a:headEnd type="none" w="med" len="med"/>
-            <a:tailEnd type="triangle"/>
-          </a:ln>
-          <a:effectLst/>
-          <a:extLst>
-            <a:ext uri="{AF507438-7753-43E0-B8FC-AC1667EBCBE1}">
-              <a14:hiddenEffects xmlns:a14="http://schemas.microsoft.com/office/drawing/2010/main">
-                <a:effectLst>
-                  <a:outerShdw blurRad="63500" dist="35921" dir="2700000" algn="ctr" rotWithShape="0">
-                    <a:schemeClr val="bg2"/>
-                  </a:outerShdw>
-                </a:effectLst>
-              </a14:hiddenEffects>
-            </a:ext>
-          </a:extLst>
-        </p:spPr>
-      </p:cxnSp>
-      <p:sp>
-        <p:nvSpPr>
-          <p:cNvPr id="32" name="TextBox 31">
-            <a:extLst>
-              <a:ext uri="{FF2B5EF4-FFF2-40B4-BE49-F238E27FC236}">
-                <a16:creationId xmlns:a16="http://schemas.microsoft.com/office/drawing/2014/main" id="{7BC46A68-3EBE-AA45-BEAC-C8047F011DE2}"/>
-              </a:ext>
-            </a:extLst>
-          </p:cNvPr>
-          <p:cNvSpPr txBox="1"/>
-          <p:nvPr/>
-        </p:nvSpPr>
-        <p:spPr>
-          <a:xfrm>
-            <a:off x="6847762" y="659220"/>
-            <a:ext cx="1041946" cy="425925"/>
-          </a:xfrm>
-          <a:prstGeom prst="rect">
-            <a:avLst/>
-          </a:prstGeom>
-          <a:noFill/>
-        </p:spPr>
-        <p:txBody>
-          <a:bodyPr wrap="square" lIns="0" tIns="0" rIns="0" bIns="0" rtlCol="0">
-            <a:noAutofit/>
-          </a:bodyPr>
-          <a:lstStyle/>
-          <a:p>
-            <a:pPr algn="ctr">
-              <a:lnSpc>
-                <a:spcPct val="110000"/>
-              </a:lnSpc>
-            </a:pPr>
-            <a:r>
-              <a:rPr lang="en-US" sz="1199" dirty="0">
-                <a:ea typeface="Arial Unicode MS" panose="020B0604020202020204" pitchFamily="34" charset="-128"/>
-                <a:cs typeface="Arial Unicode MS" panose="020B0604020202020204" pitchFamily="34" charset="-128"/>
-              </a:rPr>
-              <a:t>Subscribe Tags</a:t>
-            </a:r>
-          </a:p>
-          <a:p>
-            <a:pPr algn="ctr">
-              <a:lnSpc>
-                <a:spcPct val="110000"/>
-              </a:lnSpc>
-            </a:pPr>
-            <a:r>
-              <a:rPr lang="en-US" sz="1199" dirty="0">
-                <a:ea typeface="Arial Unicode MS" panose="020B0604020202020204" pitchFamily="34" charset="-128"/>
-                <a:cs typeface="Arial Unicode MS" panose="020B0604020202020204" pitchFamily="34" charset="-128"/>
-              </a:rPr>
-              <a:t>Publish Tags</a:t>
-            </a:r>
-          </a:p>
-        </p:txBody>
-      </p:sp>
-      <p:cxnSp>
-        <p:nvCxnSpPr>
-          <p:cNvPr id="33" name="Straight Arrow Connector 32">
-            <a:extLst>
-              <a:ext uri="{FF2B5EF4-FFF2-40B4-BE49-F238E27FC236}">
-                <a16:creationId xmlns:a16="http://schemas.microsoft.com/office/drawing/2014/main" id="{5E15D8E8-2A58-5E4D-B494-CE4282A91447}"/>
-              </a:ext>
-            </a:extLst>
-          </p:cNvPr>
-          <p:cNvCxnSpPr>
-            <a:cxnSpLocks/>
-          </p:cNvCxnSpPr>
-          <p:nvPr/>
-        </p:nvCxnSpPr>
-        <p:spPr bwMode="auto">
-          <a:xfrm flipH="1">
-            <a:off x="7232984" y="1963664"/>
-            <a:ext cx="743147" cy="665409"/>
-          </a:xfrm>
-          <a:prstGeom prst="straightConnector1">
-            <a:avLst/>
-          </a:prstGeom>
-          <a:solidFill>
-            <a:schemeClr val="tx2"/>
-          </a:solidFill>
-          <a:ln w="12700" cap="flat" cmpd="sng" algn="ctr">
-            <a:solidFill>
-              <a:schemeClr val="accent1">
-                <a:lumMod val="50000"/>
-              </a:schemeClr>
-            </a:solidFill>
-            <a:prstDash val="solid"/>
-            <a:round/>
-            <a:headEnd type="none" w="med" len="med"/>
-            <a:tailEnd type="triangle"/>
-          </a:ln>
-          <a:effectLst/>
-          <a:extLst>
-            <a:ext uri="{AF507438-7753-43E0-B8FC-AC1667EBCBE1}">
-              <a14:hiddenEffects xmlns:a14="http://schemas.microsoft.com/office/drawing/2010/main">
-                <a:effectLst>
-                  <a:outerShdw blurRad="63500" dist="35921" dir="2700000" algn="ctr" rotWithShape="0">
-                    <a:schemeClr val="bg2"/>
-                  </a:outerShdw>
-                </a:effectLst>
-              </a14:hiddenEffects>
-            </a:ext>
-          </a:extLst>
-        </p:spPr>
-      </p:cxnSp>
-      <p:cxnSp>
-        <p:nvCxnSpPr>
-          <p:cNvPr id="36" name="Straight Arrow Connector 35">
-            <a:extLst>
-              <a:ext uri="{FF2B5EF4-FFF2-40B4-BE49-F238E27FC236}">
-                <a16:creationId xmlns:a16="http://schemas.microsoft.com/office/drawing/2014/main" id="{AE9D9A59-9F59-8443-8CDC-F611A3AD6F22}"/>
-              </a:ext>
-            </a:extLst>
-          </p:cNvPr>
-          <p:cNvCxnSpPr>
-            <a:cxnSpLocks/>
-          </p:cNvCxnSpPr>
-          <p:nvPr/>
-        </p:nvCxnSpPr>
-        <p:spPr bwMode="auto">
-          <a:xfrm>
-            <a:off x="9927654" y="4271015"/>
-            <a:ext cx="0" cy="452450"/>
-          </a:xfrm>
-          <a:prstGeom prst="straightConnector1">
-            <a:avLst/>
-          </a:prstGeom>
-          <a:ln w="12700">
-            <a:solidFill>
-              <a:schemeClr val="accent1">
-                <a:lumMod val="50000"/>
-              </a:schemeClr>
-            </a:solidFill>
-            <a:headEnd type="triangle" w="med" len="med"/>
-            <a:tailEnd type="none"/>
-          </a:ln>
-        </p:spPr>
-        <p:style>
-          <a:lnRef idx="3">
-            <a:schemeClr val="accent6"/>
-          </a:lnRef>
-          <a:fillRef idx="0">
-            <a:schemeClr val="accent6"/>
-          </a:fillRef>
-          <a:effectRef idx="2">
-            <a:schemeClr val="accent6"/>
-          </a:effectRef>
-          <a:fontRef idx="minor">
-            <a:schemeClr val="tx1"/>
-          </a:fontRef>
-        </p:style>
-      </p:cxnSp>
-      <p:pic>
-        <p:nvPicPr>
-          <p:cNvPr id="37" name="Picture 36">
-            <a:extLst>
-              <a:ext uri="{FF2B5EF4-FFF2-40B4-BE49-F238E27FC236}">
-                <a16:creationId xmlns:a16="http://schemas.microsoft.com/office/drawing/2014/main" id="{E67143C2-19A1-B043-ABD8-A44B594D1717}"/>
-              </a:ext>
-            </a:extLst>
-          </p:cNvPr>
-          <p:cNvPicPr>
-            <a:picLocks noChangeAspect="1"/>
-          </p:cNvPicPr>
-          <p:nvPr/>
-        </p:nvPicPr>
-        <p:blipFill rotWithShape="1">
-          <a:blip r:embed="rId8"/>
-          <a:srcRect t="9600" b="9600"/>
-          <a:stretch/>
-        </p:blipFill>
-        <p:spPr>
-          <a:xfrm rot="5400000">
-            <a:off x="1188831" y="5327739"/>
-            <a:ext cx="1765792" cy="449429"/>
-          </a:xfrm>
-          <a:prstGeom prst="rect">
-            <a:avLst/>
-          </a:prstGeom>
-        </p:spPr>
-      </p:pic>
-      <p:pic>
-        <p:nvPicPr>
-          <p:cNvPr id="38" name="Picture 37">
-            <a:extLst>
-              <a:ext uri="{FF2B5EF4-FFF2-40B4-BE49-F238E27FC236}">
-                <a16:creationId xmlns:a16="http://schemas.microsoft.com/office/drawing/2014/main" id="{E73854CF-E519-AB43-88BF-43557A03066C}"/>
-              </a:ext>
-            </a:extLst>
-          </p:cNvPr>
-          <p:cNvPicPr>
-            <a:picLocks noChangeAspect="1"/>
-          </p:cNvPicPr>
-          <p:nvPr/>
-        </p:nvPicPr>
-        <p:blipFill>
-          <a:blip r:embed="rId9"/>
-          <a:stretch>
-            <a:fillRect/>
-          </a:stretch>
-        </p:blipFill>
-        <p:spPr>
-          <a:xfrm>
-            <a:off x="7397375" y="5297693"/>
-            <a:ext cx="2030942" cy="755257"/>
-          </a:xfrm>
-          <a:prstGeom prst="rect">
-            <a:avLst/>
-          </a:prstGeom>
-        </p:spPr>
-      </p:pic>
-      <p:sp>
-        <p:nvSpPr>
-          <p:cNvPr id="39" name="Rectangle 38">
-            <a:extLst>
-              <a:ext uri="{FF2B5EF4-FFF2-40B4-BE49-F238E27FC236}">
-                <a16:creationId xmlns:a16="http://schemas.microsoft.com/office/drawing/2014/main" id="{2C5A8928-2268-9A46-B840-E4D5EFDEE127}"/>
-              </a:ext>
-            </a:extLst>
-          </p:cNvPr>
-          <p:cNvSpPr/>
-          <p:nvPr/>
-        </p:nvSpPr>
-        <p:spPr>
-          <a:xfrm>
-            <a:off x="7722410" y="5997418"/>
-            <a:ext cx="1546413" cy="369012"/>
-          </a:xfrm>
-          <a:prstGeom prst="rect">
-            <a:avLst/>
-          </a:prstGeom>
-        </p:spPr>
-        <p:txBody>
-          <a:bodyPr wrap="none">
-            <a:spAutoFit/>
-          </a:bodyPr>
-          <a:lstStyle/>
-          <a:p>
-            <a:r>
-              <a:rPr lang="en-US" sz="1799" dirty="0">
-                <a:solidFill>
-                  <a:srgbClr val="209999"/>
-                </a:solidFill>
-                <a:ea typeface="Arial Unicode MS" panose="020B0604020202020204" pitchFamily="34" charset="-128"/>
-                <a:cs typeface="Arial Unicode MS" panose="020B0604020202020204" pitchFamily="34" charset="-128"/>
-              </a:rPr>
-              <a:t>WinCC Unified</a:t>
-            </a:r>
-            <a:endParaRPr lang="en-US" sz="1799" dirty="0"/>
-          </a:p>
-        </p:txBody>
-      </p:sp>
-      <p:cxnSp>
-        <p:nvCxnSpPr>
-          <p:cNvPr id="40" name="Straight Arrow Connector 39">
-            <a:extLst>
-              <a:ext uri="{FF2B5EF4-FFF2-40B4-BE49-F238E27FC236}">
-                <a16:creationId xmlns:a16="http://schemas.microsoft.com/office/drawing/2014/main" id="{A68D060D-5D3C-1343-B205-65DAD44D2F4B}"/>
-              </a:ext>
-            </a:extLst>
-          </p:cNvPr>
-          <p:cNvCxnSpPr>
-            <a:cxnSpLocks/>
-          </p:cNvCxnSpPr>
-          <p:nvPr/>
-        </p:nvCxnSpPr>
-        <p:spPr bwMode="auto">
-          <a:xfrm>
-            <a:off x="2071727" y="4223881"/>
-            <a:ext cx="0" cy="498105"/>
-          </a:xfrm>
-          <a:prstGeom prst="straightConnector1">
-            <a:avLst/>
-          </a:prstGeom>
-          <a:ln w="12700">
-            <a:solidFill>
-              <a:schemeClr val="accent1">
-                <a:lumMod val="50000"/>
-              </a:schemeClr>
-            </a:solidFill>
-            <a:headEnd type="triangle" w="med" len="med"/>
-            <a:tailEnd type="none"/>
-          </a:ln>
-        </p:spPr>
-        <p:style>
-          <a:lnRef idx="3">
-            <a:schemeClr val="accent6"/>
-          </a:lnRef>
-          <a:fillRef idx="0">
-            <a:schemeClr val="accent6"/>
-          </a:fillRef>
-          <a:effectRef idx="2">
-            <a:schemeClr val="accent6"/>
-          </a:effectRef>
-          <a:fontRef idx="minor">
-            <a:schemeClr val="tx1"/>
-          </a:fontRef>
-        </p:style>
-      </p:cxnSp>
-      <p:cxnSp>
-        <p:nvCxnSpPr>
-          <p:cNvPr id="41" name="Straight Arrow Connector 40">
-            <a:extLst>
-              <a:ext uri="{FF2B5EF4-FFF2-40B4-BE49-F238E27FC236}">
-                <a16:creationId xmlns:a16="http://schemas.microsoft.com/office/drawing/2014/main" id="{EB3602F1-08AC-0441-962C-790CF9EB0D93}"/>
-              </a:ext>
-            </a:extLst>
-          </p:cNvPr>
-          <p:cNvCxnSpPr>
-            <a:cxnSpLocks/>
-            <a:endCxn id="38" idx="0"/>
-          </p:cNvCxnSpPr>
-          <p:nvPr/>
-        </p:nvCxnSpPr>
-        <p:spPr bwMode="auto">
-          <a:xfrm>
-            <a:off x="8412846" y="4267118"/>
-            <a:ext cx="0" cy="1030575"/>
-          </a:xfrm>
-          <a:prstGeom prst="straightConnector1">
-            <a:avLst/>
-          </a:prstGeom>
-          <a:ln>
-            <a:solidFill>
-              <a:schemeClr val="accent1">
-                <a:lumMod val="50000"/>
-              </a:schemeClr>
-            </a:solidFill>
-            <a:headEnd type="triangle" w="med" len="med"/>
-            <a:tailEnd type="none"/>
-          </a:ln>
-        </p:spPr>
-        <p:style>
-          <a:lnRef idx="3">
-            <a:schemeClr val="accent6"/>
-          </a:lnRef>
-          <a:fillRef idx="0">
-            <a:schemeClr val="accent6"/>
-          </a:fillRef>
-          <a:effectRef idx="2">
-            <a:schemeClr val="accent6"/>
-          </a:effectRef>
-          <a:fontRef idx="minor">
-            <a:schemeClr val="tx1"/>
-          </a:fontRef>
-        </p:style>
-      </p:cxnSp>
-      <p:sp>
-        <p:nvSpPr>
-          <p:cNvPr id="42" name="Rectangle 41">
-            <a:extLst>
-              <a:ext uri="{FF2B5EF4-FFF2-40B4-BE49-F238E27FC236}">
-                <a16:creationId xmlns:a16="http://schemas.microsoft.com/office/drawing/2014/main" id="{33BC88A3-F95B-3246-8F19-04EE22663022}"/>
-              </a:ext>
-            </a:extLst>
-          </p:cNvPr>
-          <p:cNvSpPr/>
-          <p:nvPr/>
-        </p:nvSpPr>
-        <p:spPr>
-          <a:xfrm>
-            <a:off x="4988581" y="3627736"/>
-            <a:ext cx="1125629" cy="276999"/>
-          </a:xfrm>
-          <a:prstGeom prst="rect">
-            <a:avLst/>
-          </a:prstGeom>
-        </p:spPr>
-        <p:txBody>
-          <a:bodyPr wrap="none" anchor="ctr">
-            <a:spAutoFit/>
-          </a:bodyPr>
-          <a:lstStyle/>
-          <a:p>
-            <a:pPr algn="ctr"/>
-            <a:r>
-              <a:rPr lang="en-US" sz="1200" dirty="0">
-                <a:solidFill>
-                  <a:srgbClr val="1F3864"/>
-                </a:solidFill>
-                <a:ea typeface="Arial Unicode MS" panose="020B0604020202020204" pitchFamily="34" charset="-128"/>
-                <a:cs typeface="Arial Unicode MS" panose="020B0604020202020204" pitchFamily="34" charset="-128"/>
-              </a:rPr>
-              <a:t>OPC UA Clients</a:t>
-            </a:r>
-          </a:p>
-        </p:txBody>
-      </p:sp>
-      <p:pic>
-        <p:nvPicPr>
-          <p:cNvPr id="44" name="Graphic 43">
-            <a:extLst>
-              <a:ext uri="{FF2B5EF4-FFF2-40B4-BE49-F238E27FC236}">
-                <a16:creationId xmlns:a16="http://schemas.microsoft.com/office/drawing/2014/main" id="{AA9D2907-E607-024F-9EAE-C8D7C8D3876F}"/>
-              </a:ext>
-            </a:extLst>
-          </p:cNvPr>
-          <p:cNvPicPr>
-            <a:picLocks noChangeAspect="1"/>
-          </p:cNvPicPr>
-          <p:nvPr/>
-        </p:nvPicPr>
-        <p:blipFill rotWithShape="1">
-          <a:blip r:embed="rId10">
-            <a:extLst>
-              <a:ext uri="{96DAC541-7B7A-43D3-8B79-37D633B846F1}">
-                <asvg:svgBlip xmlns:asvg="http://schemas.microsoft.com/office/drawing/2016/SVG/main" r:embed="rId11"/>
-              </a:ext>
-            </a:extLst>
-          </a:blip>
-          <a:srcRect l="18867" t="31648" r="20715" b="31551"/>
-          <a:stretch/>
-        </p:blipFill>
-        <p:spPr>
-          <a:xfrm>
-            <a:off x="9573468" y="2971639"/>
-            <a:ext cx="1538988" cy="347823"/>
-          </a:xfrm>
-          <a:prstGeom prst="rect">
-            <a:avLst/>
-          </a:prstGeom>
-        </p:spPr>
-      </p:pic>
-      <p:sp>
-        <p:nvSpPr>
-          <p:cNvPr id="45" name="Rectangle 44">
-            <a:extLst>
-              <a:ext uri="{FF2B5EF4-FFF2-40B4-BE49-F238E27FC236}">
-                <a16:creationId xmlns:a16="http://schemas.microsoft.com/office/drawing/2014/main" id="{497DAC01-BAAA-6A49-8E82-7346C012524F}"/>
-              </a:ext>
-            </a:extLst>
-          </p:cNvPr>
-          <p:cNvSpPr/>
-          <p:nvPr/>
-        </p:nvSpPr>
-        <p:spPr>
-          <a:xfrm>
-            <a:off x="9733978" y="3274523"/>
-            <a:ext cx="1217969" cy="415026"/>
-          </a:xfrm>
-          <a:prstGeom prst="rect">
-            <a:avLst/>
-          </a:prstGeom>
-        </p:spPr>
-        <p:txBody>
-          <a:bodyPr wrap="none">
-            <a:spAutoFit/>
-          </a:bodyPr>
-          <a:lstStyle/>
-          <a:p>
-            <a:pPr algn="ctr"/>
-            <a:r>
-              <a:rPr lang="en-US" sz="1049" dirty="0"/>
-              <a:t>Database Logger</a:t>
-            </a:r>
-          </a:p>
-          <a:p>
-            <a:pPr algn="ctr"/>
-            <a:r>
-              <a:rPr lang="en-US" sz="1049" dirty="0"/>
-              <a:t>Query via GraphQL</a:t>
-            </a:r>
-          </a:p>
-        </p:txBody>
-      </p:sp>
-      <p:pic>
-        <p:nvPicPr>
-          <p:cNvPr id="46" name="Graphic 45">
-            <a:extLst>
-              <a:ext uri="{FF2B5EF4-FFF2-40B4-BE49-F238E27FC236}">
-                <a16:creationId xmlns:a16="http://schemas.microsoft.com/office/drawing/2014/main" id="{5308A0F4-4C8D-8F4D-8811-0629C8D0B7F5}"/>
-              </a:ext>
-            </a:extLst>
-          </p:cNvPr>
-          <p:cNvPicPr>
-            <a:picLocks noChangeAspect="1"/>
-          </p:cNvPicPr>
-          <p:nvPr/>
-        </p:nvPicPr>
-        <p:blipFill rotWithShape="1">
-          <a:blip r:embed="rId10">
-            <a:extLst>
-              <a:ext uri="{96DAC541-7B7A-43D3-8B79-37D633B846F1}">
-                <asvg:svgBlip xmlns:asvg="http://schemas.microsoft.com/office/drawing/2016/SVG/main" r:embed="rId11"/>
-              </a:ext>
-            </a:extLst>
-          </a:blip>
-          <a:srcRect l="18867" t="31648" r="20715" b="31551"/>
-          <a:stretch/>
-        </p:blipFill>
-        <p:spPr>
-          <a:xfrm rot="16200000">
-            <a:off x="7823771" y="3216323"/>
-            <a:ext cx="859436" cy="194239"/>
-          </a:xfrm>
-          <a:prstGeom prst="rect">
-            <a:avLst/>
-          </a:prstGeom>
-        </p:spPr>
-      </p:pic>
-      <p:sp>
-        <p:nvSpPr>
-          <p:cNvPr id="47" name="Rounded Rectangle 46">
-            <a:extLst>
-              <a:ext uri="{FF2B5EF4-FFF2-40B4-BE49-F238E27FC236}">
-                <a16:creationId xmlns:a16="http://schemas.microsoft.com/office/drawing/2014/main" id="{EAC0CBBB-2AA0-D240-A9AF-3808831CE2AB}"/>
-              </a:ext>
-            </a:extLst>
-          </p:cNvPr>
-          <p:cNvSpPr/>
-          <p:nvPr/>
-        </p:nvSpPr>
-        <p:spPr bwMode="auto">
-          <a:xfrm>
-            <a:off x="8047353" y="2820639"/>
-            <a:ext cx="412365" cy="914681"/>
-          </a:xfrm>
-          <a:custGeom>
-            <a:avLst/>
-            <a:gdLst>
-              <a:gd name="connsiteX0" fmla="*/ 0 w 412365"/>
-              <a:gd name="connsiteY0" fmla="*/ 68729 h 914681"/>
-              <a:gd name="connsiteX1" fmla="*/ 68729 w 412365"/>
-              <a:gd name="connsiteY1" fmla="*/ 0 h 914681"/>
-              <a:gd name="connsiteX2" fmla="*/ 343636 w 412365"/>
-              <a:gd name="connsiteY2" fmla="*/ 0 h 914681"/>
-              <a:gd name="connsiteX3" fmla="*/ 412365 w 412365"/>
-              <a:gd name="connsiteY3" fmla="*/ 68729 h 914681"/>
-              <a:gd name="connsiteX4" fmla="*/ 412365 w 412365"/>
-              <a:gd name="connsiteY4" fmla="*/ 845952 h 914681"/>
-              <a:gd name="connsiteX5" fmla="*/ 343636 w 412365"/>
-              <a:gd name="connsiteY5" fmla="*/ 914681 h 914681"/>
-              <a:gd name="connsiteX6" fmla="*/ 68729 w 412365"/>
-              <a:gd name="connsiteY6" fmla="*/ 914681 h 914681"/>
-              <a:gd name="connsiteX7" fmla="*/ 0 w 412365"/>
-              <a:gd name="connsiteY7" fmla="*/ 845952 h 914681"/>
-              <a:gd name="connsiteX8" fmla="*/ 0 w 412365"/>
-              <a:gd name="connsiteY8" fmla="*/ 68729 h 914681"/>
-            </a:gdLst>
-            <a:ahLst/>
-            <a:cxnLst>
-              <a:cxn ang="0">
-                <a:pos x="connsiteX0" y="connsiteY0"/>
-              </a:cxn>
-              <a:cxn ang="0">
-                <a:pos x="connsiteX1" y="connsiteY1"/>
-              </a:cxn>
-              <a:cxn ang="0">
-                <a:pos x="connsiteX2" y="connsiteY2"/>
-              </a:cxn>
-              <a:cxn ang="0">
-                <a:pos x="connsiteX3" y="connsiteY3"/>
-              </a:cxn>
-              <a:cxn ang="0">
-                <a:pos x="connsiteX4" y="connsiteY4"/>
-              </a:cxn>
-              <a:cxn ang="0">
-                <a:pos x="connsiteX5" y="connsiteY5"/>
-              </a:cxn>
-              <a:cxn ang="0">
-                <a:pos x="connsiteX6" y="connsiteY6"/>
-              </a:cxn>
-              <a:cxn ang="0">
-                <a:pos x="connsiteX7" y="connsiteY7"/>
-              </a:cxn>
-              <a:cxn ang="0">
-                <a:pos x="connsiteX8" y="connsiteY8"/>
-              </a:cxn>
-            </a:cxnLst>
-            <a:rect l="l" t="t" r="r" b="b"/>
-            <a:pathLst>
-              <a:path w="412365" h="914681" extrusionOk="0">
-                <a:moveTo>
-                  <a:pt x="0" y="68729"/>
-                </a:moveTo>
-                <a:cubicBezTo>
-                  <a:pt x="468" y="31654"/>
-                  <a:pt x="36372" y="322"/>
-                  <a:pt x="68729" y="0"/>
-                </a:cubicBezTo>
-                <a:cubicBezTo>
-                  <a:pt x="147767" y="5628"/>
-                  <a:pt x="246531" y="-12785"/>
-                  <a:pt x="343636" y="0"/>
-                </a:cubicBezTo>
-                <a:cubicBezTo>
-                  <a:pt x="381395" y="-3838"/>
-                  <a:pt x="409757" y="37717"/>
-                  <a:pt x="412365" y="68729"/>
-                </a:cubicBezTo>
-                <a:cubicBezTo>
-                  <a:pt x="361841" y="291842"/>
-                  <a:pt x="363193" y="596903"/>
-                  <a:pt x="412365" y="845952"/>
-                </a:cubicBezTo>
-                <a:cubicBezTo>
-                  <a:pt x="415844" y="880823"/>
-                  <a:pt x="385065" y="915999"/>
-                  <a:pt x="343636" y="914681"/>
-                </a:cubicBezTo>
-                <a:cubicBezTo>
-                  <a:pt x="230057" y="936854"/>
-                  <a:pt x="188790" y="919998"/>
-                  <a:pt x="68729" y="914681"/>
-                </a:cubicBezTo>
-                <a:cubicBezTo>
-                  <a:pt x="29801" y="914838"/>
-                  <a:pt x="-1400" y="884599"/>
-                  <a:pt x="0" y="845952"/>
-                </a:cubicBezTo>
-                <a:cubicBezTo>
-                  <a:pt x="58113" y="587141"/>
-                  <a:pt x="68708" y="364908"/>
-                  <a:pt x="0" y="68729"/>
-                </a:cubicBezTo>
-                <a:close/>
-              </a:path>
-            </a:pathLst>
-          </a:custGeom>
-          <a:noFill/>
-          <a:ln w="12700" cap="flat" cmpd="sng" algn="ctr">
-            <a:solidFill>
-              <a:schemeClr val="accent1">
-                <a:lumMod val="50000"/>
-              </a:schemeClr>
-            </a:solidFill>
-            <a:prstDash val="solid"/>
-            <a:round/>
-            <a:headEnd type="none" w="med" len="med"/>
-            <a:tailEnd type="none" w="med" len="med"/>
-            <a:extLst>
-              <a:ext uri="{C807C97D-BFC1-408E-A445-0C87EB9F89A2}">
-                <ask:lineSketchStyleProps xmlns:ask="http://schemas.microsoft.com/office/drawing/2018/sketchyshapes" sd="2300883730">
-                  <a:prstGeom prst="roundRect">
-                    <a:avLst/>
-                  </a:prstGeom>
-                  <ask:type>
-                    <ask:lineSketchCurved/>
-                  </ask:type>
-                </ask:lineSketchStyleProps>
-              </a:ext>
-            </a:extLst>
-          </a:ln>
-        </p:spPr>
-        <p:style>
-          <a:lnRef idx="0">
-            <a:scrgbClr r="0" g="0" b="0"/>
-          </a:lnRef>
-          <a:fillRef idx="0">
-            <a:scrgbClr r="0" g="0" b="0"/>
-          </a:fillRef>
-          <a:effectRef idx="0">
-            <a:scrgbClr r="0" g="0" b="0"/>
-          </a:effectRef>
-          <a:fontRef idx="minor">
-            <a:schemeClr val="dk1"/>
-          </a:fontRef>
-        </p:style>
-        <p:txBody>
-          <a:bodyPr wrap="square" lIns="107944" tIns="53972" rIns="107944" bIns="53972" numCol="1" spcCol="72000" rtlCol="0" anchor="ctr">
-            <a:noAutofit/>
-          </a:bodyPr>
-          <a:lstStyle/>
-          <a:p>
-            <a:pPr algn="ctr">
-              <a:lnSpc>
-                <a:spcPct val="110000"/>
-              </a:lnSpc>
-              <a:spcBef>
-                <a:spcPct val="0"/>
-              </a:spcBef>
-              <a:buFont typeface="Wingdings" charset="0"/>
-              <a:buNone/>
-            </a:pPr>
-            <a:endParaRPr lang="en-US" sz="1799" dirty="0">
-              <a:solidFill>
-                <a:schemeClr val="tx1"/>
-              </a:solidFill>
-              <a:ea typeface="Arial Unicode MS" panose="020B0604020202020204" pitchFamily="34" charset="-128"/>
-              <a:cs typeface="Arial Unicode MS" panose="020B0604020202020204" pitchFamily="34" charset="-128"/>
-            </a:endParaRPr>
-          </a:p>
-        </p:txBody>
-      </p:sp>
-      <p:pic>
-        <p:nvPicPr>
-          <p:cNvPr id="56" name="Picture 55" descr="Text, whiteboard&#10;&#10;Description automatically generated">
-            <a:extLst>
-              <a:ext uri="{FF2B5EF4-FFF2-40B4-BE49-F238E27FC236}">
-                <a16:creationId xmlns:a16="http://schemas.microsoft.com/office/drawing/2014/main" id="{1E99B65F-79BD-1646-B132-D33CFB5E8B54}"/>
-              </a:ext>
-            </a:extLst>
-          </p:cNvPr>
-          <p:cNvPicPr>
-            <a:picLocks noChangeAspect="1"/>
-          </p:cNvPicPr>
-          <p:nvPr/>
-        </p:nvPicPr>
-        <p:blipFill>
-          <a:blip r:embed="rId12"/>
-          <a:stretch>
-            <a:fillRect/>
-          </a:stretch>
-        </p:blipFill>
-        <p:spPr>
-          <a:xfrm>
-            <a:off x="1329179" y="557241"/>
-            <a:ext cx="3787391" cy="1578774"/>
-          </a:xfrm>
-          <a:custGeom>
-            <a:avLst/>
-            <a:gdLst>
-              <a:gd name="connsiteX0" fmla="*/ 0 w 3787391"/>
-              <a:gd name="connsiteY0" fmla="*/ 0 h 1578774"/>
-              <a:gd name="connsiteX1" fmla="*/ 3787391 w 3787391"/>
-              <a:gd name="connsiteY1" fmla="*/ 0 h 1578774"/>
-              <a:gd name="connsiteX2" fmla="*/ 3787391 w 3787391"/>
-              <a:gd name="connsiteY2" fmla="*/ 1578774 h 1578774"/>
-              <a:gd name="connsiteX3" fmla="*/ 0 w 3787391"/>
-              <a:gd name="connsiteY3" fmla="*/ 1578774 h 1578774"/>
-              <a:gd name="connsiteX4" fmla="*/ 0 w 3787391"/>
-              <a:gd name="connsiteY4" fmla="*/ 0 h 1578774"/>
-            </a:gdLst>
-            <a:ahLst/>
-            <a:cxnLst>
-              <a:cxn ang="0">
-                <a:pos x="connsiteX0" y="connsiteY0"/>
-              </a:cxn>
-              <a:cxn ang="0">
-                <a:pos x="connsiteX1" y="connsiteY1"/>
-              </a:cxn>
-              <a:cxn ang="0">
-                <a:pos x="connsiteX2" y="connsiteY2"/>
-              </a:cxn>
-              <a:cxn ang="0">
-                <a:pos x="connsiteX3" y="connsiteY3"/>
-              </a:cxn>
-              <a:cxn ang="0">
-                <a:pos x="connsiteX4" y="connsiteY4"/>
-              </a:cxn>
-            </a:cxnLst>
-            <a:rect l="l" t="t" r="r" b="b"/>
-            <a:pathLst>
-              <a:path w="3787391" h="1578774" extrusionOk="0">
-                <a:moveTo>
-                  <a:pt x="0" y="0"/>
-                </a:moveTo>
-                <a:cubicBezTo>
-                  <a:pt x="982231" y="118645"/>
-                  <a:pt x="2164460" y="116012"/>
-                  <a:pt x="3787391" y="0"/>
-                </a:cubicBezTo>
-                <a:cubicBezTo>
-                  <a:pt x="3719900" y="162121"/>
-                  <a:pt x="3882158" y="1157209"/>
-                  <a:pt x="3787391" y="1578774"/>
-                </a:cubicBezTo>
-                <a:cubicBezTo>
-                  <a:pt x="3171391" y="1713374"/>
-                  <a:pt x="437850" y="1421578"/>
-                  <a:pt x="0" y="1578774"/>
-                </a:cubicBezTo>
-                <a:cubicBezTo>
-                  <a:pt x="33088" y="1161489"/>
-                  <a:pt x="-105046" y="467393"/>
-                  <a:pt x="0" y="0"/>
-                </a:cubicBezTo>
-                <a:close/>
-              </a:path>
-            </a:pathLst>
-          </a:custGeom>
-          <a:noFill/>
-          <a:ln w="9525" cap="flat" cmpd="sng" algn="ctr">
-            <a:solidFill>
-              <a:schemeClr val="tx2">
-                <a:lumMod val="75000"/>
-              </a:schemeClr>
-            </a:solidFill>
-            <a:prstDash val="solid"/>
-            <a:round/>
-            <a:headEnd type="none" w="med" len="med"/>
-            <a:tailEnd type="none" w="med" len="med"/>
-            <a:extLst>
-              <a:ext uri="{C807C97D-BFC1-408E-A445-0C87EB9F89A2}">
-                <ask:lineSketchStyleProps xmlns:ask="http://schemas.microsoft.com/office/drawing/2018/sketchyshapes" sd="1219033472">
-                  <a:prstGeom prst="rect">
-                    <a:avLst/>
-                  </a:prstGeom>
-                  <ask:type>
-                    <ask:lineSketchCurved/>
-                  </ask:type>
-                </ask:lineSketchStyleProps>
-              </a:ext>
-            </a:extLst>
-          </a:ln>
-        </p:spPr>
-        <p:style>
-          <a:lnRef idx="0">
-            <a:scrgbClr r="0" g="0" b="0"/>
-          </a:lnRef>
-          <a:fillRef idx="0">
-            <a:scrgbClr r="0" g="0" b="0"/>
-          </a:fillRef>
-          <a:effectRef idx="0">
-            <a:scrgbClr r="0" g="0" b="0"/>
-          </a:effectRef>
-          <a:fontRef idx="minor">
-            <a:schemeClr val="dk1"/>
-          </a:fontRef>
-        </p:style>
-      </p:pic>
-      <p:pic>
-        <p:nvPicPr>
-          <p:cNvPr id="58" name="Picture 57" descr="Graphical user interface, text, application, email&#10;&#10;Description automatically generated">
-            <a:extLst>
-              <a:ext uri="{FF2B5EF4-FFF2-40B4-BE49-F238E27FC236}">
-                <a16:creationId xmlns:a16="http://schemas.microsoft.com/office/drawing/2014/main" id="{2D78D672-0751-994F-925C-E7359896250F}"/>
-              </a:ext>
-            </a:extLst>
-          </p:cNvPr>
-          <p:cNvPicPr>
-            <a:picLocks noChangeAspect="1"/>
-          </p:cNvPicPr>
-          <p:nvPr/>
-        </p:nvPicPr>
-        <p:blipFill>
-          <a:blip r:embed="rId13"/>
-          <a:stretch>
-            <a:fillRect/>
-          </a:stretch>
-        </p:blipFill>
-        <p:spPr>
-          <a:xfrm>
-            <a:off x="7976130" y="557511"/>
-            <a:ext cx="2975818" cy="1894140"/>
-          </a:xfrm>
-          <a:custGeom>
-            <a:avLst/>
-            <a:gdLst>
-              <a:gd name="connsiteX0" fmla="*/ 0 w 2975818"/>
-              <a:gd name="connsiteY0" fmla="*/ 0 h 1894140"/>
-              <a:gd name="connsiteX1" fmla="*/ 2975818 w 2975818"/>
-              <a:gd name="connsiteY1" fmla="*/ 0 h 1894140"/>
-              <a:gd name="connsiteX2" fmla="*/ 2975818 w 2975818"/>
-              <a:gd name="connsiteY2" fmla="*/ 1894140 h 1894140"/>
-              <a:gd name="connsiteX3" fmla="*/ 0 w 2975818"/>
-              <a:gd name="connsiteY3" fmla="*/ 1894140 h 1894140"/>
-              <a:gd name="connsiteX4" fmla="*/ 0 w 2975818"/>
-              <a:gd name="connsiteY4" fmla="*/ 0 h 1894140"/>
-            </a:gdLst>
-            <a:ahLst/>
-            <a:cxnLst>
-              <a:cxn ang="0">
-                <a:pos x="connsiteX0" y="connsiteY0"/>
-              </a:cxn>
-              <a:cxn ang="0">
-                <a:pos x="connsiteX1" y="connsiteY1"/>
-              </a:cxn>
-              <a:cxn ang="0">
-                <a:pos x="connsiteX2" y="connsiteY2"/>
-              </a:cxn>
-              <a:cxn ang="0">
-                <a:pos x="connsiteX3" y="connsiteY3"/>
-              </a:cxn>
-              <a:cxn ang="0">
-                <a:pos x="connsiteX4" y="connsiteY4"/>
-              </a:cxn>
-            </a:cxnLst>
-            <a:rect l="l" t="t" r="r" b="b"/>
-            <a:pathLst>
-              <a:path w="2975818" h="1894140" fill="none" extrusionOk="0">
-                <a:moveTo>
-                  <a:pt x="0" y="0"/>
-                </a:moveTo>
-                <a:cubicBezTo>
-                  <a:pt x="660297" y="-14931"/>
-                  <a:pt x="1969631" y="31643"/>
-                  <a:pt x="2975818" y="0"/>
-                </a:cubicBezTo>
-                <a:cubicBezTo>
-                  <a:pt x="3082030" y="473030"/>
-                  <a:pt x="2865893" y="1467476"/>
-                  <a:pt x="2975818" y="1894140"/>
-                </a:cubicBezTo>
-                <a:cubicBezTo>
-                  <a:pt x="2639919" y="1832086"/>
-                  <a:pt x="471236" y="1840437"/>
-                  <a:pt x="0" y="1894140"/>
-                </a:cubicBezTo>
-                <a:cubicBezTo>
-                  <a:pt x="-26706" y="1526146"/>
-                  <a:pt x="-6715" y="804853"/>
-                  <a:pt x="0" y="0"/>
-                </a:cubicBezTo>
-                <a:close/>
-              </a:path>
-              <a:path w="2975818" h="1894140" stroke="0" extrusionOk="0">
-                <a:moveTo>
-                  <a:pt x="0" y="0"/>
-                </a:moveTo>
-                <a:cubicBezTo>
-                  <a:pt x="992412" y="-5264"/>
-                  <a:pt x="1967788" y="84467"/>
-                  <a:pt x="2975818" y="0"/>
-                </a:cubicBezTo>
-                <a:cubicBezTo>
-                  <a:pt x="2847645" y="460941"/>
-                  <a:pt x="3104968" y="1621137"/>
-                  <a:pt x="2975818" y="1894140"/>
-                </a:cubicBezTo>
-                <a:cubicBezTo>
-                  <a:pt x="2639779" y="2000460"/>
-                  <a:pt x="827958" y="1886491"/>
-                  <a:pt x="0" y="1894140"/>
-                </a:cubicBezTo>
-                <a:cubicBezTo>
-                  <a:pt x="160128" y="987176"/>
-                  <a:pt x="25049" y="573782"/>
-                  <a:pt x="0" y="0"/>
-                </a:cubicBezTo>
-                <a:close/>
-              </a:path>
-            </a:pathLst>
-          </a:custGeom>
-          <a:ln>
-            <a:solidFill>
-              <a:schemeClr val="tx2">
-                <a:lumMod val="75000"/>
-              </a:schemeClr>
-            </a:solidFill>
-            <a:extLst>
-              <a:ext uri="{C807C97D-BFC1-408E-A445-0C87EB9F89A2}">
-                <ask:lineSketchStyleProps xmlns:ask="http://schemas.microsoft.com/office/drawing/2018/sketchyshapes" sd="2650216993">
-                  <a:prstGeom prst="rect">
-                    <a:avLst/>
-                  </a:prstGeom>
-                  <ask:type>
-                    <ask:lineSketchCurved/>
-                  </ask:type>
-                </ask:lineSketchStyleProps>
-              </a:ext>
-            </a:extLst>
-          </a:ln>
-        </p:spPr>
-      </p:pic>
-      <p:sp>
-        <p:nvSpPr>
-          <p:cNvPr id="31" name="TextBox 30">
-            <a:extLst>
-              <a:ext uri="{FF2B5EF4-FFF2-40B4-BE49-F238E27FC236}">
-                <a16:creationId xmlns:a16="http://schemas.microsoft.com/office/drawing/2014/main" id="{809E757D-71CA-0447-90D6-249BB18021CF}"/>
-              </a:ext>
-            </a:extLst>
-          </p:cNvPr>
-          <p:cNvSpPr txBox="1"/>
-          <p:nvPr/>
-        </p:nvSpPr>
-        <p:spPr>
-          <a:xfrm>
-            <a:off x="5110462" y="577095"/>
-            <a:ext cx="1041946" cy="649480"/>
-          </a:xfrm>
-          <a:prstGeom prst="rect">
-            <a:avLst/>
-          </a:prstGeom>
-          <a:noFill/>
-        </p:spPr>
-        <p:txBody>
-          <a:bodyPr wrap="square" lIns="0" tIns="0" rIns="0" bIns="0" rtlCol="0">
-            <a:noAutofit/>
-          </a:bodyPr>
-          <a:lstStyle/>
-          <a:p>
-            <a:pPr algn="ctr">
-              <a:lnSpc>
-                <a:spcPct val="110000"/>
-              </a:lnSpc>
-            </a:pPr>
-            <a:r>
-              <a:rPr lang="en-US" sz="1199" dirty="0">
-                <a:ea typeface="Arial Unicode MS" panose="020B0604020202020204" pitchFamily="34" charset="-128"/>
-                <a:cs typeface="Arial Unicode MS" panose="020B0604020202020204" pitchFamily="34" charset="-128"/>
-              </a:rPr>
-              <a:t>Query Tags</a:t>
-            </a:r>
-          </a:p>
-          <a:p>
-            <a:pPr algn="ctr">
-              <a:lnSpc>
-                <a:spcPct val="110000"/>
-              </a:lnSpc>
-            </a:pPr>
-            <a:r>
-              <a:rPr lang="en-US" sz="1199" dirty="0">
-                <a:ea typeface="Arial Unicode MS" panose="020B0604020202020204" pitchFamily="34" charset="-128"/>
-                <a:cs typeface="Arial Unicode MS" panose="020B0604020202020204" pitchFamily="34" charset="-128"/>
-              </a:rPr>
-              <a:t>Mutate Tags</a:t>
-            </a:r>
-          </a:p>
-          <a:p>
-            <a:pPr algn="ctr">
-              <a:lnSpc>
-                <a:spcPct val="110000"/>
-              </a:lnSpc>
-            </a:pPr>
-            <a:r>
-              <a:rPr lang="en-US" sz="1199" dirty="0">
-                <a:ea typeface="Arial Unicode MS" panose="020B0604020202020204" pitchFamily="34" charset="-128"/>
-                <a:cs typeface="Arial Unicode MS" panose="020B0604020202020204" pitchFamily="34" charset="-128"/>
-              </a:rPr>
-              <a:t>Subscribe Tags</a:t>
-            </a:r>
-          </a:p>
-        </p:txBody>
-      </p:sp>
-      <p:cxnSp>
-        <p:nvCxnSpPr>
-          <p:cNvPr id="63" name="Straight Arrow Connector 62">
-            <a:extLst>
-              <a:ext uri="{FF2B5EF4-FFF2-40B4-BE49-F238E27FC236}">
-                <a16:creationId xmlns:a16="http://schemas.microsoft.com/office/drawing/2014/main" id="{3757A050-6138-7D44-BBD8-F068D40B7217}"/>
-              </a:ext>
-            </a:extLst>
-          </p:cNvPr>
-          <p:cNvCxnSpPr>
-            <a:cxnSpLocks/>
-            <a:endCxn id="48" idx="1"/>
-          </p:cNvCxnSpPr>
-          <p:nvPr/>
-        </p:nvCxnSpPr>
-        <p:spPr bwMode="auto">
-          <a:xfrm>
-            <a:off x="8412846" y="3321026"/>
-            <a:ext cx="1131042" cy="0"/>
-          </a:xfrm>
-          <a:prstGeom prst="straightConnector1">
-            <a:avLst/>
-          </a:prstGeom>
-          <a:ln>
-            <a:headEnd type="none" w="med" len="med"/>
-            <a:tailEnd type="triangle"/>
-          </a:ln>
-        </p:spPr>
-        <p:style>
-          <a:lnRef idx="3">
-            <a:schemeClr val="accent3"/>
-          </a:lnRef>
-          <a:fillRef idx="0">
-            <a:schemeClr val="accent3"/>
-          </a:fillRef>
-          <a:effectRef idx="2">
-            <a:schemeClr val="accent3"/>
-          </a:effectRef>
-          <a:fontRef idx="minor">
-            <a:schemeClr val="tx1"/>
-          </a:fontRef>
-        </p:style>
-      </p:cxnSp>
-      <p:cxnSp>
-        <p:nvCxnSpPr>
-          <p:cNvPr id="34" name="Straight Arrow Connector 33">
-            <a:extLst>
-              <a:ext uri="{FF2B5EF4-FFF2-40B4-BE49-F238E27FC236}">
-                <a16:creationId xmlns:a16="http://schemas.microsoft.com/office/drawing/2014/main" id="{90B60078-D27D-274D-93A8-36ABF65F2877}"/>
-              </a:ext>
-            </a:extLst>
-          </p:cNvPr>
-          <p:cNvCxnSpPr>
-            <a:cxnSpLocks/>
-          </p:cNvCxnSpPr>
-          <p:nvPr/>
-        </p:nvCxnSpPr>
-        <p:spPr bwMode="auto">
-          <a:xfrm>
-            <a:off x="5769458" y="4253543"/>
-            <a:ext cx="0" cy="273359"/>
-          </a:xfrm>
-          <a:prstGeom prst="straightConnector1">
-            <a:avLst/>
-          </a:prstGeom>
-          <a:ln w="12700">
-            <a:solidFill>
-              <a:schemeClr val="accent1">
-                <a:lumMod val="50000"/>
-              </a:schemeClr>
-            </a:solidFill>
-            <a:headEnd type="triangle" w="med" len="med"/>
-            <a:tailEnd type="none"/>
-          </a:ln>
-        </p:spPr>
-        <p:style>
-          <a:lnRef idx="3">
-            <a:schemeClr val="accent6"/>
-          </a:lnRef>
-          <a:fillRef idx="0">
-            <a:schemeClr val="accent6"/>
-          </a:fillRef>
-          <a:effectRef idx="2">
-            <a:schemeClr val="accent6"/>
-          </a:effectRef>
-          <a:fontRef idx="minor">
-            <a:schemeClr val="tx1"/>
-          </a:fontRef>
-        </p:style>
-      </p:cxnSp>
-      <p:pic>
-        <p:nvPicPr>
-          <p:cNvPr id="53" name="Grafik 123">
-            <a:extLst>
-              <a:ext uri="{FF2B5EF4-FFF2-40B4-BE49-F238E27FC236}">
-                <a16:creationId xmlns:a16="http://schemas.microsoft.com/office/drawing/2014/main" id="{4AB12B0F-70F6-D044-8B0E-EAB81F734AC8}"/>
-              </a:ext>
-            </a:extLst>
-          </p:cNvPr>
-          <p:cNvPicPr>
-            <a:picLocks noChangeAspect="1"/>
-          </p:cNvPicPr>
-          <p:nvPr/>
-        </p:nvPicPr>
-        <p:blipFill>
-          <a:blip r:embed="rId4">
-            <a:extLst>
-              <a:ext uri="{96DAC541-7B7A-43D3-8B79-37D633B846F1}">
-                <asvg:svgBlip xmlns:asvg="http://schemas.microsoft.com/office/drawing/2016/SVG/main" r:embed="rId5"/>
-              </a:ext>
-            </a:extLst>
-          </a:blip>
-          <a:stretch>
-            <a:fillRect/>
-          </a:stretch>
-        </p:blipFill>
-        <p:spPr>
-          <a:xfrm>
-            <a:off x="4553301" y="574881"/>
-            <a:ext cx="557161" cy="557161"/>
-          </a:xfrm>
-          <a:prstGeom prst="rect">
-            <a:avLst/>
-          </a:prstGeom>
-        </p:spPr>
-      </p:pic>
-      <p:pic>
-        <p:nvPicPr>
-          <p:cNvPr id="54" name="Picture 53" descr="A picture containing text, clipart&#10;&#10;Description automatically generated">
-            <a:extLst>
-              <a:ext uri="{FF2B5EF4-FFF2-40B4-BE49-F238E27FC236}">
-                <a16:creationId xmlns:a16="http://schemas.microsoft.com/office/drawing/2014/main" id="{C9F0A355-F772-2D45-9319-14068B5C4977}"/>
-              </a:ext>
-            </a:extLst>
-          </p:cNvPr>
-          <p:cNvPicPr>
-            <a:picLocks noChangeAspect="1"/>
-          </p:cNvPicPr>
-          <p:nvPr/>
-        </p:nvPicPr>
-        <p:blipFill>
-          <a:blip r:embed="rId7"/>
-          <a:stretch>
-            <a:fillRect/>
-          </a:stretch>
-        </p:blipFill>
-        <p:spPr>
-          <a:xfrm>
-            <a:off x="7973956" y="350682"/>
-            <a:ext cx="821773" cy="208162"/>
-          </a:xfrm>
-          <a:prstGeom prst="rect">
-            <a:avLst/>
-          </a:prstGeom>
-          <a:noFill/>
-          <a:ln w="9525" cap="flat" cmpd="sng" algn="ctr">
-            <a:solidFill>
-              <a:schemeClr val="dk1"/>
-            </a:solidFill>
-            <a:prstDash val="solid"/>
-            <a:round/>
-            <a:headEnd type="none" w="med" len="med"/>
-            <a:tailEnd type="none" w="med" len="med"/>
-          </a:ln>
-        </p:spPr>
-        <p:style>
-          <a:lnRef idx="0">
-            <a:scrgbClr r="0" g="0" b="0"/>
-          </a:lnRef>
-          <a:fillRef idx="0">
-            <a:scrgbClr r="0" g="0" b="0"/>
-          </a:fillRef>
-          <a:effectRef idx="0">
-            <a:scrgbClr r="0" g="0" b="0"/>
-          </a:effectRef>
-          <a:fontRef idx="minor">
-            <a:schemeClr val="dk1"/>
-          </a:fontRef>
-        </p:style>
-      </p:pic>
-      <p:sp>
-        <p:nvSpPr>
-          <p:cNvPr id="55" name="TextBox 54">
-            <a:extLst>
-              <a:ext uri="{FF2B5EF4-FFF2-40B4-BE49-F238E27FC236}">
-                <a16:creationId xmlns:a16="http://schemas.microsoft.com/office/drawing/2014/main" id="{D5AABC21-2071-D548-8ECD-CA16B545F1B0}"/>
-              </a:ext>
-            </a:extLst>
-          </p:cNvPr>
-          <p:cNvSpPr txBox="1"/>
-          <p:nvPr/>
-        </p:nvSpPr>
-        <p:spPr>
-          <a:xfrm>
-            <a:off x="2459675" y="2174447"/>
-            <a:ext cx="1041946" cy="445458"/>
-          </a:xfrm>
-          <a:prstGeom prst="rect">
-            <a:avLst/>
-          </a:prstGeom>
-          <a:noFill/>
-        </p:spPr>
-        <p:txBody>
-          <a:bodyPr wrap="square" lIns="0" tIns="0" rIns="0" bIns="0" rtlCol="0">
-            <a:noAutofit/>
-          </a:bodyPr>
-          <a:lstStyle/>
-          <a:p>
-            <a:pPr algn="ctr">
-              <a:lnSpc>
-                <a:spcPct val="110000"/>
-              </a:lnSpc>
-            </a:pPr>
-            <a:r>
-              <a:rPr lang="en-US" sz="1199" dirty="0">
-                <a:ea typeface="Arial Unicode MS" panose="020B0604020202020204" pitchFamily="34" charset="-128"/>
-                <a:cs typeface="Arial Unicode MS" panose="020B0604020202020204" pitchFamily="34" charset="-128"/>
-              </a:rPr>
-              <a:t>HTTP</a:t>
-            </a:r>
-          </a:p>
-          <a:p>
-            <a:pPr algn="ctr">
-              <a:lnSpc>
-                <a:spcPct val="110000"/>
-              </a:lnSpc>
-            </a:pPr>
-            <a:r>
-              <a:rPr lang="en-US" sz="1199" dirty="0">
-                <a:ea typeface="Arial Unicode MS" panose="020B0604020202020204" pitchFamily="34" charset="-128"/>
-                <a:cs typeface="Arial Unicode MS" panose="020B0604020202020204" pitchFamily="34" charset="-128"/>
-              </a:rPr>
-              <a:t>Websocket</a:t>
-            </a:r>
-          </a:p>
-        </p:txBody>
-      </p:sp>
-      <p:sp>
-        <p:nvSpPr>
-          <p:cNvPr id="57" name="TextBox 56">
-            <a:extLst>
-              <a:ext uri="{FF2B5EF4-FFF2-40B4-BE49-F238E27FC236}">
-                <a16:creationId xmlns:a16="http://schemas.microsoft.com/office/drawing/2014/main" id="{8855FB50-27C6-7B48-BFA4-76AFDA918C0E}"/>
-              </a:ext>
-            </a:extLst>
-          </p:cNvPr>
-          <p:cNvSpPr txBox="1"/>
-          <p:nvPr/>
-        </p:nvSpPr>
-        <p:spPr>
-          <a:xfrm>
-            <a:off x="6924543" y="2252463"/>
-            <a:ext cx="493759" cy="241911"/>
-          </a:xfrm>
-          <a:prstGeom prst="rect">
-            <a:avLst/>
-          </a:prstGeom>
-          <a:noFill/>
-        </p:spPr>
-        <p:txBody>
-          <a:bodyPr wrap="square" lIns="0" tIns="0" rIns="0" bIns="0" rtlCol="0">
-            <a:noAutofit/>
-          </a:bodyPr>
-          <a:lstStyle/>
-          <a:p>
-            <a:pPr algn="ctr">
-              <a:lnSpc>
-                <a:spcPct val="110000"/>
-              </a:lnSpc>
-            </a:pPr>
-            <a:r>
-              <a:rPr lang="en-US" sz="1199" dirty="0">
-                <a:ea typeface="Arial Unicode MS" panose="020B0604020202020204" pitchFamily="34" charset="-128"/>
-                <a:cs typeface="Arial Unicode MS" panose="020B0604020202020204" pitchFamily="34" charset="-128"/>
-              </a:rPr>
-              <a:t>TCP</a:t>
-            </a:r>
-          </a:p>
-        </p:txBody>
-      </p:sp>
-      <p:sp>
-        <p:nvSpPr>
-          <p:cNvPr id="49" name="TextBox 48">
-            <a:extLst>
-              <a:ext uri="{FF2B5EF4-FFF2-40B4-BE49-F238E27FC236}">
-                <a16:creationId xmlns:a16="http://schemas.microsoft.com/office/drawing/2014/main" id="{26255F1F-7EB2-DD46-B82B-A0B79C8AE47C}"/>
-              </a:ext>
-            </a:extLst>
-          </p:cNvPr>
-          <p:cNvSpPr txBox="1"/>
-          <p:nvPr/>
-        </p:nvSpPr>
-        <p:spPr>
-          <a:xfrm>
-            <a:off x="4803331" y="6224465"/>
-            <a:ext cx="2032929" cy="253916"/>
-          </a:xfrm>
-          <a:prstGeom prst="rect">
-            <a:avLst/>
-          </a:prstGeom>
-          <a:noFill/>
-        </p:spPr>
-        <p:txBody>
-          <a:bodyPr wrap="none" rtlCol="0">
-            <a:spAutoFit/>
-          </a:bodyPr>
-          <a:lstStyle/>
-          <a:p>
-            <a:r>
-              <a:rPr lang="en-US" sz="1050" dirty="0"/>
-              <a:t>Source: https://new.siemens.com</a:t>
-            </a:r>
-          </a:p>
-        </p:txBody>
-      </p:sp>
-      <p:sp>
-        <p:nvSpPr>
-          <p:cNvPr id="59" name="Rectangle 58">
-            <a:extLst>
-              <a:ext uri="{FF2B5EF4-FFF2-40B4-BE49-F238E27FC236}">
-                <a16:creationId xmlns:a16="http://schemas.microsoft.com/office/drawing/2014/main" id="{57C55C32-22AB-F545-A6C5-AFD8D04B56EE}"/>
-              </a:ext>
-            </a:extLst>
-          </p:cNvPr>
-          <p:cNvSpPr/>
-          <p:nvPr/>
-        </p:nvSpPr>
-        <p:spPr>
-          <a:xfrm>
-            <a:off x="4482278" y="289101"/>
-            <a:ext cx="737318" cy="276727"/>
-          </a:xfrm>
-          <a:prstGeom prst="rect">
-            <a:avLst/>
-          </a:prstGeom>
-        </p:spPr>
-        <p:txBody>
-          <a:bodyPr wrap="none">
-            <a:spAutoFit/>
-          </a:bodyPr>
-          <a:lstStyle/>
-          <a:p>
-            <a:r>
-              <a:rPr lang="en-US" sz="1199" dirty="0">
-                <a:solidFill>
-                  <a:srgbClr val="E535AB"/>
-                </a:solidFill>
-                <a:ea typeface="Arial Unicode MS" panose="020B0604020202020204" pitchFamily="34" charset="-128"/>
-                <a:cs typeface="Arial Unicode MS" panose="020B0604020202020204" pitchFamily="34" charset="-128"/>
-              </a:rPr>
-              <a:t>GraphQL</a:t>
-            </a:r>
-            <a:endParaRPr lang="en-US" sz="1799" dirty="0">
-              <a:solidFill>
-                <a:srgbClr val="E535AB"/>
-              </a:solidFill>
-            </a:endParaRPr>
-          </a:p>
-        </p:txBody>
-      </p:sp>
-      <p:pic>
-        <p:nvPicPr>
-          <p:cNvPr id="51" name="Picture 50" descr="A picture containing text, electronics&#10;&#10;Description automatically generated">
-            <a:extLst>
-              <a:ext uri="{FF2B5EF4-FFF2-40B4-BE49-F238E27FC236}">
-                <a16:creationId xmlns:a16="http://schemas.microsoft.com/office/drawing/2014/main" id="{A9FC80C0-B12C-2C49-8DEE-6AE88BF28F29}"/>
-              </a:ext>
-            </a:extLst>
-          </p:cNvPr>
-          <p:cNvPicPr>
-            <a:picLocks noChangeAspect="1"/>
-          </p:cNvPicPr>
-          <p:nvPr/>
-        </p:nvPicPr>
-        <p:blipFill>
-          <a:blip r:embed="rId14"/>
-          <a:stretch>
-            <a:fillRect/>
-          </a:stretch>
-        </p:blipFill>
-        <p:spPr>
-          <a:xfrm>
-            <a:off x="2966315" y="5552453"/>
-            <a:ext cx="935438" cy="826907"/>
-          </a:xfrm>
-          <a:prstGeom prst="rect">
-            <a:avLst/>
-          </a:prstGeom>
-        </p:spPr>
-      </p:pic>
-      <p:cxnSp>
-        <p:nvCxnSpPr>
-          <p:cNvPr id="61" name="Straight Arrow Connector 60">
-            <a:extLst>
-              <a:ext uri="{FF2B5EF4-FFF2-40B4-BE49-F238E27FC236}">
-                <a16:creationId xmlns:a16="http://schemas.microsoft.com/office/drawing/2014/main" id="{BC1E419E-1007-B740-8CCB-501BF27F99BC}"/>
-              </a:ext>
-            </a:extLst>
-          </p:cNvPr>
-          <p:cNvCxnSpPr>
-            <a:cxnSpLocks/>
-          </p:cNvCxnSpPr>
-          <p:nvPr/>
-        </p:nvCxnSpPr>
-        <p:spPr bwMode="auto">
-          <a:xfrm>
-            <a:off x="3434271" y="4233308"/>
-            <a:ext cx="0" cy="1332925"/>
-          </a:xfrm>
-          <a:prstGeom prst="straightConnector1">
-            <a:avLst/>
-          </a:prstGeom>
-          <a:ln w="12700">
-            <a:solidFill>
-              <a:schemeClr val="accent1">
-                <a:lumMod val="50000"/>
-              </a:schemeClr>
-            </a:solidFill>
-            <a:headEnd type="triangle" w="med" len="med"/>
-            <a:tailEnd type="none"/>
-          </a:ln>
-        </p:spPr>
-        <p:style>
-          <a:lnRef idx="3">
-            <a:schemeClr val="accent6"/>
-          </a:lnRef>
-          <a:fillRef idx="0">
-            <a:schemeClr val="accent6"/>
-          </a:fillRef>
-          <a:effectRef idx="2">
-            <a:schemeClr val="accent6"/>
-          </a:effectRef>
-          <a:fontRef idx="minor">
-            <a:schemeClr val="tx1"/>
-          </a:fontRef>
-        </p:style>
-      </p:cxnSp>
-      <p:cxnSp>
-        <p:nvCxnSpPr>
-          <p:cNvPr id="1032" name="Straight Connector 1031">
-            <a:extLst>
-              <a:ext uri="{FF2B5EF4-FFF2-40B4-BE49-F238E27FC236}">
-                <a16:creationId xmlns:a16="http://schemas.microsoft.com/office/drawing/2014/main" id="{C30D29A4-67A4-F449-8DD5-FFF14DBCC1F2}"/>
-              </a:ext>
-            </a:extLst>
-          </p:cNvPr>
-          <p:cNvCxnSpPr/>
-          <p:nvPr/>
-        </p:nvCxnSpPr>
-        <p:spPr>
-          <a:xfrm>
-            <a:off x="2071727" y="4223881"/>
-            <a:ext cx="7855927" cy="43237"/>
-          </a:xfrm>
-          <a:prstGeom prst="line">
-            <a:avLst/>
-          </a:prstGeom>
-          <a:ln w="76200" cap="rnd">
-            <a:solidFill>
-              <a:schemeClr val="accent1">
-                <a:lumMod val="50000"/>
-              </a:schemeClr>
-            </a:solidFill>
-            <a:round/>
-          </a:ln>
-        </p:spPr>
-        <p:style>
-          <a:lnRef idx="1">
-            <a:schemeClr val="accent1"/>
-          </a:lnRef>
-          <a:fillRef idx="0">
-            <a:schemeClr val="accent1"/>
-          </a:fillRef>
-          <a:effectRef idx="0">
-            <a:schemeClr val="accent1"/>
-          </a:effectRef>
-          <a:fontRef idx="minor">
-            <a:schemeClr val="tx1"/>
-          </a:fontRef>
-        </p:style>
-      </p:cxnSp>
-      <p:sp>
-        <p:nvSpPr>
-          <p:cNvPr id="88" name="Rectangle 87">
-            <a:extLst>
-              <a:ext uri="{FF2B5EF4-FFF2-40B4-BE49-F238E27FC236}">
-                <a16:creationId xmlns:a16="http://schemas.microsoft.com/office/drawing/2014/main" id="{001E76B1-D191-0B48-AE46-4478B0AFC8DE}"/>
-              </a:ext>
-            </a:extLst>
-          </p:cNvPr>
-          <p:cNvSpPr/>
-          <p:nvPr/>
-        </p:nvSpPr>
-        <p:spPr>
-          <a:xfrm>
-            <a:off x="2213757" y="4235630"/>
-            <a:ext cx="1083951" cy="261610"/>
-          </a:xfrm>
-          <a:prstGeom prst="rect">
-            <a:avLst/>
-          </a:prstGeom>
-        </p:spPr>
-        <p:txBody>
-          <a:bodyPr wrap="none" anchor="ctr">
-            <a:spAutoFit/>
-          </a:bodyPr>
-          <a:lstStyle/>
-          <a:p>
-            <a:pPr algn="ctr"/>
-            <a:r>
-              <a:rPr lang="en-US" sz="1100" dirty="0">
-                <a:solidFill>
-                  <a:srgbClr val="1F3864"/>
-                </a:solidFill>
-                <a:ea typeface="Arial Unicode MS" panose="020B0604020202020204" pitchFamily="34" charset="-128"/>
-                <a:cs typeface="Arial Unicode MS" panose="020B0604020202020204" pitchFamily="34" charset="-128"/>
-              </a:rPr>
-              <a:t>OPC UA Servers</a:t>
-            </a:r>
-          </a:p>
-        </p:txBody>
-      </p:sp>
-      <p:cxnSp>
-        <p:nvCxnSpPr>
-          <p:cNvPr id="89" name="Straight Arrow Connector 88">
-            <a:extLst>
-              <a:ext uri="{FF2B5EF4-FFF2-40B4-BE49-F238E27FC236}">
-                <a16:creationId xmlns:a16="http://schemas.microsoft.com/office/drawing/2014/main" id="{DE5FC841-3C8E-9A44-A0FE-C6C71C503646}"/>
-              </a:ext>
-            </a:extLst>
-          </p:cNvPr>
-          <p:cNvCxnSpPr>
-            <a:cxnSpLocks/>
-          </p:cNvCxnSpPr>
-          <p:nvPr/>
-        </p:nvCxnSpPr>
-        <p:spPr bwMode="auto">
-          <a:xfrm flipV="1">
-            <a:off x="3594530" y="3904735"/>
-            <a:ext cx="0" cy="355264"/>
-          </a:xfrm>
-          <a:prstGeom prst="straightConnector1">
-            <a:avLst/>
-          </a:prstGeom>
-          <a:ln w="12700">
-            <a:solidFill>
-              <a:schemeClr val="accent1">
-                <a:lumMod val="50000"/>
-              </a:schemeClr>
-            </a:solidFill>
-            <a:headEnd type="none" w="med" len="med"/>
-            <a:tailEnd type="triangle"/>
-          </a:ln>
-        </p:spPr>
-        <p:style>
-          <a:lnRef idx="3">
-            <a:schemeClr val="accent6"/>
-          </a:lnRef>
-          <a:fillRef idx="0">
-            <a:schemeClr val="accent6"/>
-          </a:fillRef>
-          <a:effectRef idx="2">
-            <a:schemeClr val="accent6"/>
-          </a:effectRef>
-          <a:fontRef idx="minor">
-            <a:schemeClr val="tx1"/>
-          </a:fontRef>
-        </p:style>
-      </p:cxnSp>
-      <p:cxnSp>
-        <p:nvCxnSpPr>
-          <p:cNvPr id="92" name="Straight Arrow Connector 91">
-            <a:extLst>
-              <a:ext uri="{FF2B5EF4-FFF2-40B4-BE49-F238E27FC236}">
-                <a16:creationId xmlns:a16="http://schemas.microsoft.com/office/drawing/2014/main" id="{11C886CA-921D-4648-B3FF-AAEA1E480809}"/>
-              </a:ext>
-            </a:extLst>
-          </p:cNvPr>
-          <p:cNvCxnSpPr>
-            <a:cxnSpLocks/>
-          </p:cNvCxnSpPr>
-          <p:nvPr/>
-        </p:nvCxnSpPr>
-        <p:spPr bwMode="auto">
-          <a:xfrm flipV="1">
-            <a:off x="4798435" y="3904735"/>
-            <a:ext cx="0" cy="355264"/>
-          </a:xfrm>
-          <a:prstGeom prst="straightConnector1">
-            <a:avLst/>
-          </a:prstGeom>
-          <a:ln w="12700">
-            <a:solidFill>
-              <a:schemeClr val="accent1">
-                <a:lumMod val="50000"/>
-              </a:schemeClr>
-            </a:solidFill>
-            <a:headEnd type="none" w="med" len="med"/>
-            <a:tailEnd type="triangle"/>
-          </a:ln>
-        </p:spPr>
-        <p:style>
-          <a:lnRef idx="3">
-            <a:schemeClr val="accent6"/>
-          </a:lnRef>
-          <a:fillRef idx="0">
-            <a:schemeClr val="accent6"/>
-          </a:fillRef>
-          <a:effectRef idx="2">
-            <a:schemeClr val="accent6"/>
-          </a:effectRef>
-          <a:fontRef idx="minor">
-            <a:schemeClr val="tx1"/>
-          </a:fontRef>
-        </p:style>
-      </p:cxnSp>
-      <p:cxnSp>
-        <p:nvCxnSpPr>
-          <p:cNvPr id="93" name="Straight Arrow Connector 92">
-            <a:extLst>
-              <a:ext uri="{FF2B5EF4-FFF2-40B4-BE49-F238E27FC236}">
-                <a16:creationId xmlns:a16="http://schemas.microsoft.com/office/drawing/2014/main" id="{7D57C230-ED4B-A949-A1B9-9EAB65B9824F}"/>
-              </a:ext>
-            </a:extLst>
-          </p:cNvPr>
-          <p:cNvCxnSpPr>
-            <a:cxnSpLocks/>
-          </p:cNvCxnSpPr>
-          <p:nvPr/>
-        </p:nvCxnSpPr>
-        <p:spPr bwMode="auto">
-          <a:xfrm flipV="1">
-            <a:off x="6805642" y="3904735"/>
-            <a:ext cx="0" cy="355264"/>
-          </a:xfrm>
-          <a:prstGeom prst="straightConnector1">
-            <a:avLst/>
-          </a:prstGeom>
-          <a:ln w="12700">
-            <a:solidFill>
-              <a:schemeClr val="accent1">
-                <a:lumMod val="50000"/>
-              </a:schemeClr>
-            </a:solidFill>
-            <a:headEnd type="none" w="med" len="med"/>
-            <a:tailEnd type="triangle"/>
-          </a:ln>
-        </p:spPr>
-        <p:style>
-          <a:lnRef idx="3">
-            <a:schemeClr val="accent6"/>
-          </a:lnRef>
-          <a:fillRef idx="0">
-            <a:schemeClr val="accent6"/>
-          </a:fillRef>
-          <a:effectRef idx="2">
-            <a:schemeClr val="accent6"/>
-          </a:effectRef>
-          <a:fontRef idx="minor">
-            <a:schemeClr val="tx1"/>
-          </a:fontRef>
-        </p:style>
-      </p:cxnSp>
-      <p:cxnSp>
-        <p:nvCxnSpPr>
-          <p:cNvPr id="94" name="Straight Arrow Connector 93">
-            <a:extLst>
-              <a:ext uri="{FF2B5EF4-FFF2-40B4-BE49-F238E27FC236}">
-                <a16:creationId xmlns:a16="http://schemas.microsoft.com/office/drawing/2014/main" id="{B84A570A-2C44-B84C-8D3C-70A28EFCC0FE}"/>
-              </a:ext>
-            </a:extLst>
-          </p:cNvPr>
-          <p:cNvCxnSpPr>
-            <a:cxnSpLocks/>
-          </p:cNvCxnSpPr>
-          <p:nvPr/>
-        </p:nvCxnSpPr>
-        <p:spPr bwMode="auto">
-          <a:xfrm flipV="1">
-            <a:off x="8045985" y="3904735"/>
-            <a:ext cx="0" cy="355264"/>
-          </a:xfrm>
-          <a:prstGeom prst="straightConnector1">
-            <a:avLst/>
-          </a:prstGeom>
-          <a:ln w="12700">
-            <a:solidFill>
-              <a:schemeClr val="accent1">
-                <a:lumMod val="50000"/>
-              </a:schemeClr>
-            </a:solidFill>
-            <a:headEnd type="none" w="med" len="med"/>
-            <a:tailEnd type="triangle"/>
-          </a:ln>
-        </p:spPr>
-        <p:style>
-          <a:lnRef idx="3">
-            <a:schemeClr val="accent6"/>
-          </a:lnRef>
-          <a:fillRef idx="0">
-            <a:schemeClr val="accent6"/>
-          </a:fillRef>
-          <a:effectRef idx="2">
-            <a:schemeClr val="accent6"/>
-          </a:effectRef>
-          <a:fontRef idx="minor">
-            <a:schemeClr val="tx1"/>
-          </a:fontRef>
-        </p:style>
-      </p:cxnSp>
-    </p:spTree>
-    <p:extLst>
-      <p:ext uri="{BB962C8B-B14F-4D97-AF65-F5344CB8AC3E}">
-        <p14:creationId xmlns:p14="http://schemas.microsoft.com/office/powerpoint/2010/main" val="444409238"/>
-      </p:ext>
-    </p:extLst>
-  </p:cSld>
-  <p:clrMapOvr>
-    <a:masterClrMapping/>
-  </p:clrMapOvr>
-</p:sld>
-</file>
-
-<file path=ppt/slides/slide2.xml><?xml version="1.0" encoding="utf-8"?>
-<p:sld xmlns:a="http://schemas.openxmlformats.org/drawingml/2006/main" xmlns:r="http://schemas.openxmlformats.org/officeDocument/2006/relationships" xmlns:p="http://schemas.openxmlformats.org/presentationml/2006/main">
-  <p:cSld>
-    <p:spTree>
-      <p:nvGrpSpPr>
-        <p:cNvPr id="1" name=""/>
-        <p:cNvGrpSpPr/>
-        <p:nvPr/>
-      </p:nvGrpSpPr>
-      <p:grpSpPr>
-        <a:xfrm>
-          <a:off x="0" y="0"/>
-          <a:ext cx="0" cy="0"/>
-          <a:chOff x="0" y="0"/>
-          <a:chExt cx="0" cy="0"/>
-        </a:xfrm>
-      </p:grpSpPr>
-      <p:pic>
-        <p:nvPicPr>
-          <p:cNvPr id="22" name="Picture 21" descr="Logo&#10;&#10;Description automatically generated">
-            <a:extLst>
-              <a:ext uri="{FF2B5EF4-FFF2-40B4-BE49-F238E27FC236}">
-                <a16:creationId xmlns:a16="http://schemas.microsoft.com/office/drawing/2014/main" id="{8BDA4F59-2BD4-D94E-8A44-E2F37080C90E}"/>
-              </a:ext>
-            </a:extLst>
-          </p:cNvPr>
-          <p:cNvPicPr>
-            <a:picLocks noChangeAspect="1"/>
-          </p:cNvPicPr>
-          <p:nvPr/>
-        </p:nvPicPr>
-        <p:blipFill>
-          <a:blip r:embed="rId2"/>
-          <a:stretch>
-            <a:fillRect/>
-          </a:stretch>
-        </p:blipFill>
-        <p:spPr>
-          <a:xfrm>
-            <a:off x="4094061" y="3299123"/>
-            <a:ext cx="1504846" cy="842714"/>
-          </a:xfrm>
-          <a:prstGeom prst="rect">
-            <a:avLst/>
-          </a:prstGeom>
-        </p:spPr>
-      </p:pic>
-      <p:pic>
-        <p:nvPicPr>
-          <p:cNvPr id="14" name="Picture 13" descr="Diagram&#10;&#10;Description automatically generated">
-            <a:extLst>
-              <a:ext uri="{FF2B5EF4-FFF2-40B4-BE49-F238E27FC236}">
-                <a16:creationId xmlns:a16="http://schemas.microsoft.com/office/drawing/2014/main" id="{8B8D8775-3B36-9342-9775-1B1F2F1FE453}"/>
-              </a:ext>
-            </a:extLst>
-          </p:cNvPr>
-          <p:cNvPicPr>
-            <a:picLocks noChangeAspect="1"/>
-          </p:cNvPicPr>
-          <p:nvPr/>
-        </p:nvPicPr>
-        <p:blipFill rotWithShape="1">
-          <a:blip r:embed="rId3"/>
-          <a:srcRect l="23906"/>
-          <a:stretch/>
-        </p:blipFill>
-        <p:spPr>
-          <a:xfrm>
-            <a:off x="3529866" y="4855609"/>
-            <a:ext cx="2248413" cy="1409284"/>
-          </a:xfrm>
-          <a:prstGeom prst="rect">
-            <a:avLst/>
-          </a:prstGeom>
-        </p:spPr>
-      </p:pic>
-      <p:sp>
-        <p:nvSpPr>
-          <p:cNvPr id="48" name="Rectangle 47">
-            <a:extLst>
-              <a:ext uri="{FF2B5EF4-FFF2-40B4-BE49-F238E27FC236}">
-                <a16:creationId xmlns:a16="http://schemas.microsoft.com/office/drawing/2014/main" id="{EDD3DEBB-80D2-4E4B-B78C-F5A63DC81872}"/>
-              </a:ext>
-            </a:extLst>
-          </p:cNvPr>
-          <p:cNvSpPr/>
-          <p:nvPr/>
-        </p:nvSpPr>
-        <p:spPr bwMode="auto">
-          <a:xfrm>
-            <a:off x="9543888" y="2403417"/>
-            <a:ext cx="1606654" cy="1318386"/>
-          </a:xfrm>
-          <a:custGeom>
-            <a:avLst/>
-            <a:gdLst>
-              <a:gd name="connsiteX0" fmla="*/ 0 w 1606654"/>
-              <a:gd name="connsiteY0" fmla="*/ 0 h 1318386"/>
-              <a:gd name="connsiteX1" fmla="*/ 1606654 w 1606654"/>
-              <a:gd name="connsiteY1" fmla="*/ 0 h 1318386"/>
-              <a:gd name="connsiteX2" fmla="*/ 1606654 w 1606654"/>
-              <a:gd name="connsiteY2" fmla="*/ 1318386 h 1318386"/>
-              <a:gd name="connsiteX3" fmla="*/ 0 w 1606654"/>
-              <a:gd name="connsiteY3" fmla="*/ 1318386 h 1318386"/>
-              <a:gd name="connsiteX4" fmla="*/ 0 w 1606654"/>
-              <a:gd name="connsiteY4" fmla="*/ 0 h 1318386"/>
-            </a:gdLst>
-            <a:ahLst/>
-            <a:cxnLst>
-              <a:cxn ang="0">
-                <a:pos x="connsiteX0" y="connsiteY0"/>
-              </a:cxn>
-              <a:cxn ang="0">
-                <a:pos x="connsiteX1" y="connsiteY1"/>
-              </a:cxn>
-              <a:cxn ang="0">
-                <a:pos x="connsiteX2" y="connsiteY2"/>
-              </a:cxn>
-              <a:cxn ang="0">
-                <a:pos x="connsiteX3" y="connsiteY3"/>
-              </a:cxn>
-              <a:cxn ang="0">
-                <a:pos x="connsiteX4" y="connsiteY4"/>
-              </a:cxn>
-            </a:cxnLst>
-            <a:rect l="l" t="t" r="r" b="b"/>
-            <a:pathLst>
-              <a:path w="1606654" h="1318386" fill="none" extrusionOk="0">
-                <a:moveTo>
-                  <a:pt x="0" y="0"/>
-                </a:moveTo>
-                <a:cubicBezTo>
-                  <a:pt x="802439" y="62215"/>
-                  <a:pt x="1227814" y="126975"/>
-                  <a:pt x="1606654" y="0"/>
-                </a:cubicBezTo>
-                <a:cubicBezTo>
-                  <a:pt x="1592287" y="556093"/>
-                  <a:pt x="1656333" y="808117"/>
-                  <a:pt x="1606654" y="1318386"/>
-                </a:cubicBezTo>
-                <a:cubicBezTo>
-                  <a:pt x="927155" y="1264426"/>
-                  <a:pt x="431094" y="1341151"/>
-                  <a:pt x="0" y="1318386"/>
-                </a:cubicBezTo>
-                <a:cubicBezTo>
-                  <a:pt x="81092" y="661136"/>
-                  <a:pt x="17603" y="326279"/>
-                  <a:pt x="0" y="0"/>
-                </a:cubicBezTo>
-                <a:close/>
-              </a:path>
-              <a:path w="1606654" h="1318386" stroke="0" extrusionOk="0">
-                <a:moveTo>
-                  <a:pt x="0" y="0"/>
-                </a:moveTo>
-                <a:cubicBezTo>
-                  <a:pt x="609611" y="114173"/>
-                  <a:pt x="1069744" y="21419"/>
-                  <a:pt x="1606654" y="0"/>
-                </a:cubicBezTo>
-                <a:cubicBezTo>
-                  <a:pt x="1551215" y="395085"/>
-                  <a:pt x="1590982" y="1178463"/>
-                  <a:pt x="1606654" y="1318386"/>
-                </a:cubicBezTo>
-                <a:cubicBezTo>
-                  <a:pt x="1203886" y="1231688"/>
-                  <a:pt x="725219" y="1324960"/>
-                  <a:pt x="0" y="1318386"/>
-                </a:cubicBezTo>
-                <a:cubicBezTo>
-                  <a:pt x="-55413" y="774259"/>
-                  <a:pt x="111373" y="337374"/>
-                  <a:pt x="0" y="0"/>
-                </a:cubicBezTo>
-                <a:close/>
-              </a:path>
-            </a:pathLst>
-          </a:custGeom>
-          <a:solidFill>
-            <a:schemeClr val="bg1">
-              <a:lumMod val="95000"/>
-            </a:schemeClr>
-          </a:solidFill>
-          <a:ln w="12700">
-            <a:solidFill>
-              <a:schemeClr val="accent1"/>
-            </a:solidFill>
-            <a:miter lim="800000"/>
-            <a:headEnd/>
-            <a:tailEnd/>
-            <a:extLst>
-              <a:ext uri="{C807C97D-BFC1-408E-A445-0C87EB9F89A2}">
-                <ask:lineSketchStyleProps xmlns:ask="http://schemas.microsoft.com/office/drawing/2018/sketchyshapes" sd="661058248">
-                  <a:prstGeom prst="rect">
-                    <a:avLst/>
-                  </a:prstGeom>
-                  <ask:type>
-                    <ask:lineSketchCurved/>
-                  </ask:type>
-                </ask:lineSketchStyleProps>
-              </a:ext>
-            </a:extLst>
-          </a:ln>
-          <a:effectLst/>
-        </p:spPr>
-        <p:txBody>
-          <a:bodyPr wrap="square" lIns="107944" tIns="53972" rIns="107944" bIns="53972" numCol="1" spcCol="72000" rtlCol="0" anchor="ctr">
-            <a:noAutofit/>
-          </a:bodyPr>
-          <a:lstStyle/>
-          <a:p>
-            <a:pPr algn="ctr">
-              <a:lnSpc>
-                <a:spcPct val="110000"/>
-              </a:lnSpc>
-              <a:spcBef>
-                <a:spcPct val="0"/>
-              </a:spcBef>
-              <a:buFont typeface="Wingdings" charset="0"/>
-              <a:buNone/>
-            </a:pPr>
-            <a:endParaRPr lang="en-US" sz="1799" dirty="0">
-              <a:solidFill>
-                <a:srgbClr val="209999"/>
-              </a:solidFill>
-              <a:ea typeface="Arial Unicode MS" panose="020B0604020202020204" pitchFamily="34" charset="-128"/>
-              <a:cs typeface="Arial Unicode MS" panose="020B0604020202020204" pitchFamily="34" charset="-128"/>
-            </a:endParaRPr>
-          </a:p>
-        </p:txBody>
-      </p:sp>
-      <p:pic>
-        <p:nvPicPr>
-          <p:cNvPr id="43" name="Picture 42">
-            <a:extLst>
-              <a:ext uri="{FF2B5EF4-FFF2-40B4-BE49-F238E27FC236}">
-                <a16:creationId xmlns:a16="http://schemas.microsoft.com/office/drawing/2014/main" id="{978D2E29-9C69-4340-AD55-18A11CD06F72}"/>
-              </a:ext>
-            </a:extLst>
-          </p:cNvPr>
-          <p:cNvPicPr>
-            <a:picLocks noChangeAspect="1"/>
-          </p:cNvPicPr>
-          <p:nvPr/>
-        </p:nvPicPr>
-        <p:blipFill>
           <a:blip r:embed="rId4"/>
           <a:stretch>
             <a:fillRect/>
@@ -6938,7 +3708,7 @@
         </p:blipFill>
         <p:spPr>
           <a:xfrm rot="5400000">
-            <a:off x="862229" y="5522700"/>
+            <a:off x="282913" y="5522700"/>
             <a:ext cx="1549104" cy="436927"/>
           </a:xfrm>
           <a:prstGeom prst="rect">
@@ -7601,7 +4371,7 @@
         </p:nvSpPr>
         <p:spPr>
           <a:xfrm>
-            <a:off x="4675729" y="2798330"/>
+            <a:off x="4674758" y="2658526"/>
             <a:ext cx="1760091" cy="454952"/>
           </a:xfrm>
           <a:prstGeom prst="rect">
@@ -7746,8 +4516,8 @@
         </p:nvSpPr>
         <p:spPr>
           <a:xfrm>
-            <a:off x="5003235" y="2471607"/>
-            <a:ext cx="1138437" cy="399773"/>
+            <a:off x="4956806" y="2387955"/>
+            <a:ext cx="1205779" cy="399981"/>
           </a:xfrm>
           <a:prstGeom prst="rect">
             <a:avLst/>
@@ -7759,6 +4529,7 @@
           </a:bodyPr>
           <a:lstStyle/>
           <a:p>
+            <a:pPr algn="ctr"/>
             <a:r>
               <a:rPr lang="en-US" sz="1999" b="1" i="1" dirty="0">
                 <a:solidFill>
@@ -7766,8 +4537,9 @@
                     <a:lumMod val="25000"/>
                   </a:schemeClr>
                 </a:solidFill>
+                <a:latin typeface="Eras Medium ITC" panose="020F0502020204030204" pitchFamily="34" charset="0"/>
                 <a:ea typeface="Arial Unicode MS" panose="020B0604020202020204" pitchFamily="34" charset="-128"/>
-                <a:cs typeface="Arial Unicode MS" panose="020B0604020202020204" pitchFamily="34" charset="-128"/>
+                <a:cs typeface="Eras Medium ITC" panose="020F0502020204030204" pitchFamily="34" charset="0"/>
               </a:rPr>
               <a:t>Gateway</a:t>
             </a:r>
@@ -7777,6 +4549,8 @@
                   <a:lumMod val="25000"/>
                 </a:schemeClr>
               </a:solidFill>
+              <a:latin typeface="Eras Medium ITC" panose="020F0502020204030204" pitchFamily="34" charset="0"/>
+              <a:cs typeface="Eras Medium ITC" panose="020F0502020204030204" pitchFamily="34" charset="0"/>
             </a:endParaRPr>
           </a:p>
         </p:txBody>
@@ -8323,7 +5097,7 @@
         </p:nvCxnSpPr>
         <p:spPr bwMode="auto">
           <a:xfrm>
-            <a:off x="1636781" y="4454400"/>
+            <a:off x="1057465" y="4454400"/>
             <a:ext cx="0" cy="512211"/>
           </a:xfrm>
           <a:prstGeom prst="straightConnector1">
@@ -8375,7 +5149,7 @@
         </p:blipFill>
         <p:spPr>
           <a:xfrm rot="5400000">
-            <a:off x="1360626" y="5542154"/>
+            <a:off x="781310" y="5542154"/>
             <a:ext cx="1765792" cy="449429"/>
           </a:xfrm>
           <a:prstGeom prst="rect">
@@ -8397,7 +5171,7 @@
         </p:nvSpPr>
         <p:spPr>
           <a:xfrm>
-            <a:off x="5860291" y="5976352"/>
+            <a:off x="5280975" y="5976352"/>
             <a:ext cx="1023037" cy="577081"/>
           </a:xfrm>
           <a:prstGeom prst="rect">
@@ -8467,7 +5241,7 @@
         </p:nvCxnSpPr>
         <p:spPr bwMode="auto">
           <a:xfrm>
-            <a:off x="2243522" y="4438296"/>
+            <a:off x="1664206" y="4438296"/>
             <a:ext cx="0" cy="498105"/>
           </a:xfrm>
           <a:prstGeom prst="straightConnector1">
@@ -9185,7 +5959,7 @@
         </p:nvCxnSpPr>
         <p:spPr bwMode="auto">
           <a:xfrm>
-            <a:off x="4705218" y="4470505"/>
+            <a:off x="4125902" y="4470505"/>
             <a:ext cx="0" cy="413467"/>
           </a:xfrm>
           <a:prstGeom prst="straightConnector1">
@@ -9420,7 +6194,7 @@
         </p:nvSpPr>
         <p:spPr>
           <a:xfrm>
-            <a:off x="3678614" y="6180321"/>
+            <a:off x="3099298" y="6180321"/>
             <a:ext cx="2032929" cy="253916"/>
           </a:xfrm>
           <a:prstGeom prst="rect">
@@ -9508,7 +6282,7 @@
         </p:blipFill>
         <p:spPr>
           <a:xfrm>
-            <a:off x="2659732" y="5287141"/>
+            <a:off x="2080416" y="5287141"/>
             <a:ext cx="935438" cy="826907"/>
           </a:xfrm>
           <a:prstGeom prst="rect">
@@ -9532,7 +6306,7 @@
         </p:nvCxnSpPr>
         <p:spPr bwMode="auto">
           <a:xfrm>
-            <a:off x="3138929" y="4447723"/>
+            <a:off x="2559613" y="4447723"/>
             <a:ext cx="0" cy="815772"/>
           </a:xfrm>
           <a:prstGeom prst="straightConnector1">
@@ -9579,7 +6353,7 @@
         </p:nvCxnSpPr>
         <p:spPr>
           <a:xfrm>
-            <a:off x="1636781" y="4442064"/>
+            <a:off x="1057465" y="4442064"/>
             <a:ext cx="4687422" cy="14444"/>
           </a:xfrm>
           <a:prstGeom prst="line">
@@ -9623,7 +6397,7 @@
         </p:nvSpPr>
         <p:spPr>
           <a:xfrm>
-            <a:off x="1995440" y="4191130"/>
+            <a:off x="1416124" y="4191130"/>
             <a:ext cx="1083951" cy="261610"/>
           </a:xfrm>
           <a:prstGeom prst="rect">
@@ -9666,7 +6440,7 @@
         </p:nvCxnSpPr>
         <p:spPr bwMode="auto">
           <a:xfrm flipV="1">
-            <a:off x="4831881" y="3890890"/>
+            <a:off x="4252565" y="3890890"/>
             <a:ext cx="0" cy="587632"/>
           </a:xfrm>
           <a:prstGeom prst="straightConnector1">
@@ -9719,7 +6493,7 @@
         </p:blipFill>
         <p:spPr>
           <a:xfrm>
-            <a:off x="7686792" y="3591487"/>
+            <a:off x="6194943" y="3583205"/>
             <a:ext cx="1085330" cy="355846"/>
           </a:xfrm>
           <a:prstGeom prst="rect">
@@ -9749,7 +6523,7 @@
         </p:blipFill>
         <p:spPr>
           <a:xfrm>
-            <a:off x="5890055" y="5194817"/>
+            <a:off x="5310739" y="5194817"/>
             <a:ext cx="868296" cy="730868"/>
           </a:xfrm>
           <a:prstGeom prst="rect">
@@ -9773,7 +6547,7 @@
         </p:nvCxnSpPr>
         <p:spPr bwMode="auto">
           <a:xfrm>
-            <a:off x="6324203" y="4470505"/>
+            <a:off x="5744887" y="4470505"/>
             <a:ext cx="0" cy="739255"/>
           </a:xfrm>
           <a:prstGeom prst="straightConnector1">
@@ -9820,8 +6594,8 @@
         </p:nvCxnSpPr>
         <p:spPr>
           <a:xfrm>
-            <a:off x="7930689" y="4506883"/>
-            <a:ext cx="3011339" cy="23327"/>
+            <a:off x="6438840" y="4498601"/>
+            <a:ext cx="1141338" cy="0"/>
           </a:xfrm>
           <a:prstGeom prst="line">
             <a:avLst/>
@@ -9866,7 +6640,7 @@
         </p:nvCxnSpPr>
         <p:spPr bwMode="auto">
           <a:xfrm flipV="1">
-            <a:off x="8435323" y="3987358"/>
+            <a:off x="6943474" y="3979076"/>
             <a:ext cx="0" cy="491164"/>
           </a:xfrm>
           <a:prstGeom prst="straightConnector1">
@@ -9911,7 +6685,7 @@
         </p:nvSpPr>
         <p:spPr>
           <a:xfrm>
-            <a:off x="7934826" y="5006806"/>
+            <a:off x="6442977" y="4998524"/>
             <a:ext cx="962123" cy="369332"/>
           </a:xfrm>
           <a:prstGeom prst="rect">
@@ -9946,7 +6720,7 @@
         </p:nvSpPr>
         <p:spPr>
           <a:xfrm>
-            <a:off x="7952627" y="5736856"/>
+            <a:off x="6460778" y="5728574"/>
             <a:ext cx="407484" cy="369332"/>
           </a:xfrm>
           <a:prstGeom prst="rect">
@@ -9981,7 +6755,7 @@
         </p:nvSpPr>
         <p:spPr>
           <a:xfrm>
-            <a:off x="7930689" y="4623151"/>
+            <a:off x="6438840" y="4614869"/>
             <a:ext cx="1141338" cy="369332"/>
           </a:xfrm>
           <a:prstGeom prst="rect">
@@ -10016,7 +6790,7 @@
         </p:nvSpPr>
         <p:spPr>
           <a:xfrm>
-            <a:off x="7942359" y="5371831"/>
+            <a:off x="6450510" y="5363549"/>
             <a:ext cx="574196" cy="369332"/>
           </a:xfrm>
           <a:prstGeom prst="rect">
@@ -10051,7 +6825,7 @@
         </p:nvSpPr>
         <p:spPr>
           <a:xfrm>
-            <a:off x="7973956" y="6064905"/>
+            <a:off x="6482107" y="6056623"/>
             <a:ext cx="343364" cy="369332"/>
           </a:xfrm>
           <a:prstGeom prst="rect">
@@ -10072,10 +6846,274 @@
           </a:p>
         </p:txBody>
       </p:sp>
+      <p:pic>
+        <p:nvPicPr>
+          <p:cNvPr id="11" name="Picture 10" descr="Logo&#10;&#10;Description automatically generated">
+            <a:extLst>
+              <a:ext uri="{FF2B5EF4-FFF2-40B4-BE49-F238E27FC236}">
+                <a16:creationId xmlns:a16="http://schemas.microsoft.com/office/drawing/2014/main" id="{426C7E25-7815-824D-BE53-4D8E3A321BBB}"/>
+              </a:ext>
+            </a:extLst>
+          </p:cNvPr>
+          <p:cNvPicPr>
+            <a:picLocks noChangeAspect="1"/>
+          </p:cNvPicPr>
+          <p:nvPr/>
+        </p:nvPicPr>
+        <p:blipFill>
+          <a:blip r:embed="rId17"/>
+          <a:stretch>
+            <a:fillRect/>
+          </a:stretch>
+        </p:blipFill>
+        <p:spPr>
+          <a:xfrm>
+            <a:off x="8047353" y="3565092"/>
+            <a:ext cx="475226" cy="363548"/>
+          </a:xfrm>
+          <a:prstGeom prst="rect">
+            <a:avLst/>
+          </a:prstGeom>
+        </p:spPr>
+      </p:pic>
+      <p:sp>
+        <p:nvSpPr>
+          <p:cNvPr id="12" name="TextBox 11">
+            <a:extLst>
+              <a:ext uri="{FF2B5EF4-FFF2-40B4-BE49-F238E27FC236}">
+                <a16:creationId xmlns:a16="http://schemas.microsoft.com/office/drawing/2014/main" id="{ED9E3EC4-E0C1-6842-9EFD-E1D4D94222EE}"/>
+              </a:ext>
+            </a:extLst>
+          </p:cNvPr>
+          <p:cNvSpPr txBox="1"/>
+          <p:nvPr/>
+        </p:nvSpPr>
+        <p:spPr>
+          <a:xfrm>
+            <a:off x="7787534" y="3857672"/>
+            <a:ext cx="1087157" cy="369332"/>
+          </a:xfrm>
+          <a:prstGeom prst="rect">
+            <a:avLst/>
+          </a:prstGeom>
+          <a:noFill/>
+        </p:spPr>
+        <p:txBody>
+          <a:bodyPr wrap="none" rtlCol="0">
+            <a:spAutoFit/>
+          </a:bodyPr>
+          <a:lstStyle/>
+          <a:p>
+            <a:r>
+              <a:rPr lang="en-US" dirty="0"/>
+              <a:t>OpenDDS</a:t>
+            </a:r>
+          </a:p>
+        </p:txBody>
+      </p:sp>
+      <p:pic>
+        <p:nvPicPr>
+          <p:cNvPr id="18" name="Graphic 17">
+            <a:extLst>
+              <a:ext uri="{FF2B5EF4-FFF2-40B4-BE49-F238E27FC236}">
+                <a16:creationId xmlns:a16="http://schemas.microsoft.com/office/drawing/2014/main" id="{36BDA55B-90F0-D444-BF15-92768C812FDF}"/>
+              </a:ext>
+            </a:extLst>
+          </p:cNvPr>
+          <p:cNvPicPr>
+            <a:picLocks noChangeAspect="1"/>
+          </p:cNvPicPr>
+          <p:nvPr/>
+        </p:nvPicPr>
+        <p:blipFill>
+          <a:blip r:embed="rId18">
+            <a:extLst>
+              <a:ext uri="{96DAC541-7B7A-43D3-8B79-37D633B846F1}">
+                <asvg:svgBlip xmlns:asvg="http://schemas.microsoft.com/office/drawing/2016/SVG/main" r:embed="rId19"/>
+              </a:ext>
+            </a:extLst>
+          </a:blip>
+          <a:stretch>
+            <a:fillRect/>
+          </a:stretch>
+        </p:blipFill>
+        <p:spPr>
+          <a:xfrm>
+            <a:off x="4850134" y="2959929"/>
+            <a:ext cx="1438386" cy="629294"/>
+          </a:xfrm>
+          <a:prstGeom prst="rect">
+            <a:avLst/>
+          </a:prstGeom>
+        </p:spPr>
+      </p:pic>
+      <p:cxnSp>
+        <p:nvCxnSpPr>
+          <p:cNvPr id="62" name="Straight Connector 61">
+            <a:extLst>
+              <a:ext uri="{FF2B5EF4-FFF2-40B4-BE49-F238E27FC236}">
+                <a16:creationId xmlns:a16="http://schemas.microsoft.com/office/drawing/2014/main" id="{FE2728B3-75A7-194C-AF0F-FE5A6C98C4EC}"/>
+              </a:ext>
+            </a:extLst>
+          </p:cNvPr>
+          <p:cNvCxnSpPr>
+            <a:cxnSpLocks/>
+          </p:cNvCxnSpPr>
+          <p:nvPr/>
+        </p:nvCxnSpPr>
+        <p:spPr>
+          <a:xfrm>
+            <a:off x="7951910" y="4687348"/>
+            <a:ext cx="1141338" cy="0"/>
+          </a:xfrm>
+          <a:prstGeom prst="line">
+            <a:avLst/>
+          </a:prstGeom>
+          <a:ln w="76200" cap="rnd">
+            <a:solidFill>
+              <a:schemeClr val="accent1">
+                <a:lumMod val="50000"/>
+              </a:schemeClr>
+            </a:solidFill>
+            <a:round/>
+          </a:ln>
+        </p:spPr>
+        <p:style>
+          <a:lnRef idx="1">
+            <a:schemeClr val="accent1"/>
+          </a:lnRef>
+          <a:fillRef idx="0">
+            <a:schemeClr val="accent1"/>
+          </a:fillRef>
+          <a:effectRef idx="0">
+            <a:schemeClr val="accent1"/>
+          </a:effectRef>
+          <a:fontRef idx="minor">
+            <a:schemeClr val="tx1"/>
+          </a:fontRef>
+        </p:style>
+      </p:cxnSp>
+      <p:cxnSp>
+        <p:nvCxnSpPr>
+          <p:cNvPr id="64" name="Straight Arrow Connector 63">
+            <a:extLst>
+              <a:ext uri="{FF2B5EF4-FFF2-40B4-BE49-F238E27FC236}">
+                <a16:creationId xmlns:a16="http://schemas.microsoft.com/office/drawing/2014/main" id="{CAB8FEB8-D55E-4341-8B77-3D7E073EBB4A}"/>
+              </a:ext>
+            </a:extLst>
+          </p:cNvPr>
+          <p:cNvCxnSpPr>
+            <a:cxnSpLocks/>
+          </p:cNvCxnSpPr>
+          <p:nvPr/>
+        </p:nvCxnSpPr>
+        <p:spPr bwMode="auto">
+          <a:xfrm flipV="1">
+            <a:off x="8279050" y="4184706"/>
+            <a:ext cx="0" cy="491164"/>
+          </a:xfrm>
+          <a:prstGeom prst="straightConnector1">
+            <a:avLst/>
+          </a:prstGeom>
+          <a:ln w="12700">
+            <a:solidFill>
+              <a:schemeClr val="accent1">
+                <a:lumMod val="50000"/>
+              </a:schemeClr>
+            </a:solidFill>
+            <a:headEnd type="none" w="med" len="med"/>
+            <a:tailEnd type="triangle"/>
+          </a:ln>
+        </p:spPr>
+        <p:style>
+          <a:lnRef idx="3">
+            <a:schemeClr val="accent6"/>
+          </a:lnRef>
+          <a:fillRef idx="0">
+            <a:schemeClr val="accent6"/>
+          </a:fillRef>
+          <a:effectRef idx="2">
+            <a:schemeClr val="accent6"/>
+          </a:effectRef>
+          <a:fontRef idx="minor">
+            <a:schemeClr val="tx1"/>
+          </a:fontRef>
+        </p:style>
+      </p:cxnSp>
+      <p:sp>
+        <p:nvSpPr>
+          <p:cNvPr id="69" name="TextBox 68">
+            <a:extLst>
+              <a:ext uri="{FF2B5EF4-FFF2-40B4-BE49-F238E27FC236}">
+                <a16:creationId xmlns:a16="http://schemas.microsoft.com/office/drawing/2014/main" id="{835F8A20-8FAC-FE46-8765-5D8415D3B1D4}"/>
+              </a:ext>
+            </a:extLst>
+          </p:cNvPr>
+          <p:cNvSpPr txBox="1"/>
+          <p:nvPr/>
+        </p:nvSpPr>
+        <p:spPr>
+          <a:xfrm>
+            <a:off x="7951910" y="4747270"/>
+            <a:ext cx="575799" cy="369332"/>
+          </a:xfrm>
+          <a:prstGeom prst="rect">
+            <a:avLst/>
+          </a:prstGeom>
+          <a:noFill/>
+        </p:spPr>
+        <p:txBody>
+          <a:bodyPr wrap="none" rtlCol="0">
+            <a:spAutoFit/>
+          </a:bodyPr>
+          <a:lstStyle/>
+          <a:p>
+            <a:r>
+              <a:rPr lang="en-US" dirty="0"/>
+              <a:t>DDS</a:t>
+            </a:r>
+          </a:p>
+        </p:txBody>
+      </p:sp>
+      <p:sp>
+        <p:nvSpPr>
+          <p:cNvPr id="70" name="TextBox 69">
+            <a:extLst>
+              <a:ext uri="{FF2B5EF4-FFF2-40B4-BE49-F238E27FC236}">
+                <a16:creationId xmlns:a16="http://schemas.microsoft.com/office/drawing/2014/main" id="{3662E909-FF2A-E645-AA4A-172AF7E2D6A0}"/>
+              </a:ext>
+            </a:extLst>
+          </p:cNvPr>
+          <p:cNvSpPr txBox="1"/>
+          <p:nvPr/>
+        </p:nvSpPr>
+        <p:spPr>
+          <a:xfrm>
+            <a:off x="8124946" y="5025094"/>
+            <a:ext cx="682559" cy="369332"/>
+          </a:xfrm>
+          <a:prstGeom prst="rect">
+            <a:avLst/>
+          </a:prstGeom>
+          <a:noFill/>
+        </p:spPr>
+        <p:txBody>
+          <a:bodyPr wrap="none" rtlCol="0">
+            <a:spAutoFit/>
+          </a:bodyPr>
+          <a:lstStyle/>
+          <a:p>
+            <a:r>
+              <a:rPr lang="en-US" dirty="0"/>
+              <a:t>ROS2</a:t>
+            </a:r>
+          </a:p>
+        </p:txBody>
+      </p:sp>
     </p:spTree>
     <p:extLst>
       <p:ext uri="{BB962C8B-B14F-4D97-AF65-F5344CB8AC3E}">
-        <p14:creationId xmlns:p14="http://schemas.microsoft.com/office/powerpoint/2010/main" val="3396807162"/>
+        <p14:creationId xmlns:p14="http://schemas.microsoft.com/office/powerpoint/2010/main" val="657161985"/>
       </p:ext>
     </p:extLst>
   </p:cSld>

</xml_diff>

<commit_message>
updates on ignite clustering with docker
</commit_message>
<xml_diff>
--- a/doc/Gateway.pptx
+++ b/doc/Gateway.pptx
@@ -329,7 +329,7 @@
           <a:p>
             <a:fld id="{DFC7EF79-06A3-ED46-9F4C-16AFC18B46CF}" type="datetimeFigureOut">
               <a:rPr lang="en-US" smtClean="0"/>
-              <a:t>3/29/21</a:t>
+              <a:t>4/20/21</a:t>
             </a:fld>
             <a:endParaRPr lang="en-US"/>
           </a:p>
@@ -529,7 +529,7 @@
           <a:p>
             <a:fld id="{DFC7EF79-06A3-ED46-9F4C-16AFC18B46CF}" type="datetimeFigureOut">
               <a:rPr lang="en-US" smtClean="0"/>
-              <a:t>3/29/21</a:t>
+              <a:t>4/20/21</a:t>
             </a:fld>
             <a:endParaRPr lang="en-US"/>
           </a:p>
@@ -739,7 +739,7 @@
           <a:p>
             <a:fld id="{DFC7EF79-06A3-ED46-9F4C-16AFC18B46CF}" type="datetimeFigureOut">
               <a:rPr lang="en-US" smtClean="0"/>
-              <a:t>3/29/21</a:t>
+              <a:t>4/20/21</a:t>
             </a:fld>
             <a:endParaRPr lang="en-US"/>
           </a:p>
@@ -992,7 +992,7 @@
           <a:p>
             <a:fld id="{DFC7EF79-06A3-ED46-9F4C-16AFC18B46CF}" type="datetimeFigureOut">
               <a:rPr lang="en-US" smtClean="0"/>
-              <a:t>3/29/21</a:t>
+              <a:t>4/20/21</a:t>
             </a:fld>
             <a:endParaRPr lang="en-US"/>
           </a:p>
@@ -1268,7 +1268,7 @@
           <a:p>
             <a:fld id="{DFC7EF79-06A3-ED46-9F4C-16AFC18B46CF}" type="datetimeFigureOut">
               <a:rPr lang="en-US" smtClean="0"/>
-              <a:t>3/29/21</a:t>
+              <a:t>4/20/21</a:t>
             </a:fld>
             <a:endParaRPr lang="en-US"/>
           </a:p>
@@ -1536,7 +1536,7 @@
           <a:p>
             <a:fld id="{DFC7EF79-06A3-ED46-9F4C-16AFC18B46CF}" type="datetimeFigureOut">
               <a:rPr lang="en-US" smtClean="0"/>
-              <a:t>3/29/21</a:t>
+              <a:t>4/20/21</a:t>
             </a:fld>
             <a:endParaRPr lang="en-US"/>
           </a:p>
@@ -1951,7 +1951,7 @@
           <a:p>
             <a:fld id="{DFC7EF79-06A3-ED46-9F4C-16AFC18B46CF}" type="datetimeFigureOut">
               <a:rPr lang="en-US" smtClean="0"/>
-              <a:t>3/29/21</a:t>
+              <a:t>4/20/21</a:t>
             </a:fld>
             <a:endParaRPr lang="en-US"/>
           </a:p>
@@ -2093,7 +2093,7 @@
           <a:p>
             <a:fld id="{DFC7EF79-06A3-ED46-9F4C-16AFC18B46CF}" type="datetimeFigureOut">
               <a:rPr lang="en-US" smtClean="0"/>
-              <a:t>3/29/21</a:t>
+              <a:t>4/20/21</a:t>
             </a:fld>
             <a:endParaRPr lang="en-US"/>
           </a:p>
@@ -2206,7 +2206,7 @@
           <a:p>
             <a:fld id="{DFC7EF79-06A3-ED46-9F4C-16AFC18B46CF}" type="datetimeFigureOut">
               <a:rPr lang="en-US" smtClean="0"/>
-              <a:t>3/29/21</a:t>
+              <a:t>4/20/21</a:t>
             </a:fld>
             <a:endParaRPr lang="en-US"/>
           </a:p>
@@ -2519,7 +2519,7 @@
           <a:p>
             <a:fld id="{DFC7EF79-06A3-ED46-9F4C-16AFC18B46CF}" type="datetimeFigureOut">
               <a:rPr lang="en-US" smtClean="0"/>
-              <a:t>3/29/21</a:t>
+              <a:t>4/20/21</a:t>
             </a:fld>
             <a:endParaRPr lang="en-US"/>
           </a:p>
@@ -2808,7 +2808,7 @@
           <a:p>
             <a:fld id="{DFC7EF79-06A3-ED46-9F4C-16AFC18B46CF}" type="datetimeFigureOut">
               <a:rPr lang="en-US" smtClean="0"/>
-              <a:t>3/29/21</a:t>
+              <a:t>4/20/21</a:t>
             </a:fld>
             <a:endParaRPr lang="en-US"/>
           </a:p>
@@ -3051,7 +3051,7 @@
           <a:p>
             <a:fld id="{DFC7EF79-06A3-ED46-9F4C-16AFC18B46CF}" type="datetimeFigureOut">
               <a:rPr lang="en-US" smtClean="0"/>
-              <a:t>3/29/21</a:t>
+              <a:t>4/20/21</a:t>
             </a:fld>
             <a:endParaRPr lang="en-US"/>
           </a:p>
@@ -3491,7 +3491,7 @@
         </p:blipFill>
         <p:spPr>
           <a:xfrm>
-            <a:off x="3514745" y="3299123"/>
+            <a:off x="3687688" y="3308425"/>
             <a:ext cx="1504846" cy="842714"/>
           </a:xfrm>
           <a:prstGeom prst="rect">
@@ -3520,7 +3520,7 @@
         </p:blipFill>
         <p:spPr>
           <a:xfrm>
-            <a:off x="2950550" y="4855609"/>
+            <a:off x="3599774" y="4855609"/>
             <a:ext cx="2248413" cy="1409284"/>
           </a:xfrm>
           <a:prstGeom prst="rect">
@@ -3542,22 +3542,22 @@
         </p:nvSpPr>
         <p:spPr bwMode="auto">
           <a:xfrm>
-            <a:off x="9543888" y="2403417"/>
-            <a:ext cx="1606654" cy="1318386"/>
+            <a:off x="9818208" y="2403417"/>
+            <a:ext cx="1606654" cy="1179788"/>
           </a:xfrm>
           <a:custGeom>
             <a:avLst/>
             <a:gdLst>
               <a:gd name="connsiteX0" fmla="*/ 0 w 1606654"/>
-              <a:gd name="connsiteY0" fmla="*/ 0 h 1318386"/>
+              <a:gd name="connsiteY0" fmla="*/ 0 h 1179788"/>
               <a:gd name="connsiteX1" fmla="*/ 1606654 w 1606654"/>
-              <a:gd name="connsiteY1" fmla="*/ 0 h 1318386"/>
+              <a:gd name="connsiteY1" fmla="*/ 0 h 1179788"/>
               <a:gd name="connsiteX2" fmla="*/ 1606654 w 1606654"/>
-              <a:gd name="connsiteY2" fmla="*/ 1318386 h 1318386"/>
+              <a:gd name="connsiteY2" fmla="*/ 1179788 h 1179788"/>
               <a:gd name="connsiteX3" fmla="*/ 0 w 1606654"/>
-              <a:gd name="connsiteY3" fmla="*/ 1318386 h 1318386"/>
+              <a:gd name="connsiteY3" fmla="*/ 1179788 h 1179788"/>
               <a:gd name="connsiteX4" fmla="*/ 0 w 1606654"/>
-              <a:gd name="connsiteY4" fmla="*/ 0 h 1318386"/>
+              <a:gd name="connsiteY4" fmla="*/ 0 h 1179788"/>
             </a:gdLst>
             <a:ahLst/>
             <a:cxnLst>
@@ -3579,7 +3579,7 @@
             </a:cxnLst>
             <a:rect l="l" t="t" r="r" b="b"/>
             <a:pathLst>
-              <a:path w="1606654" h="1318386" fill="none" extrusionOk="0">
+              <a:path w="1606654" h="1179788" fill="none" extrusionOk="0">
                 <a:moveTo>
                   <a:pt x="0" y="0"/>
                 </a:moveTo>
@@ -3589,23 +3589,23 @@
                   <a:pt x="1606654" y="0"/>
                 </a:cubicBezTo>
                 <a:cubicBezTo>
-                  <a:pt x="1592287" y="556093"/>
-                  <a:pt x="1656333" y="808117"/>
-                  <a:pt x="1606654" y="1318386"/>
-                </a:cubicBezTo>
-                <a:cubicBezTo>
-                  <a:pt x="927155" y="1264426"/>
-                  <a:pt x="431094" y="1341151"/>
-                  <a:pt x="0" y="1318386"/>
-                </a:cubicBezTo>
-                <a:cubicBezTo>
-                  <a:pt x="81092" y="661136"/>
-                  <a:pt x="17603" y="326279"/>
+                  <a:pt x="1642106" y="459837"/>
+                  <a:pt x="1614436" y="979648"/>
+                  <a:pt x="1606654" y="1179788"/>
+                </a:cubicBezTo>
+                <a:cubicBezTo>
+                  <a:pt x="927155" y="1125828"/>
+                  <a:pt x="431094" y="1202553"/>
+                  <a:pt x="0" y="1179788"/>
+                </a:cubicBezTo>
+                <a:cubicBezTo>
+                  <a:pt x="88807" y="821195"/>
+                  <a:pt x="15974" y="184837"/>
                   <a:pt x="0" y="0"/>
                 </a:cubicBezTo>
                 <a:close/>
               </a:path>
-              <a:path w="1606654" h="1318386" stroke="0" extrusionOk="0">
+              <a:path w="1606654" h="1179788" stroke="0" extrusionOk="0">
                 <a:moveTo>
                   <a:pt x="0" y="0"/>
                 </a:moveTo>
@@ -3615,18 +3615,18 @@
                   <a:pt x="1606654" y="0"/>
                 </a:cubicBezTo>
                 <a:cubicBezTo>
-                  <a:pt x="1551215" y="395085"/>
-                  <a:pt x="1590982" y="1178463"/>
-                  <a:pt x="1606654" y="1318386"/>
-                </a:cubicBezTo>
-                <a:cubicBezTo>
-                  <a:pt x="1203886" y="1231688"/>
-                  <a:pt x="725219" y="1324960"/>
-                  <a:pt x="0" y="1318386"/>
-                </a:cubicBezTo>
-                <a:cubicBezTo>
-                  <a:pt x="-55413" y="774259"/>
-                  <a:pt x="111373" y="337374"/>
+                  <a:pt x="1512320" y="224549"/>
+                  <a:pt x="1707214" y="833646"/>
+                  <a:pt x="1606654" y="1179788"/>
+                </a:cubicBezTo>
+                <a:cubicBezTo>
+                  <a:pt x="1203886" y="1093090"/>
+                  <a:pt x="725219" y="1186362"/>
+                  <a:pt x="0" y="1179788"/>
+                </a:cubicBezTo>
+                <a:cubicBezTo>
+                  <a:pt x="-101154" y="1008393"/>
+                  <a:pt x="79722" y="364879"/>
                   <a:pt x="0" y="0"/>
                 </a:cubicBezTo>
                 <a:close/>
@@ -3708,7 +3708,7 @@
         </p:blipFill>
         <p:spPr>
           <a:xfrm rot="5400000">
-            <a:off x="282913" y="5522700"/>
+            <a:off x="932137" y="5522700"/>
             <a:ext cx="1549104" cy="436927"/>
           </a:xfrm>
           <a:prstGeom prst="rect">
@@ -3730,58 +3730,66 @@
         </p:nvSpPr>
         <p:spPr bwMode="auto">
           <a:xfrm>
-            <a:off x="3013449" y="2412446"/>
-            <a:ext cx="5782261" cy="1125530"/>
+            <a:off x="2313431" y="2412446"/>
+            <a:ext cx="7131504" cy="1125530"/>
           </a:xfrm>
           <a:custGeom>
             <a:avLst/>
             <a:gdLst>
-              <a:gd name="connsiteX0" fmla="*/ 0 w 5782261"/>
+              <a:gd name="connsiteX0" fmla="*/ 0 w 7131504"/>
               <a:gd name="connsiteY0" fmla="*/ 0 h 1125530"/>
-              <a:gd name="connsiteX1" fmla="*/ 584651 w 5782261"/>
+              <a:gd name="connsiteX1" fmla="*/ 505688 w 7131504"/>
               <a:gd name="connsiteY1" fmla="*/ 0 h 1125530"/>
-              <a:gd name="connsiteX2" fmla="*/ 1342769 w 5782261"/>
+              <a:gd name="connsiteX2" fmla="*/ 1296637 w 7131504"/>
               <a:gd name="connsiteY2" fmla="*/ 0 h 1125530"/>
-              <a:gd name="connsiteX3" fmla="*/ 1927420 w 5782261"/>
+              <a:gd name="connsiteX3" fmla="*/ 1873641 w 7131504"/>
               <a:gd name="connsiteY3" fmla="*/ 0 h 1125530"/>
-              <a:gd name="connsiteX4" fmla="*/ 2454249 w 5782261"/>
+              <a:gd name="connsiteX4" fmla="*/ 2521959 w 7131504"/>
               <a:gd name="connsiteY4" fmla="*/ 0 h 1125530"/>
-              <a:gd name="connsiteX5" fmla="*/ 2923254 w 5782261"/>
+              <a:gd name="connsiteX5" fmla="*/ 3170278 w 7131504"/>
               <a:gd name="connsiteY5" fmla="*/ 0 h 1125530"/>
-              <a:gd name="connsiteX6" fmla="*/ 3681373 w 5782261"/>
+              <a:gd name="connsiteX6" fmla="*/ 3747281 w 7131504"/>
               <a:gd name="connsiteY6" fmla="*/ 0 h 1125530"/>
-              <a:gd name="connsiteX7" fmla="*/ 4266024 w 5782261"/>
+              <a:gd name="connsiteX7" fmla="*/ 4466915 w 7131504"/>
               <a:gd name="connsiteY7" fmla="*/ 0 h 1125530"/>
-              <a:gd name="connsiteX8" fmla="*/ 4908497 w 5782261"/>
+              <a:gd name="connsiteX8" fmla="*/ 5186548 w 7131504"/>
               <a:gd name="connsiteY8" fmla="*/ 0 h 1125530"/>
-              <a:gd name="connsiteX9" fmla="*/ 5782261 w 5782261"/>
+              <a:gd name="connsiteX9" fmla="*/ 5906182 w 7131504"/>
               <a:gd name="connsiteY9" fmla="*/ 0 h 1125530"/>
-              <a:gd name="connsiteX10" fmla="*/ 5782261 w 5782261"/>
-              <a:gd name="connsiteY10" fmla="*/ 551510 h 1125530"/>
-              <a:gd name="connsiteX11" fmla="*/ 5782261 w 5782261"/>
-              <a:gd name="connsiteY11" fmla="*/ 1125530 h 1125530"/>
-              <a:gd name="connsiteX12" fmla="*/ 5313255 w 5782261"/>
+              <a:gd name="connsiteX10" fmla="*/ 7131504 w 7131504"/>
+              <a:gd name="connsiteY10" fmla="*/ 0 h 1125530"/>
+              <a:gd name="connsiteX11" fmla="*/ 7131504 w 7131504"/>
+              <a:gd name="connsiteY11" fmla="*/ 574020 h 1125530"/>
+              <a:gd name="connsiteX12" fmla="*/ 7131504 w 7131504"/>
               <a:gd name="connsiteY12" fmla="*/ 1125530 h 1125530"/>
-              <a:gd name="connsiteX13" fmla="*/ 4670782 w 5782261"/>
+              <a:gd name="connsiteX13" fmla="*/ 6483185 w 7131504"/>
               <a:gd name="connsiteY13" fmla="*/ 1125530 h 1125530"/>
-              <a:gd name="connsiteX14" fmla="*/ 4086131 w 5782261"/>
+              <a:gd name="connsiteX14" fmla="*/ 6048812 w 7131504"/>
               <a:gd name="connsiteY14" fmla="*/ 1125530 h 1125530"/>
-              <a:gd name="connsiteX15" fmla="*/ 3385835 w 5782261"/>
+              <a:gd name="connsiteX15" fmla="*/ 5257863 w 7131504"/>
               <a:gd name="connsiteY15" fmla="*/ 1125530 h 1125530"/>
-              <a:gd name="connsiteX16" fmla="*/ 2627716 w 5782261"/>
+              <a:gd name="connsiteX16" fmla="*/ 4538230 w 7131504"/>
               <a:gd name="connsiteY16" fmla="*/ 1125530 h 1125530"/>
-              <a:gd name="connsiteX17" fmla="*/ 2100888 w 5782261"/>
+              <a:gd name="connsiteX17" fmla="*/ 3747281 w 7131504"/>
               <a:gd name="connsiteY17" fmla="*/ 1125530 h 1125530"/>
-              <a:gd name="connsiteX18" fmla="*/ 1631883 w 5782261"/>
+              <a:gd name="connsiteX18" fmla="*/ 3027648 w 7131504"/>
               <a:gd name="connsiteY18" fmla="*/ 1125530 h 1125530"/>
-              <a:gd name="connsiteX19" fmla="*/ 873764 w 5782261"/>
+              <a:gd name="connsiteX19" fmla="*/ 2450644 w 7131504"/>
               <a:gd name="connsiteY19" fmla="*/ 1125530 h 1125530"/>
-              <a:gd name="connsiteX20" fmla="*/ 0 w 5782261"/>
+              <a:gd name="connsiteX20" fmla="*/ 2016271 w 7131504"/>
               <a:gd name="connsiteY20" fmla="*/ 1125530 h 1125530"/>
-              <a:gd name="connsiteX21" fmla="*/ 0 w 5782261"/>
-              <a:gd name="connsiteY21" fmla="*/ 540254 h 1125530"/>
-              <a:gd name="connsiteX22" fmla="*/ 0 w 5782261"/>
-              <a:gd name="connsiteY22" fmla="*/ 0 h 1125530"/>
+              <a:gd name="connsiteX21" fmla="*/ 1510582 w 7131504"/>
+              <a:gd name="connsiteY21" fmla="*/ 1125530 h 1125530"/>
+              <a:gd name="connsiteX22" fmla="*/ 1004894 w 7131504"/>
+              <a:gd name="connsiteY22" fmla="*/ 1125530 h 1125530"/>
+              <a:gd name="connsiteX23" fmla="*/ 570520 w 7131504"/>
+              <a:gd name="connsiteY23" fmla="*/ 1125530 h 1125530"/>
+              <a:gd name="connsiteX24" fmla="*/ 0 w 7131504"/>
+              <a:gd name="connsiteY24" fmla="*/ 1125530 h 1125530"/>
+              <a:gd name="connsiteX25" fmla="*/ 0 w 7131504"/>
+              <a:gd name="connsiteY25" fmla="*/ 540254 h 1125530"/>
+              <a:gd name="connsiteX26" fmla="*/ 0 w 7131504"/>
+              <a:gd name="connsiteY26" fmla="*/ 0 h 1125530"/>
             </a:gdLst>
             <a:ahLst/>
             <a:cxnLst>
@@ -3854,237 +3862,289 @@
               <a:cxn ang="0">
                 <a:pos x="connsiteX22" y="connsiteY22"/>
               </a:cxn>
+              <a:cxn ang="0">
+                <a:pos x="connsiteX23" y="connsiteY23"/>
+              </a:cxn>
+              <a:cxn ang="0">
+                <a:pos x="connsiteX24" y="connsiteY24"/>
+              </a:cxn>
+              <a:cxn ang="0">
+                <a:pos x="connsiteX25" y="connsiteY25"/>
+              </a:cxn>
+              <a:cxn ang="0">
+                <a:pos x="connsiteX26" y="connsiteY26"/>
+              </a:cxn>
             </a:cxnLst>
             <a:rect l="l" t="t" r="r" b="b"/>
             <a:pathLst>
-              <a:path w="5782261" h="1125530" fill="none" extrusionOk="0">
+              <a:path w="7131504" h="1125530" fill="none" extrusionOk="0">
                 <a:moveTo>
                   <a:pt x="0" y="0"/>
                 </a:moveTo>
                 <a:cubicBezTo>
-                  <a:pt x="272319" y="18191"/>
-                  <a:pt x="360707" y="2507"/>
-                  <a:pt x="584651" y="0"/>
-                </a:cubicBezTo>
-                <a:cubicBezTo>
-                  <a:pt x="808595" y="-2507"/>
-                  <a:pt x="983344" y="6596"/>
-                  <a:pt x="1342769" y="0"/>
-                </a:cubicBezTo>
-                <a:cubicBezTo>
-                  <a:pt x="1702194" y="-6596"/>
-                  <a:pt x="1673703" y="-8949"/>
-                  <a:pt x="1927420" y="0"/>
-                </a:cubicBezTo>
-                <a:cubicBezTo>
-                  <a:pt x="2181137" y="8949"/>
-                  <a:pt x="2230652" y="7643"/>
-                  <a:pt x="2454249" y="0"/>
-                </a:cubicBezTo>
-                <a:cubicBezTo>
-                  <a:pt x="2677846" y="-7643"/>
-                  <a:pt x="2689521" y="2060"/>
-                  <a:pt x="2923254" y="0"/>
-                </a:cubicBezTo>
-                <a:cubicBezTo>
-                  <a:pt x="3156987" y="-2060"/>
-                  <a:pt x="3347646" y="24531"/>
-                  <a:pt x="3681373" y="0"/>
-                </a:cubicBezTo>
-                <a:cubicBezTo>
-                  <a:pt x="4015100" y="-24531"/>
-                  <a:pt x="4133580" y="-4244"/>
-                  <a:pt x="4266024" y="0"/>
-                </a:cubicBezTo>
-                <a:cubicBezTo>
-                  <a:pt x="4398468" y="4244"/>
-                  <a:pt x="4772149" y="12838"/>
-                  <a:pt x="4908497" y="0"/>
-                </a:cubicBezTo>
-                <a:cubicBezTo>
-                  <a:pt x="5044845" y="-12838"/>
-                  <a:pt x="5469789" y="21366"/>
-                  <a:pt x="5782261" y="0"/>
-                </a:cubicBezTo>
-                <a:cubicBezTo>
-                  <a:pt x="5809422" y="236852"/>
-                  <a:pt x="5775428" y="420629"/>
-                  <a:pt x="5782261" y="551510"/>
-                </a:cubicBezTo>
-                <a:cubicBezTo>
-                  <a:pt x="5789095" y="682391"/>
-                  <a:pt x="5757864" y="920323"/>
-                  <a:pt x="5782261" y="1125530"/>
-                </a:cubicBezTo>
-                <a:cubicBezTo>
-                  <a:pt x="5658574" y="1134676"/>
-                  <a:pt x="5515785" y="1133408"/>
-                  <a:pt x="5313255" y="1125530"/>
-                </a:cubicBezTo>
-                <a:cubicBezTo>
-                  <a:pt x="5110725" y="1117652"/>
-                  <a:pt x="4971054" y="1127118"/>
-                  <a:pt x="4670782" y="1125530"/>
-                </a:cubicBezTo>
-                <a:cubicBezTo>
-                  <a:pt x="4370510" y="1123942"/>
-                  <a:pt x="4296252" y="1107037"/>
-                  <a:pt x="4086131" y="1125530"/>
-                </a:cubicBezTo>
-                <a:cubicBezTo>
-                  <a:pt x="3876010" y="1144023"/>
-                  <a:pt x="3597009" y="1150757"/>
-                  <a:pt x="3385835" y="1125530"/>
-                </a:cubicBezTo>
-                <a:cubicBezTo>
-                  <a:pt x="3174661" y="1100303"/>
-                  <a:pt x="2990413" y="1150766"/>
-                  <a:pt x="2627716" y="1125530"/>
-                </a:cubicBezTo>
-                <a:cubicBezTo>
-                  <a:pt x="2265019" y="1100294"/>
-                  <a:pt x="2334641" y="1139052"/>
-                  <a:pt x="2100888" y="1125530"/>
-                </a:cubicBezTo>
-                <a:cubicBezTo>
-                  <a:pt x="1867135" y="1112008"/>
-                  <a:pt x="1845392" y="1137788"/>
-                  <a:pt x="1631883" y="1125530"/>
-                </a:cubicBezTo>
-                <a:cubicBezTo>
-                  <a:pt x="1418374" y="1113272"/>
-                  <a:pt x="1037659" y="1105941"/>
-                  <a:pt x="873764" y="1125530"/>
-                </a:cubicBezTo>
-                <a:cubicBezTo>
-                  <a:pt x="709869" y="1145119"/>
-                  <a:pt x="233262" y="1089276"/>
+                  <a:pt x="206703" y="21834"/>
+                  <a:pt x="274578" y="4735"/>
+                  <a:pt x="505688" y="0"/>
+                </a:cubicBezTo>
+                <a:cubicBezTo>
+                  <a:pt x="736798" y="-4735"/>
+                  <a:pt x="1096730" y="-853"/>
+                  <a:pt x="1296637" y="0"/>
+                </a:cubicBezTo>
+                <a:cubicBezTo>
+                  <a:pt x="1496544" y="853"/>
+                  <a:pt x="1607254" y="909"/>
+                  <a:pt x="1873641" y="0"/>
+                </a:cubicBezTo>
+                <a:cubicBezTo>
+                  <a:pt x="2140028" y="-909"/>
+                  <a:pt x="2368004" y="20899"/>
+                  <a:pt x="2521959" y="0"/>
+                </a:cubicBezTo>
+                <a:cubicBezTo>
+                  <a:pt x="2675914" y="-20899"/>
+                  <a:pt x="3034833" y="-7231"/>
+                  <a:pt x="3170278" y="0"/>
+                </a:cubicBezTo>
+                <a:cubicBezTo>
+                  <a:pt x="3305723" y="7231"/>
+                  <a:pt x="3561658" y="-2465"/>
+                  <a:pt x="3747281" y="0"/>
+                </a:cubicBezTo>
+                <a:cubicBezTo>
+                  <a:pt x="3932904" y="2465"/>
+                  <a:pt x="4160903" y="-8977"/>
+                  <a:pt x="4466915" y="0"/>
+                </a:cubicBezTo>
+                <a:cubicBezTo>
+                  <a:pt x="4772927" y="8977"/>
+                  <a:pt x="4970736" y="-30325"/>
+                  <a:pt x="5186548" y="0"/>
+                </a:cubicBezTo>
+                <a:cubicBezTo>
+                  <a:pt x="5402360" y="30325"/>
+                  <a:pt x="5711771" y="14287"/>
+                  <a:pt x="5906182" y="0"/>
+                </a:cubicBezTo>
+                <a:cubicBezTo>
+                  <a:pt x="6100593" y="-14287"/>
+                  <a:pt x="6573546" y="38376"/>
+                  <a:pt x="7131504" y="0"/>
+                </a:cubicBezTo>
+                <a:cubicBezTo>
+                  <a:pt x="7129833" y="210402"/>
+                  <a:pt x="7116761" y="351512"/>
+                  <a:pt x="7131504" y="574020"/>
+                </a:cubicBezTo>
+                <a:cubicBezTo>
+                  <a:pt x="7146247" y="796528"/>
+                  <a:pt x="7138707" y="891187"/>
+                  <a:pt x="7131504" y="1125530"/>
+                </a:cubicBezTo>
+                <a:cubicBezTo>
+                  <a:pt x="6991809" y="1097583"/>
+                  <a:pt x="6701273" y="1153787"/>
+                  <a:pt x="6483185" y="1125530"/>
+                </a:cubicBezTo>
+                <a:cubicBezTo>
+                  <a:pt x="6265097" y="1097273"/>
+                  <a:pt x="6189846" y="1126588"/>
+                  <a:pt x="6048812" y="1125530"/>
+                </a:cubicBezTo>
+                <a:cubicBezTo>
+                  <a:pt x="5907778" y="1124472"/>
+                  <a:pt x="5419372" y="1140040"/>
+                  <a:pt x="5257863" y="1125530"/>
+                </a:cubicBezTo>
+                <a:cubicBezTo>
+                  <a:pt x="5096354" y="1111020"/>
+                  <a:pt x="4858901" y="1091789"/>
+                  <a:pt x="4538230" y="1125530"/>
+                </a:cubicBezTo>
+                <a:cubicBezTo>
+                  <a:pt x="4217559" y="1159271"/>
+                  <a:pt x="4027135" y="1122073"/>
+                  <a:pt x="3747281" y="1125530"/>
+                </a:cubicBezTo>
+                <a:cubicBezTo>
+                  <a:pt x="3467427" y="1128987"/>
+                  <a:pt x="3186612" y="1143111"/>
+                  <a:pt x="3027648" y="1125530"/>
+                </a:cubicBezTo>
+                <a:cubicBezTo>
+                  <a:pt x="2868684" y="1107949"/>
+                  <a:pt x="2637101" y="1137610"/>
+                  <a:pt x="2450644" y="1125530"/>
+                </a:cubicBezTo>
+                <a:cubicBezTo>
+                  <a:pt x="2264187" y="1113450"/>
+                  <a:pt x="2175075" y="1107028"/>
+                  <a:pt x="2016271" y="1125530"/>
+                </a:cubicBezTo>
+                <a:cubicBezTo>
+                  <a:pt x="1857467" y="1144032"/>
+                  <a:pt x="1745084" y="1100281"/>
+                  <a:pt x="1510582" y="1125530"/>
+                </a:cubicBezTo>
+                <a:cubicBezTo>
+                  <a:pt x="1276080" y="1150779"/>
+                  <a:pt x="1172008" y="1149722"/>
+                  <a:pt x="1004894" y="1125530"/>
+                </a:cubicBezTo>
+                <a:cubicBezTo>
+                  <a:pt x="837780" y="1101338"/>
+                  <a:pt x="717552" y="1103848"/>
+                  <a:pt x="570520" y="1125530"/>
+                </a:cubicBezTo>
+                <a:cubicBezTo>
+                  <a:pt x="423488" y="1147212"/>
+                  <a:pt x="238314" y="1121891"/>
                   <a:pt x="0" y="1125530"/>
                 </a:cubicBezTo>
                 <a:cubicBezTo>
-                  <a:pt x="-24065" y="903131"/>
-                  <a:pt x="21369" y="748567"/>
+                  <a:pt x="27306" y="910121"/>
+                  <a:pt x="-14780" y="726403"/>
                   <a:pt x="0" y="540254"/>
                 </a:cubicBezTo>
                 <a:cubicBezTo>
-                  <a:pt x="-21369" y="331941"/>
-                  <a:pt x="17148" y="135983"/>
+                  <a:pt x="14780" y="354105"/>
+                  <a:pt x="-11082" y="180150"/>
                   <a:pt x="0" y="0"/>
                 </a:cubicBezTo>
                 <a:close/>
               </a:path>
-              <a:path w="5782261" h="1125530" stroke="0" extrusionOk="0">
+              <a:path w="7131504" h="1125530" stroke="0" extrusionOk="0">
                 <a:moveTo>
                   <a:pt x="0" y="0"/>
                 </a:moveTo>
                 <a:cubicBezTo>
-                  <a:pt x="250954" y="-37624"/>
-                  <a:pt x="439589" y="17669"/>
-                  <a:pt x="758119" y="0"/>
-                </a:cubicBezTo>
-                <a:cubicBezTo>
-                  <a:pt x="1076649" y="-17669"/>
-                  <a:pt x="1129265" y="26220"/>
-                  <a:pt x="1400592" y="0"/>
-                </a:cubicBezTo>
-                <a:cubicBezTo>
-                  <a:pt x="1671919" y="-26220"/>
-                  <a:pt x="1729682" y="-2393"/>
-                  <a:pt x="2043066" y="0"/>
-                </a:cubicBezTo>
-                <a:cubicBezTo>
-                  <a:pt x="2356450" y="2393"/>
-                  <a:pt x="2435599" y="-8414"/>
-                  <a:pt x="2569894" y="0"/>
-                </a:cubicBezTo>
-                <a:cubicBezTo>
-                  <a:pt x="2704189" y="8414"/>
-                  <a:pt x="2967931" y="-22523"/>
-                  <a:pt x="3096722" y="0"/>
-                </a:cubicBezTo>
-                <a:cubicBezTo>
-                  <a:pt x="3225513" y="22523"/>
-                  <a:pt x="3667036" y="6626"/>
-                  <a:pt x="3854841" y="0"/>
-                </a:cubicBezTo>
-                <a:cubicBezTo>
-                  <a:pt x="4042646" y="-6626"/>
-                  <a:pt x="4290498" y="-7366"/>
-                  <a:pt x="4497314" y="0"/>
-                </a:cubicBezTo>
-                <a:cubicBezTo>
-                  <a:pt x="4704130" y="7366"/>
-                  <a:pt x="4801819" y="-4049"/>
-                  <a:pt x="5081965" y="0"/>
-                </a:cubicBezTo>
-                <a:cubicBezTo>
-                  <a:pt x="5362111" y="4049"/>
-                  <a:pt x="5605863" y="19109"/>
-                  <a:pt x="5782261" y="0"/>
-                </a:cubicBezTo>
-                <a:cubicBezTo>
-                  <a:pt x="5777793" y="177552"/>
-                  <a:pt x="5781374" y="345771"/>
-                  <a:pt x="5782261" y="528999"/>
-                </a:cubicBezTo>
-                <a:cubicBezTo>
-                  <a:pt x="5783148" y="712227"/>
-                  <a:pt x="5801045" y="959776"/>
-                  <a:pt x="5782261" y="1125530"/>
-                </a:cubicBezTo>
-                <a:cubicBezTo>
-                  <a:pt x="5600977" y="1119762"/>
-                  <a:pt x="5230705" y="1148722"/>
-                  <a:pt x="5024142" y="1125530"/>
-                </a:cubicBezTo>
-                <a:cubicBezTo>
-                  <a:pt x="4817579" y="1102338"/>
-                  <a:pt x="4634319" y="1144091"/>
-                  <a:pt x="4497314" y="1125530"/>
-                </a:cubicBezTo>
-                <a:cubicBezTo>
-                  <a:pt x="4360309" y="1106969"/>
-                  <a:pt x="4061028" y="1143353"/>
-                  <a:pt x="3854841" y="1125530"/>
-                </a:cubicBezTo>
-                <a:cubicBezTo>
-                  <a:pt x="3648654" y="1107707"/>
-                  <a:pt x="3587838" y="1102998"/>
-                  <a:pt x="3385835" y="1125530"/>
-                </a:cubicBezTo>
-                <a:cubicBezTo>
-                  <a:pt x="3183832" y="1148062"/>
-                  <a:pt x="3022134" y="1120699"/>
-                  <a:pt x="2743362" y="1125530"/>
-                </a:cubicBezTo>
-                <a:cubicBezTo>
-                  <a:pt x="2464590" y="1130361"/>
-                  <a:pt x="2397046" y="1137290"/>
-                  <a:pt x="2274356" y="1125530"/>
-                </a:cubicBezTo>
-                <a:cubicBezTo>
-                  <a:pt x="2151666" y="1113770"/>
-                  <a:pt x="1982424" y="1130467"/>
-                  <a:pt x="1805350" y="1125530"/>
-                </a:cubicBezTo>
-                <a:cubicBezTo>
-                  <a:pt x="1628276" y="1120593"/>
-                  <a:pt x="1294548" y="1128108"/>
-                  <a:pt x="1047232" y="1125530"/>
-                </a:cubicBezTo>
-                <a:cubicBezTo>
-                  <a:pt x="799916" y="1122952"/>
-                  <a:pt x="296661" y="1090074"/>
+                  <a:pt x="286667" y="1455"/>
+                  <a:pt x="543493" y="31160"/>
+                  <a:pt x="790949" y="0"/>
+                </a:cubicBezTo>
+                <a:cubicBezTo>
+                  <a:pt x="1038405" y="-31160"/>
+                  <a:pt x="1284460" y="-225"/>
+                  <a:pt x="1439267" y="0"/>
+                </a:cubicBezTo>
+                <a:cubicBezTo>
+                  <a:pt x="1594074" y="225"/>
+                  <a:pt x="1923181" y="-18829"/>
+                  <a:pt x="2087586" y="0"/>
+                </a:cubicBezTo>
+                <a:cubicBezTo>
+                  <a:pt x="2251991" y="18829"/>
+                  <a:pt x="2465369" y="-4275"/>
+                  <a:pt x="2593274" y="0"/>
+                </a:cubicBezTo>
+                <a:cubicBezTo>
+                  <a:pt x="2721179" y="4275"/>
+                  <a:pt x="2875865" y="13937"/>
+                  <a:pt x="3098963" y="0"/>
+                </a:cubicBezTo>
+                <a:cubicBezTo>
+                  <a:pt x="3322061" y="-13937"/>
+                  <a:pt x="3718645" y="22884"/>
+                  <a:pt x="3889911" y="0"/>
+                </a:cubicBezTo>
+                <a:cubicBezTo>
+                  <a:pt x="4061177" y="-22884"/>
+                  <a:pt x="4342016" y="18563"/>
+                  <a:pt x="4538230" y="0"/>
+                </a:cubicBezTo>
+                <a:cubicBezTo>
+                  <a:pt x="4734444" y="-18563"/>
+                  <a:pt x="4870259" y="-8721"/>
+                  <a:pt x="5115233" y="0"/>
+                </a:cubicBezTo>
+                <a:cubicBezTo>
+                  <a:pt x="5360207" y="8721"/>
+                  <a:pt x="5679284" y="-4769"/>
+                  <a:pt x="5834867" y="0"/>
+                </a:cubicBezTo>
+                <a:cubicBezTo>
+                  <a:pt x="5990450" y="4769"/>
+                  <a:pt x="6058068" y="18303"/>
+                  <a:pt x="6269240" y="0"/>
+                </a:cubicBezTo>
+                <a:cubicBezTo>
+                  <a:pt x="6480412" y="-18303"/>
+                  <a:pt x="6788525" y="-41379"/>
+                  <a:pt x="7131504" y="0"/>
+                </a:cubicBezTo>
+                <a:cubicBezTo>
+                  <a:pt x="7113415" y="148437"/>
+                  <a:pt x="7157618" y="354184"/>
+                  <a:pt x="7131504" y="528999"/>
+                </a:cubicBezTo>
+                <a:cubicBezTo>
+                  <a:pt x="7105390" y="703814"/>
+                  <a:pt x="7157202" y="939125"/>
+                  <a:pt x="7131504" y="1125530"/>
+                </a:cubicBezTo>
+                <a:cubicBezTo>
+                  <a:pt x="6962909" y="1127662"/>
+                  <a:pt x="6517280" y="1095193"/>
+                  <a:pt x="6340555" y="1125530"/>
+                </a:cubicBezTo>
+                <a:cubicBezTo>
+                  <a:pt x="6163830" y="1155867"/>
+                  <a:pt x="6062198" y="1138412"/>
+                  <a:pt x="5906182" y="1125530"/>
+                </a:cubicBezTo>
+                <a:cubicBezTo>
+                  <a:pt x="5750166" y="1112648"/>
+                  <a:pt x="5480615" y="1100519"/>
+                  <a:pt x="5257863" y="1125530"/>
+                </a:cubicBezTo>
+                <a:cubicBezTo>
+                  <a:pt x="5035111" y="1150541"/>
+                  <a:pt x="4947113" y="1110607"/>
+                  <a:pt x="4823490" y="1125530"/>
+                </a:cubicBezTo>
+                <a:cubicBezTo>
+                  <a:pt x="4699867" y="1140453"/>
+                  <a:pt x="4572009" y="1145353"/>
+                  <a:pt x="4389117" y="1125530"/>
+                </a:cubicBezTo>
+                <a:cubicBezTo>
+                  <a:pt x="4206225" y="1105707"/>
+                  <a:pt x="3878698" y="1138521"/>
+                  <a:pt x="3598168" y="1125530"/>
+                </a:cubicBezTo>
+                <a:cubicBezTo>
+                  <a:pt x="3317638" y="1112539"/>
+                  <a:pt x="3300858" y="1153355"/>
+                  <a:pt x="3021164" y="1125530"/>
+                </a:cubicBezTo>
+                <a:cubicBezTo>
+                  <a:pt x="2741470" y="1097705"/>
+                  <a:pt x="2573825" y="1093746"/>
+                  <a:pt x="2230216" y="1125530"/>
+                </a:cubicBezTo>
+                <a:cubicBezTo>
+                  <a:pt x="1886607" y="1157314"/>
+                  <a:pt x="1612663" y="1141856"/>
+                  <a:pt x="1439267" y="1125530"/>
+                </a:cubicBezTo>
+                <a:cubicBezTo>
+                  <a:pt x="1265871" y="1109204"/>
+                  <a:pt x="1072008" y="1121499"/>
+                  <a:pt x="719634" y="1125530"/>
+                </a:cubicBezTo>
+                <a:cubicBezTo>
+                  <a:pt x="367260" y="1129561"/>
+                  <a:pt x="221570" y="1152252"/>
                   <a:pt x="0" y="1125530"/>
                 </a:cubicBezTo>
                 <a:cubicBezTo>
-                  <a:pt x="27437" y="844196"/>
-                  <a:pt x="-11857" y="831360"/>
+                  <a:pt x="-17093" y="945096"/>
+                  <a:pt x="-15608" y="828821"/>
                   <a:pt x="0" y="540254"/>
                 </a:cubicBezTo>
                 <a:cubicBezTo>
-                  <a:pt x="11857" y="249148"/>
-                  <a:pt x="15406" y="210832"/>
+                  <a:pt x="15608" y="251687"/>
+                  <a:pt x="-16105" y="192388"/>
                   <a:pt x="0" y="0"/>
                 </a:cubicBezTo>
                 <a:close/>
@@ -4175,7 +4235,7 @@
         </p:blipFill>
         <p:spPr>
           <a:xfrm>
-            <a:off x="3536900" y="2625828"/>
+            <a:off x="4186124" y="2625828"/>
             <a:ext cx="557161" cy="557161"/>
           </a:xfrm>
           <a:prstGeom prst="rect">
@@ -4205,7 +4265,7 @@
         </p:blipFill>
         <p:spPr>
           <a:xfrm>
-            <a:off x="6969862" y="2482771"/>
+            <a:off x="7619086" y="2482771"/>
             <a:ext cx="541463" cy="541463"/>
           </a:xfrm>
           <a:prstGeom prst="rect">
@@ -4235,7 +4295,7 @@
         </p:blipFill>
         <p:spPr>
           <a:xfrm>
-            <a:off x="6830113" y="2944908"/>
+            <a:off x="7479337" y="2944908"/>
             <a:ext cx="821773" cy="208162"/>
           </a:xfrm>
           <a:prstGeom prst="rect">
@@ -4281,7 +4341,7 @@
         </p:nvSpPr>
         <p:spPr>
           <a:xfrm>
-            <a:off x="3444174" y="3157924"/>
+            <a:off x="4093398" y="3157924"/>
             <a:ext cx="737318" cy="276727"/>
           </a:xfrm>
           <a:prstGeom prst="rect">
@@ -4326,7 +4386,7 @@
         </p:nvSpPr>
         <p:spPr>
           <a:xfrm>
-            <a:off x="6951088" y="3143594"/>
+            <a:off x="7600312" y="3143594"/>
             <a:ext cx="603050" cy="276871"/>
           </a:xfrm>
           <a:prstGeom prst="rect">
@@ -4371,7 +4431,7 @@
         </p:nvSpPr>
         <p:spPr>
           <a:xfrm>
-            <a:off x="4674758" y="2658526"/>
+            <a:off x="5323982" y="2658526"/>
             <a:ext cx="1760091" cy="454952"/>
           </a:xfrm>
           <a:prstGeom prst="rect">
@@ -4447,7 +4507,7 @@
         </p:nvSpPr>
         <p:spPr bwMode="auto">
           <a:xfrm>
-            <a:off x="4507579" y="2510720"/>
+            <a:off x="5156803" y="2510720"/>
             <a:ext cx="1970373" cy="818193"/>
           </a:xfrm>
           <a:prstGeom prst="roundRect">
@@ -4516,7 +4576,7 @@
         </p:nvSpPr>
         <p:spPr>
           <a:xfrm>
-            <a:off x="4956806" y="2387955"/>
+            <a:off x="5606030" y="2387955"/>
             <a:ext cx="1205779" cy="399981"/>
           </a:xfrm>
           <a:prstGeom prst="rect">
@@ -4569,7 +4629,7 @@
         </p:nvSpPr>
         <p:spPr bwMode="auto">
           <a:xfrm>
-            <a:off x="3295930" y="2560758"/>
+            <a:off x="3945154" y="2560758"/>
             <a:ext cx="1045524" cy="862471"/>
           </a:xfrm>
           <a:custGeom>
@@ -4753,7 +4813,7 @@
         </p:nvSpPr>
         <p:spPr bwMode="auto">
           <a:xfrm>
-            <a:off x="6735965" y="2502589"/>
+            <a:off x="7385189" y="2502589"/>
             <a:ext cx="1009292" cy="895515"/>
           </a:xfrm>
           <a:custGeom>
@@ -4940,7 +5000,7 @@
         </p:nvCxnSpPr>
         <p:spPr bwMode="auto">
           <a:xfrm>
-            <a:off x="3222875" y="1877599"/>
+            <a:off x="3872099" y="1877599"/>
             <a:ext cx="560670" cy="506672"/>
           </a:xfrm>
           <a:prstGeom prst="straightConnector1">
@@ -4988,7 +5048,7 @@
         </p:nvSpPr>
         <p:spPr>
           <a:xfrm>
-            <a:off x="6847762" y="400804"/>
+            <a:off x="7496986" y="400804"/>
             <a:ext cx="1041946" cy="425925"/>
           </a:xfrm>
           <a:prstGeom prst="rect">
@@ -5047,7 +5107,7 @@
         </p:nvCxnSpPr>
         <p:spPr bwMode="auto">
           <a:xfrm flipH="1">
-            <a:off x="7232984" y="1705248"/>
+            <a:off x="7882208" y="1705248"/>
             <a:ext cx="743147" cy="665409"/>
           </a:xfrm>
           <a:prstGeom prst="straightConnector1">
@@ -5097,7 +5157,7 @@
         </p:nvCxnSpPr>
         <p:spPr bwMode="auto">
           <a:xfrm>
-            <a:off x="1057465" y="4454400"/>
+            <a:off x="1706689" y="4454400"/>
             <a:ext cx="0" cy="512211"/>
           </a:xfrm>
           <a:prstGeom prst="straightConnector1">
@@ -5149,7 +5209,7 @@
         </p:blipFill>
         <p:spPr>
           <a:xfrm rot="5400000">
-            <a:off x="781310" y="5542154"/>
+            <a:off x="1430534" y="5542154"/>
             <a:ext cx="1765792" cy="449429"/>
           </a:xfrm>
           <a:prstGeom prst="rect">
@@ -5171,7 +5231,7 @@
         </p:nvSpPr>
         <p:spPr>
           <a:xfrm>
-            <a:off x="5280975" y="5976352"/>
+            <a:off x="5930199" y="5976352"/>
             <a:ext cx="1023037" cy="577081"/>
           </a:xfrm>
           <a:prstGeom prst="rect">
@@ -5241,7 +5301,7 @@
         </p:nvCxnSpPr>
         <p:spPr bwMode="auto">
           <a:xfrm>
-            <a:off x="1664206" y="4438296"/>
+            <a:off x="2313430" y="4438296"/>
             <a:ext cx="0" cy="498105"/>
           </a:xfrm>
           <a:prstGeom prst="straightConnector1">
@@ -5299,7 +5359,7 @@
         </p:blipFill>
         <p:spPr>
           <a:xfrm>
-            <a:off x="9573468" y="2713223"/>
+            <a:off x="9847788" y="2713223"/>
             <a:ext cx="1538988" cy="347823"/>
           </a:xfrm>
           <a:prstGeom prst="rect">
@@ -5321,7 +5381,7 @@
         </p:nvSpPr>
         <p:spPr>
           <a:xfrm>
-            <a:off x="9733978" y="3016107"/>
+            <a:off x="10008298" y="3016107"/>
             <a:ext cx="1217969" cy="415026"/>
           </a:xfrm>
           <a:prstGeom prst="rect">
@@ -5376,7 +5436,7 @@
         </p:blipFill>
         <p:spPr>
           <a:xfrm rot="16200000">
-            <a:off x="7823771" y="2898273"/>
+            <a:off x="8472995" y="2898273"/>
             <a:ext cx="859436" cy="194239"/>
           </a:xfrm>
           <a:prstGeom prst="rect">
@@ -5398,7 +5458,7 @@
         </p:nvSpPr>
         <p:spPr bwMode="auto">
           <a:xfrm>
-            <a:off x="8047353" y="2502589"/>
+            <a:off x="8696577" y="2502589"/>
             <a:ext cx="412365" cy="914681"/>
           </a:xfrm>
           <a:custGeom>
@@ -5590,7 +5650,7 @@
         </p:blipFill>
         <p:spPr>
           <a:xfrm>
-            <a:off x="1329179" y="298825"/>
+            <a:off x="1978403" y="298825"/>
             <a:ext cx="3787391" cy="1578774"/>
           </a:xfrm>
           <a:custGeom>
@@ -5717,7 +5777,7 @@
         </p:blipFill>
         <p:spPr>
           <a:xfrm>
-            <a:off x="7976130" y="299095"/>
+            <a:off x="8625354" y="299095"/>
             <a:ext cx="2975818" cy="1894140"/>
           </a:xfrm>
           <a:custGeom>
@@ -5843,7 +5903,7 @@
         </p:nvSpPr>
         <p:spPr>
           <a:xfrm>
-            <a:off x="5110462" y="318679"/>
+            <a:off x="5759686" y="318679"/>
             <a:ext cx="1041946" cy="649480"/>
           </a:xfrm>
           <a:prstGeom prst="rect">
@@ -5917,8 +5977,8 @@
         </p:nvCxnSpPr>
         <p:spPr bwMode="auto">
           <a:xfrm>
-            <a:off x="8412846" y="3062610"/>
-            <a:ext cx="1131042" cy="0"/>
+            <a:off x="9099531" y="2993311"/>
+            <a:ext cx="718677" cy="0"/>
           </a:xfrm>
           <a:prstGeom prst="straightConnector1">
             <a:avLst/>
@@ -5959,7 +6019,7 @@
         </p:nvCxnSpPr>
         <p:spPr bwMode="auto">
           <a:xfrm>
-            <a:off x="4125902" y="4470505"/>
+            <a:off x="4775126" y="4470505"/>
             <a:ext cx="0" cy="413467"/>
           </a:xfrm>
           <a:prstGeom prst="straightConnector1">
@@ -6018,7 +6078,7 @@
         </p:blipFill>
         <p:spPr>
           <a:xfrm>
-            <a:off x="4553301" y="316465"/>
+            <a:off x="5202525" y="316465"/>
             <a:ext cx="557161" cy="557161"/>
           </a:xfrm>
           <a:prstGeom prst="rect">
@@ -6048,7 +6108,7 @@
         </p:blipFill>
         <p:spPr>
           <a:xfrm>
-            <a:off x="7973956" y="92266"/>
+            <a:off x="8623180" y="92266"/>
             <a:ext cx="821773" cy="208162"/>
           </a:xfrm>
           <a:prstGeom prst="rect">
@@ -6094,7 +6154,7 @@
         </p:nvSpPr>
         <p:spPr>
           <a:xfrm>
-            <a:off x="2459675" y="1916031"/>
+            <a:off x="3108899" y="1916031"/>
             <a:ext cx="1041946" cy="445458"/>
           </a:xfrm>
           <a:prstGeom prst="rect">
@@ -6151,7 +6211,7 @@
         </p:nvSpPr>
         <p:spPr>
           <a:xfrm>
-            <a:off x="6924543" y="1994047"/>
+            <a:off x="7573767" y="1994047"/>
             <a:ext cx="493759" cy="241911"/>
           </a:xfrm>
           <a:prstGeom prst="rect">
@@ -6194,7 +6254,7 @@
         </p:nvSpPr>
         <p:spPr>
           <a:xfrm>
-            <a:off x="3099298" y="6180321"/>
+            <a:off x="3748522" y="6180321"/>
             <a:ext cx="2032929" cy="253916"/>
           </a:xfrm>
           <a:prstGeom prst="rect">
@@ -6229,7 +6289,7 @@
         </p:nvSpPr>
         <p:spPr>
           <a:xfrm>
-            <a:off x="4482278" y="30685"/>
+            <a:off x="5131502" y="30685"/>
             <a:ext cx="737318" cy="276727"/>
           </a:xfrm>
           <a:prstGeom prst="rect">
@@ -6282,7 +6342,7 @@
         </p:blipFill>
         <p:spPr>
           <a:xfrm>
-            <a:off x="2080416" y="5287141"/>
+            <a:off x="2729640" y="5287141"/>
             <a:ext cx="935438" cy="826907"/>
           </a:xfrm>
           <a:prstGeom prst="rect">
@@ -6306,7 +6366,7 @@
         </p:nvCxnSpPr>
         <p:spPr bwMode="auto">
           <a:xfrm>
-            <a:off x="2559613" y="4447723"/>
+            <a:off x="3208837" y="4447723"/>
             <a:ext cx="0" cy="815772"/>
           </a:xfrm>
           <a:prstGeom prst="straightConnector1">
@@ -6353,7 +6413,7 @@
         </p:nvCxnSpPr>
         <p:spPr>
           <a:xfrm>
-            <a:off x="1057465" y="4442064"/>
+            <a:off x="1706689" y="4442064"/>
             <a:ext cx="4687422" cy="14444"/>
           </a:xfrm>
           <a:prstGeom prst="line">
@@ -6397,7 +6457,7 @@
         </p:nvSpPr>
         <p:spPr>
           <a:xfrm>
-            <a:off x="1416124" y="4191130"/>
+            <a:off x="2065348" y="4191130"/>
             <a:ext cx="1083951" cy="261610"/>
           </a:xfrm>
           <a:prstGeom prst="rect">
@@ -6440,7 +6500,7 @@
         </p:nvCxnSpPr>
         <p:spPr bwMode="auto">
           <a:xfrm flipV="1">
-            <a:off x="4252565" y="3890890"/>
+            <a:off x="4471806" y="3890890"/>
             <a:ext cx="0" cy="587632"/>
           </a:xfrm>
           <a:prstGeom prst="straightConnector1">
@@ -6493,7 +6553,7 @@
         </p:blipFill>
         <p:spPr>
           <a:xfrm>
-            <a:off x="6194943" y="3583205"/>
+            <a:off x="6844167" y="3583205"/>
             <a:ext cx="1085330" cy="355846"/>
           </a:xfrm>
           <a:prstGeom prst="rect">
@@ -6523,7 +6583,7 @@
         </p:blipFill>
         <p:spPr>
           <a:xfrm>
-            <a:off x="5310739" y="5194817"/>
+            <a:off x="5959963" y="5194817"/>
             <a:ext cx="868296" cy="730868"/>
           </a:xfrm>
           <a:prstGeom prst="rect">
@@ -6547,7 +6607,7 @@
         </p:nvCxnSpPr>
         <p:spPr bwMode="auto">
           <a:xfrm>
-            <a:off x="5744887" y="4470505"/>
+            <a:off x="6394111" y="4470505"/>
             <a:ext cx="0" cy="739255"/>
           </a:xfrm>
           <a:prstGeom prst="straightConnector1">
@@ -6594,7 +6654,7 @@
         </p:nvCxnSpPr>
         <p:spPr>
           <a:xfrm>
-            <a:off x="6438840" y="4498601"/>
+            <a:off x="7088064" y="4498601"/>
             <a:ext cx="1141338" cy="0"/>
           </a:xfrm>
           <a:prstGeom prst="line">
@@ -6640,7 +6700,7 @@
         </p:nvCxnSpPr>
         <p:spPr bwMode="auto">
           <a:xfrm flipV="1">
-            <a:off x="6943474" y="3979076"/>
+            <a:off x="7592698" y="3979076"/>
             <a:ext cx="0" cy="491164"/>
           </a:xfrm>
           <a:prstGeom prst="straightConnector1">
@@ -6685,7 +6745,7 @@
         </p:nvSpPr>
         <p:spPr>
           <a:xfrm>
-            <a:off x="6442977" y="4998524"/>
+            <a:off x="7092201" y="4998524"/>
             <a:ext cx="962123" cy="369332"/>
           </a:xfrm>
           <a:prstGeom prst="rect">
@@ -6720,7 +6780,7 @@
         </p:nvSpPr>
         <p:spPr>
           <a:xfrm>
-            <a:off x="6460778" y="5728574"/>
+            <a:off x="7110002" y="5728574"/>
             <a:ext cx="407484" cy="369332"/>
           </a:xfrm>
           <a:prstGeom prst="rect">
@@ -6755,7 +6815,7 @@
         </p:nvSpPr>
         <p:spPr>
           <a:xfrm>
-            <a:off x="6438840" y="4614869"/>
+            <a:off x="7088064" y="4614869"/>
             <a:ext cx="1141338" cy="369332"/>
           </a:xfrm>
           <a:prstGeom prst="rect">
@@ -6790,7 +6850,7 @@
         </p:nvSpPr>
         <p:spPr>
           <a:xfrm>
-            <a:off x="6450510" y="5363549"/>
+            <a:off x="7099734" y="5363549"/>
             <a:ext cx="574196" cy="369332"/>
           </a:xfrm>
           <a:prstGeom prst="rect">
@@ -6825,7 +6885,7 @@
         </p:nvSpPr>
         <p:spPr>
           <a:xfrm>
-            <a:off x="6482107" y="6056623"/>
+            <a:off x="7131331" y="6056623"/>
             <a:ext cx="343364" cy="369332"/>
           </a:xfrm>
           <a:prstGeom prst="rect">
@@ -6868,7 +6928,7 @@
         </p:blipFill>
         <p:spPr>
           <a:xfrm>
-            <a:off x="8047353" y="3565092"/>
+            <a:off x="8696577" y="3565092"/>
             <a:ext cx="475226" cy="363548"/>
           </a:xfrm>
           <a:prstGeom prst="rect">
@@ -6890,7 +6950,7 @@
         </p:nvSpPr>
         <p:spPr>
           <a:xfrm>
-            <a:off x="7787534" y="3857672"/>
+            <a:off x="8436758" y="3857672"/>
             <a:ext cx="1087157" cy="369332"/>
           </a:xfrm>
           <a:prstGeom prst="rect">
@@ -6939,7 +6999,7 @@
         </p:blipFill>
         <p:spPr>
           <a:xfrm>
-            <a:off x="4850134" y="2959929"/>
+            <a:off x="5499358" y="2959929"/>
             <a:ext cx="1438386" cy="629294"/>
           </a:xfrm>
           <a:prstGeom prst="rect">
@@ -6963,7 +7023,7 @@
         </p:nvCxnSpPr>
         <p:spPr>
           <a:xfrm>
-            <a:off x="7951910" y="4687348"/>
+            <a:off x="8601134" y="4687348"/>
             <a:ext cx="1141338" cy="0"/>
           </a:xfrm>
           <a:prstGeom prst="line">
@@ -7009,7 +7069,7 @@
         </p:nvCxnSpPr>
         <p:spPr bwMode="auto">
           <a:xfrm flipV="1">
-            <a:off x="8279050" y="4184706"/>
+            <a:off x="8928274" y="4184706"/>
             <a:ext cx="0" cy="491164"/>
           </a:xfrm>
           <a:prstGeom prst="straightConnector1">
@@ -7054,7 +7114,7 @@
         </p:nvSpPr>
         <p:spPr>
           <a:xfrm>
-            <a:off x="7951910" y="4747270"/>
+            <a:off x="8601134" y="4747270"/>
             <a:ext cx="575799" cy="369332"/>
           </a:xfrm>
           <a:prstGeom prst="rect">
@@ -7089,7 +7149,7 @@
         </p:nvSpPr>
         <p:spPr>
           <a:xfrm>
-            <a:off x="8124946" y="5025094"/>
+            <a:off x="8774170" y="5025094"/>
             <a:ext cx="682559" cy="369332"/>
           </a:xfrm>
           <a:prstGeom prst="rect">
@@ -7106,6 +7166,392 @@
             <a:r>
               <a:rPr lang="en-US" dirty="0"/>
               <a:t>ROS2</a:t>
+            </a:r>
+          </a:p>
+        </p:txBody>
+      </p:sp>
+      <p:pic>
+        <p:nvPicPr>
+          <p:cNvPr id="3" name="Graphic 2">
+            <a:extLst>
+              <a:ext uri="{FF2B5EF4-FFF2-40B4-BE49-F238E27FC236}">
+                <a16:creationId xmlns:a16="http://schemas.microsoft.com/office/drawing/2014/main" id="{F2F6DFEA-8504-8D4D-9BAB-06F6356F4025}"/>
+              </a:ext>
+            </a:extLst>
+          </p:cNvPr>
+          <p:cNvPicPr>
+            <a:picLocks noChangeAspect="1"/>
+          </p:cNvPicPr>
+          <p:nvPr/>
+        </p:nvPicPr>
+        <p:blipFill>
+          <a:blip r:embed="rId20">
+            <a:extLst>
+              <a:ext uri="{96DAC541-7B7A-43D3-8B79-37D633B846F1}">
+                <asvg:svgBlip xmlns:asvg="http://schemas.microsoft.com/office/drawing/2016/SVG/main" r:embed="rId21"/>
+              </a:ext>
+            </a:extLst>
+          </a:blip>
+          <a:stretch>
+            <a:fillRect/>
+          </a:stretch>
+        </p:blipFill>
+        <p:spPr>
+          <a:xfrm>
+            <a:off x="2483196" y="2589693"/>
+            <a:ext cx="1251406" cy="553901"/>
+          </a:xfrm>
+          <a:prstGeom prst="rect">
+            <a:avLst/>
+          </a:prstGeom>
+        </p:spPr>
+      </p:pic>
+      <p:sp>
+        <p:nvSpPr>
+          <p:cNvPr id="66" name="Rounded Rectangle 65">
+            <a:extLst>
+              <a:ext uri="{FF2B5EF4-FFF2-40B4-BE49-F238E27FC236}">
+                <a16:creationId xmlns:a16="http://schemas.microsoft.com/office/drawing/2014/main" id="{45040977-0D9B-5147-9069-4004A21EBD32}"/>
+              </a:ext>
+            </a:extLst>
+          </p:cNvPr>
+          <p:cNvSpPr/>
+          <p:nvPr/>
+        </p:nvSpPr>
+        <p:spPr bwMode="auto">
+          <a:xfrm>
+            <a:off x="2427291" y="2558185"/>
+            <a:ext cx="1381031" cy="862471"/>
+          </a:xfrm>
+          <a:custGeom>
+            <a:avLst/>
+            <a:gdLst>
+              <a:gd name="connsiteX0" fmla="*/ 0 w 1381031"/>
+              <a:gd name="connsiteY0" fmla="*/ 143748 h 862471"/>
+              <a:gd name="connsiteX1" fmla="*/ 143748 w 1381031"/>
+              <a:gd name="connsiteY1" fmla="*/ 0 h 862471"/>
+              <a:gd name="connsiteX2" fmla="*/ 1237283 w 1381031"/>
+              <a:gd name="connsiteY2" fmla="*/ 0 h 862471"/>
+              <a:gd name="connsiteX3" fmla="*/ 1381031 w 1381031"/>
+              <a:gd name="connsiteY3" fmla="*/ 143748 h 862471"/>
+              <a:gd name="connsiteX4" fmla="*/ 1381031 w 1381031"/>
+              <a:gd name="connsiteY4" fmla="*/ 718723 h 862471"/>
+              <a:gd name="connsiteX5" fmla="*/ 1237283 w 1381031"/>
+              <a:gd name="connsiteY5" fmla="*/ 862471 h 862471"/>
+              <a:gd name="connsiteX6" fmla="*/ 143748 w 1381031"/>
+              <a:gd name="connsiteY6" fmla="*/ 862471 h 862471"/>
+              <a:gd name="connsiteX7" fmla="*/ 0 w 1381031"/>
+              <a:gd name="connsiteY7" fmla="*/ 718723 h 862471"/>
+              <a:gd name="connsiteX8" fmla="*/ 0 w 1381031"/>
+              <a:gd name="connsiteY8" fmla="*/ 143748 h 862471"/>
+            </a:gdLst>
+            <a:ahLst/>
+            <a:cxnLst>
+              <a:cxn ang="0">
+                <a:pos x="connsiteX0" y="connsiteY0"/>
+              </a:cxn>
+              <a:cxn ang="0">
+                <a:pos x="connsiteX1" y="connsiteY1"/>
+              </a:cxn>
+              <a:cxn ang="0">
+                <a:pos x="connsiteX2" y="connsiteY2"/>
+              </a:cxn>
+              <a:cxn ang="0">
+                <a:pos x="connsiteX3" y="connsiteY3"/>
+              </a:cxn>
+              <a:cxn ang="0">
+                <a:pos x="connsiteX4" y="connsiteY4"/>
+              </a:cxn>
+              <a:cxn ang="0">
+                <a:pos x="connsiteX5" y="connsiteY5"/>
+              </a:cxn>
+              <a:cxn ang="0">
+                <a:pos x="connsiteX6" y="connsiteY6"/>
+              </a:cxn>
+              <a:cxn ang="0">
+                <a:pos x="connsiteX7" y="connsiteY7"/>
+              </a:cxn>
+              <a:cxn ang="0">
+                <a:pos x="connsiteX8" y="connsiteY8"/>
+              </a:cxn>
+            </a:cxnLst>
+            <a:rect l="l" t="t" r="r" b="b"/>
+            <a:pathLst>
+              <a:path w="1381031" h="862471" extrusionOk="0">
+                <a:moveTo>
+                  <a:pt x="0" y="143748"/>
+                </a:moveTo>
+                <a:cubicBezTo>
+                  <a:pt x="-9704" y="58373"/>
+                  <a:pt x="58599" y="2162"/>
+                  <a:pt x="143748" y="0"/>
+                </a:cubicBezTo>
+                <a:cubicBezTo>
+                  <a:pt x="644769" y="65880"/>
+                  <a:pt x="988504" y="72334"/>
+                  <a:pt x="1237283" y="0"/>
+                </a:cubicBezTo>
+                <a:cubicBezTo>
+                  <a:pt x="1305653" y="10761"/>
+                  <a:pt x="1378647" y="77533"/>
+                  <a:pt x="1381031" y="143748"/>
+                </a:cubicBezTo>
+                <a:cubicBezTo>
+                  <a:pt x="1403002" y="280425"/>
+                  <a:pt x="1348853" y="517323"/>
+                  <a:pt x="1381031" y="718723"/>
+                </a:cubicBezTo>
+                <a:cubicBezTo>
+                  <a:pt x="1396626" y="799963"/>
+                  <a:pt x="1317779" y="860194"/>
+                  <a:pt x="1237283" y="862471"/>
+                </a:cubicBezTo>
+                <a:cubicBezTo>
+                  <a:pt x="841177" y="777978"/>
+                  <a:pt x="499074" y="863728"/>
+                  <a:pt x="143748" y="862471"/>
+                </a:cubicBezTo>
+                <a:cubicBezTo>
+                  <a:pt x="62889" y="848464"/>
+                  <a:pt x="-8261" y="809594"/>
+                  <a:pt x="0" y="718723"/>
+                </a:cubicBezTo>
+                <a:cubicBezTo>
+                  <a:pt x="38108" y="480802"/>
+                  <a:pt x="-29257" y="204854"/>
+                  <a:pt x="0" y="143748"/>
+                </a:cubicBezTo>
+                <a:close/>
+              </a:path>
+            </a:pathLst>
+          </a:custGeom>
+          <a:noFill/>
+          <a:ln w="12700" cap="flat" cmpd="sng" algn="ctr">
+            <a:solidFill>
+              <a:schemeClr val="accent1">
+                <a:lumMod val="50000"/>
+              </a:schemeClr>
+            </a:solidFill>
+            <a:prstDash val="solid"/>
+            <a:round/>
+            <a:headEnd type="none" w="med" len="med"/>
+            <a:tailEnd type="none" w="med" len="med"/>
+            <a:extLst>
+              <a:ext uri="{C807C97D-BFC1-408E-A445-0C87EB9F89A2}">
+                <ask:lineSketchStyleProps xmlns:ask="http://schemas.microsoft.com/office/drawing/2018/sketchyshapes" sd="1219033472">
+                  <a:prstGeom prst="roundRect">
+                    <a:avLst/>
+                  </a:prstGeom>
+                  <ask:type>
+                    <ask:lineSketchCurved/>
+                  </ask:type>
+                </ask:lineSketchStyleProps>
+              </a:ext>
+            </a:extLst>
+          </a:ln>
+        </p:spPr>
+        <p:style>
+          <a:lnRef idx="0">
+            <a:scrgbClr r="0" g="0" b="0"/>
+          </a:lnRef>
+          <a:fillRef idx="0">
+            <a:scrgbClr r="0" g="0" b="0"/>
+          </a:fillRef>
+          <a:effectRef idx="0">
+            <a:scrgbClr r="0" g="0" b="0"/>
+          </a:effectRef>
+          <a:fontRef idx="minor">
+            <a:schemeClr val="dk1"/>
+          </a:fontRef>
+        </p:style>
+        <p:txBody>
+          <a:bodyPr wrap="square" lIns="107944" tIns="53972" rIns="107944" bIns="53972" numCol="1" spcCol="72000" rtlCol="0" anchor="ctr">
+            <a:noAutofit/>
+          </a:bodyPr>
+          <a:lstStyle/>
+          <a:p>
+            <a:pPr algn="ctr">
+              <a:lnSpc>
+                <a:spcPct val="110000"/>
+              </a:lnSpc>
+              <a:spcBef>
+                <a:spcPct val="0"/>
+              </a:spcBef>
+              <a:buFont typeface="Wingdings" charset="0"/>
+              <a:buNone/>
+            </a:pPr>
+            <a:endParaRPr lang="en-US" sz="1799" dirty="0">
+              <a:solidFill>
+                <a:schemeClr val="tx1"/>
+              </a:solidFill>
+              <a:ea typeface="Arial Unicode MS" panose="020B0604020202020204" pitchFamily="34" charset="-128"/>
+              <a:cs typeface="Arial Unicode MS" panose="020B0604020202020204" pitchFamily="34" charset="-128"/>
+            </a:endParaRPr>
+          </a:p>
+        </p:txBody>
+      </p:sp>
+      <p:pic>
+        <p:nvPicPr>
+          <p:cNvPr id="27" name="Picture 26" descr="A red and white logo&#10;&#10;Description automatically generated with low confidence">
+            <a:extLst>
+              <a:ext uri="{FF2B5EF4-FFF2-40B4-BE49-F238E27FC236}">
+                <a16:creationId xmlns:a16="http://schemas.microsoft.com/office/drawing/2014/main" id="{4DFE1FF7-D763-A346-996D-15C0F7DEDF27}"/>
+              </a:ext>
+            </a:extLst>
+          </p:cNvPr>
+          <p:cNvPicPr>
+            <a:picLocks noChangeAspect="1"/>
+          </p:cNvPicPr>
+          <p:nvPr/>
+        </p:nvPicPr>
+        <p:blipFill>
+          <a:blip r:embed="rId22"/>
+          <a:stretch>
+            <a:fillRect/>
+          </a:stretch>
+        </p:blipFill>
+        <p:spPr>
+          <a:xfrm>
+            <a:off x="930352" y="2635637"/>
+            <a:ext cx="1048758" cy="760940"/>
+          </a:xfrm>
+          <a:prstGeom prst="rect">
+            <a:avLst/>
+          </a:prstGeom>
+        </p:spPr>
+      </p:pic>
+      <p:sp>
+        <p:nvSpPr>
+          <p:cNvPr id="71" name="TextBox 70">
+            <a:extLst>
+              <a:ext uri="{FF2B5EF4-FFF2-40B4-BE49-F238E27FC236}">
+                <a16:creationId xmlns:a16="http://schemas.microsoft.com/office/drawing/2014/main" id="{E583B32D-E029-404A-A29B-57948096756D}"/>
+              </a:ext>
+            </a:extLst>
+          </p:cNvPr>
+          <p:cNvSpPr txBox="1"/>
+          <p:nvPr/>
+        </p:nvSpPr>
+        <p:spPr>
+          <a:xfrm>
+            <a:off x="889996" y="3430044"/>
+            <a:ext cx="1119202" cy="438905"/>
+          </a:xfrm>
+          <a:prstGeom prst="rect">
+            <a:avLst/>
+          </a:prstGeom>
+          <a:noFill/>
+        </p:spPr>
+        <p:txBody>
+          <a:bodyPr wrap="square" lIns="0" tIns="0" rIns="0" bIns="0" rtlCol="0">
+            <a:noAutofit/>
+          </a:bodyPr>
+          <a:lstStyle/>
+          <a:p>
+            <a:pPr algn="ctr">
+              <a:lnSpc>
+                <a:spcPct val="110000"/>
+              </a:lnSpc>
+            </a:pPr>
+            <a:r>
+              <a:rPr lang="en-US" sz="1199" dirty="0">
+                <a:ea typeface="Arial Unicode MS" panose="020B0604020202020204" pitchFamily="34" charset="-128"/>
+                <a:cs typeface="Arial Unicode MS" panose="020B0604020202020204" pitchFamily="34" charset="-128"/>
+              </a:rPr>
+              <a:t>Distributed ANSI SQL with Joins</a:t>
+            </a:r>
+          </a:p>
+        </p:txBody>
+      </p:sp>
+      <p:cxnSp>
+        <p:nvCxnSpPr>
+          <p:cNvPr id="72" name="Straight Arrow Connector 71">
+            <a:extLst>
+              <a:ext uri="{FF2B5EF4-FFF2-40B4-BE49-F238E27FC236}">
+                <a16:creationId xmlns:a16="http://schemas.microsoft.com/office/drawing/2014/main" id="{62CDD1EA-FBD0-5C4A-B21F-112ACB0A2947}"/>
+              </a:ext>
+            </a:extLst>
+          </p:cNvPr>
+          <p:cNvCxnSpPr>
+            <a:cxnSpLocks/>
+            <a:endCxn id="27" idx="3"/>
+          </p:cNvCxnSpPr>
+          <p:nvPr/>
+        </p:nvCxnSpPr>
+        <p:spPr bwMode="auto">
+          <a:xfrm flipH="1">
+            <a:off x="1979110" y="3016107"/>
+            <a:ext cx="504086" cy="0"/>
+          </a:xfrm>
+          <a:prstGeom prst="straightConnector1">
+            <a:avLst/>
+          </a:prstGeom>
+          <a:solidFill>
+            <a:schemeClr val="tx2"/>
+          </a:solidFill>
+          <a:ln w="12700" cap="flat" cmpd="sng" algn="ctr">
+            <a:solidFill>
+              <a:schemeClr val="accent1">
+                <a:lumMod val="50000"/>
+              </a:schemeClr>
+            </a:solidFill>
+            <a:prstDash val="solid"/>
+            <a:round/>
+            <a:headEnd type="none" w="med" len="med"/>
+            <a:tailEnd type="triangle"/>
+          </a:ln>
+          <a:effectLst/>
+          <a:extLst>
+            <a:ext uri="{AF507438-7753-43E0-B8FC-AC1667EBCBE1}">
+              <a14:hiddenEffects xmlns:a14="http://schemas.microsoft.com/office/drawing/2010/main">
+                <a:effectLst>
+                  <a:outerShdw blurRad="63500" dist="35921" dir="2700000" algn="ctr" rotWithShape="0">
+                    <a:schemeClr val="bg2"/>
+                  </a:outerShdw>
+                </a:effectLst>
+              </a14:hiddenEffects>
+            </a:ext>
+          </a:extLst>
+        </p:spPr>
+      </p:cxnSp>
+      <p:sp>
+        <p:nvSpPr>
+          <p:cNvPr id="30" name="Rectangle 29">
+            <a:extLst>
+              <a:ext uri="{FF2B5EF4-FFF2-40B4-BE49-F238E27FC236}">
+                <a16:creationId xmlns:a16="http://schemas.microsoft.com/office/drawing/2014/main" id="{7E3C7052-E6FE-764A-A1AF-CAE927651B6C}"/>
+              </a:ext>
+            </a:extLst>
+          </p:cNvPr>
+          <p:cNvSpPr/>
+          <p:nvPr/>
+        </p:nvSpPr>
+        <p:spPr>
+          <a:xfrm>
+            <a:off x="2417963" y="3074388"/>
+            <a:ext cx="1436611" cy="269176"/>
+          </a:xfrm>
+          <a:prstGeom prst="rect">
+            <a:avLst/>
+          </a:prstGeom>
+        </p:spPr>
+        <p:txBody>
+          <a:bodyPr wrap="none">
+            <a:spAutoFit/>
+          </a:bodyPr>
+          <a:lstStyle/>
+          <a:p>
+            <a:pPr algn="ctr">
+              <a:lnSpc>
+                <a:spcPct val="110000"/>
+              </a:lnSpc>
+            </a:pPr>
+            <a:r>
+              <a:rPr lang="en-US" sz="1100" dirty="0">
+                <a:ea typeface="Arial Unicode MS" panose="020B0604020202020204" pitchFamily="34" charset="-128"/>
+                <a:cs typeface="Arial Unicode MS" panose="020B0604020202020204" pitchFamily="34" charset="-128"/>
+              </a:rPr>
+              <a:t>In-Memory Data Grid </a:t>
             </a:r>
           </a:p>
         </p:txBody>

</xml_diff>